<commit_message>
Update develop before merging into master
</commit_message>
<xml_diff>
--- a/Optimization model diagram.pptx
+++ b/Optimization model diagram.pptx
@@ -112,7 +112,36 @@
       </a:defRPr>
     </a:lvl9pPr>
   </p:defaultTextStyle>
-  <p:extLst/>
+  <p:extLst>
+    <p:ext uri="{EFAFB233-063F-42B5-8137-9DF3F51BA10A}">
+      <p15:sldGuideLst xmlns:p15="http://schemas.microsoft.com/office/powerpoint/2012/main">
+        <p15:guide id="1" orient="horz" pos="2160">
+          <p15:clr>
+            <a:srgbClr val="A4A3A4"/>
+          </p15:clr>
+        </p15:guide>
+        <p15:guide id="2" pos="2880">
+          <p15:clr>
+            <a:srgbClr val="A4A3A4"/>
+          </p15:clr>
+        </p15:guide>
+      </p15:sldGuideLst>
+    </p:ext>
+    <p:ext uri="{2D200454-40CA-4A62-9FC3-DE9A4176ACB9}">
+      <p15:notesGuideLst xmlns:p15="http://schemas.microsoft.com/office/powerpoint/2012/main">
+        <p15:guide id="1" orient="horz" pos="2880">
+          <p15:clr>
+            <a:srgbClr val="A4A3A4"/>
+          </p15:clr>
+        </p15:guide>
+        <p15:guide id="2" pos="2160">
+          <p15:clr>
+            <a:srgbClr val="A4A3A4"/>
+          </p15:clr>
+        </p15:guide>
+      </p15:notesGuideLst>
+    </p:ext>
+  </p:extLst>
 </p:presentation>
 </file>
 
@@ -206,7 +235,7 @@
             <a:fld id="{62430CC7-8C13-4D51-BC46-B95A4AC4A04B}" type="datetimeFigureOut">
               <a:rPr lang="en-US" smtClean="0"/>
               <a:pPr/>
-              <a:t>9/19/2017</a:t>
+              <a:t>3/21/2018</a:t>
             </a:fld>
             <a:endParaRPr lang="en-US"/>
           </a:p>
@@ -272,38 +301,37 @@
           <a:p>
             <a:pPr lvl="0"/>
             <a:r>
-              <a:rPr lang="en-US" smtClean="0"/>
+              <a:rPr lang="en-US"/>
               <a:t>Click to edit Master text styles</a:t>
             </a:r>
           </a:p>
           <a:p>
             <a:pPr lvl="1"/>
             <a:r>
-              <a:rPr lang="en-US" smtClean="0"/>
+              <a:rPr lang="en-US"/>
               <a:t>Second level</a:t>
             </a:r>
           </a:p>
           <a:p>
             <a:pPr lvl="2"/>
             <a:r>
-              <a:rPr lang="en-US" smtClean="0"/>
+              <a:rPr lang="en-US"/>
               <a:t>Third level</a:t>
             </a:r>
           </a:p>
           <a:p>
             <a:pPr lvl="3"/>
             <a:r>
-              <a:rPr lang="en-US" smtClean="0"/>
+              <a:rPr lang="en-US"/>
               <a:t>Fourth level</a:t>
             </a:r>
           </a:p>
           <a:p>
             <a:pPr lvl="4"/>
             <a:r>
-              <a:rPr lang="en-US" smtClean="0"/>
+              <a:rPr lang="en-US"/>
               <a:t>Fifth level</a:t>
             </a:r>
-            <a:endParaRPr lang="en-US"/>
           </a:p>
         </p:txBody>
       </p:sp>
@@ -522,18 +550,18 @@
           <a:lstStyle/>
           <a:p>
             <a:r>
-              <a:rPr lang="en-US" dirty="0" smtClean="0"/>
+              <a:rPr lang="en-US" dirty="0"/>
               <a:t>How can we model value to system and for owner</a:t>
             </a:r>
             <a:r>
-              <a:rPr lang="en-US" baseline="0" dirty="0" smtClean="0"/>
+              <a:rPr lang="en-US" baseline="0" dirty="0"/>
               <a:t> to alleviate any concerns.</a:t>
             </a:r>
-            <a:endParaRPr lang="en-US" dirty="0" smtClean="0"/>
-          </a:p>
-          <a:p>
-            <a:r>
-              <a:rPr lang="en-US" dirty="0" smtClean="0"/>
+            <a:endParaRPr lang="en-US" dirty="0"/>
+          </a:p>
+          <a:p>
+            <a:r>
+              <a:rPr lang="en-US" dirty="0"/>
               <a:t>Price taker model (described herein)</a:t>
             </a:r>
           </a:p>
@@ -543,7 +571,7 @@
               <a:buChar char="•"/>
             </a:pPr>
             <a:r>
-              <a:rPr lang="en-US" dirty="0" smtClean="0"/>
+              <a:rPr lang="en-US" dirty="0"/>
               <a:t>Uses market data</a:t>
             </a:r>
           </a:p>
@@ -553,7 +581,7 @@
               <a:buChar char="•"/>
             </a:pPr>
             <a:r>
-              <a:rPr lang="en-US" dirty="0" smtClean="0"/>
+              <a:rPr lang="en-US" dirty="0"/>
               <a:t>Takes minutes to run</a:t>
             </a:r>
           </a:p>
@@ -563,21 +591,21 @@
               <a:buChar char="•"/>
             </a:pPr>
             <a:r>
-              <a:rPr lang="en-US" dirty="0" smtClean="0"/>
+              <a:rPr lang="en-US" dirty="0"/>
               <a:t>Assumes units do not affect grid operation (price suppression</a:t>
             </a:r>
             <a:r>
-              <a:rPr lang="en-US" baseline="0" dirty="0" smtClean="0"/>
+              <a:rPr lang="en-US" baseline="0" dirty="0"/>
               <a:t> effect)</a:t>
             </a:r>
-            <a:endParaRPr lang="en-US" dirty="0" smtClean="0"/>
-          </a:p>
-          <a:p>
-            <a:endParaRPr lang="en-US" dirty="0" smtClean="0"/>
-          </a:p>
-          <a:p>
-            <a:r>
-              <a:rPr lang="en-US" dirty="0" smtClean="0"/>
+            <a:endParaRPr lang="en-US" dirty="0"/>
+          </a:p>
+          <a:p>
+            <a:endParaRPr lang="en-US" dirty="0"/>
+          </a:p>
+          <a:p>
+            <a:r>
+              <a:rPr lang="en-US" dirty="0"/>
               <a:t>Production Cost model</a:t>
             </a:r>
           </a:p>
@@ -587,7 +615,7 @@
               <a:buChar char="•"/>
             </a:pPr>
             <a:r>
-              <a:rPr lang="en-US" dirty="0" smtClean="0"/>
+              <a:rPr lang="en-US" dirty="0"/>
               <a:t>Reconstructs electricity markets</a:t>
             </a:r>
           </a:p>
@@ -597,7 +625,7 @@
               <a:buChar char="•"/>
             </a:pPr>
             <a:r>
-              <a:rPr lang="en-US" dirty="0" smtClean="0"/>
+              <a:rPr lang="en-US" dirty="0"/>
               <a:t>Takes hours, days or weeks to run</a:t>
             </a:r>
           </a:p>
@@ -607,7 +635,7 @@
               <a:buChar char="•"/>
             </a:pPr>
             <a:r>
-              <a:rPr lang="en-US" dirty="0" smtClean="0"/>
+              <a:rPr lang="en-US" dirty="0"/>
               <a:t>Can determine how units affect grid operation</a:t>
             </a:r>
           </a:p>
@@ -698,18 +726,18 @@
           <a:lstStyle/>
           <a:p>
             <a:r>
-              <a:rPr lang="en-US" dirty="0" smtClean="0"/>
+              <a:rPr lang="en-US" dirty="0"/>
               <a:t>How can we model value to system and for owner</a:t>
             </a:r>
             <a:r>
-              <a:rPr lang="en-US" baseline="0" dirty="0" smtClean="0"/>
+              <a:rPr lang="en-US" baseline="0" dirty="0"/>
               <a:t> to alleviate any concerns.</a:t>
             </a:r>
-            <a:endParaRPr lang="en-US" dirty="0" smtClean="0"/>
-          </a:p>
-          <a:p>
-            <a:r>
-              <a:rPr lang="en-US" dirty="0" smtClean="0"/>
+            <a:endParaRPr lang="en-US" dirty="0"/>
+          </a:p>
+          <a:p>
+            <a:r>
+              <a:rPr lang="en-US" dirty="0"/>
               <a:t>Price taker model (described herein)</a:t>
             </a:r>
           </a:p>
@@ -719,7 +747,7 @@
               <a:buChar char="•"/>
             </a:pPr>
             <a:r>
-              <a:rPr lang="en-US" dirty="0" smtClean="0"/>
+              <a:rPr lang="en-US" dirty="0"/>
               <a:t>Uses market data</a:t>
             </a:r>
           </a:p>
@@ -729,7 +757,7 @@
               <a:buChar char="•"/>
             </a:pPr>
             <a:r>
-              <a:rPr lang="en-US" dirty="0" smtClean="0"/>
+              <a:rPr lang="en-US" dirty="0"/>
               <a:t>Takes minutes to run</a:t>
             </a:r>
           </a:p>
@@ -739,21 +767,21 @@
               <a:buChar char="•"/>
             </a:pPr>
             <a:r>
-              <a:rPr lang="en-US" dirty="0" smtClean="0"/>
+              <a:rPr lang="en-US" dirty="0"/>
               <a:t>Assumes units do not affect grid operation (price suppression</a:t>
             </a:r>
             <a:r>
-              <a:rPr lang="en-US" baseline="0" dirty="0" smtClean="0"/>
+              <a:rPr lang="en-US" baseline="0" dirty="0"/>
               <a:t> effect)</a:t>
             </a:r>
-            <a:endParaRPr lang="en-US" dirty="0" smtClean="0"/>
-          </a:p>
-          <a:p>
-            <a:endParaRPr lang="en-US" dirty="0" smtClean="0"/>
-          </a:p>
-          <a:p>
-            <a:r>
-              <a:rPr lang="en-US" dirty="0" smtClean="0"/>
+            <a:endParaRPr lang="en-US" dirty="0"/>
+          </a:p>
+          <a:p>
+            <a:endParaRPr lang="en-US" dirty="0"/>
+          </a:p>
+          <a:p>
+            <a:r>
+              <a:rPr lang="en-US" dirty="0"/>
               <a:t>Production Cost model</a:t>
             </a:r>
           </a:p>
@@ -763,7 +791,7 @@
               <a:buChar char="•"/>
             </a:pPr>
             <a:r>
-              <a:rPr lang="en-US" dirty="0" smtClean="0"/>
+              <a:rPr lang="en-US" dirty="0"/>
               <a:t>Reconstructs electricity markets</a:t>
             </a:r>
           </a:p>
@@ -773,7 +801,7 @@
               <a:buChar char="•"/>
             </a:pPr>
             <a:r>
-              <a:rPr lang="en-US" dirty="0" smtClean="0"/>
+              <a:rPr lang="en-US" dirty="0"/>
               <a:t>Takes hours, days or weeks to run</a:t>
             </a:r>
           </a:p>
@@ -783,7 +811,7 @@
               <a:buChar char="•"/>
             </a:pPr>
             <a:r>
-              <a:rPr lang="en-US" dirty="0" smtClean="0"/>
+              <a:rPr lang="en-US" dirty="0"/>
               <a:t>Can determine how units affect grid operation</a:t>
             </a:r>
           </a:p>
@@ -874,18 +902,18 @@
           <a:lstStyle/>
           <a:p>
             <a:r>
-              <a:rPr lang="en-US" dirty="0" smtClean="0"/>
+              <a:rPr lang="en-US" dirty="0"/>
               <a:t>How can we model value to system and for owner</a:t>
             </a:r>
             <a:r>
-              <a:rPr lang="en-US" baseline="0" dirty="0" smtClean="0"/>
+              <a:rPr lang="en-US" baseline="0" dirty="0"/>
               <a:t> to alleviate any concerns.</a:t>
             </a:r>
-            <a:endParaRPr lang="en-US" dirty="0" smtClean="0"/>
-          </a:p>
-          <a:p>
-            <a:r>
-              <a:rPr lang="en-US" dirty="0" smtClean="0"/>
+            <a:endParaRPr lang="en-US" dirty="0"/>
+          </a:p>
+          <a:p>
+            <a:r>
+              <a:rPr lang="en-US" dirty="0"/>
               <a:t>Price taker model (described herein)</a:t>
             </a:r>
           </a:p>
@@ -895,7 +923,7 @@
               <a:buChar char="•"/>
             </a:pPr>
             <a:r>
-              <a:rPr lang="en-US" dirty="0" smtClean="0"/>
+              <a:rPr lang="en-US" dirty="0"/>
               <a:t>Uses market data</a:t>
             </a:r>
           </a:p>
@@ -905,7 +933,7 @@
               <a:buChar char="•"/>
             </a:pPr>
             <a:r>
-              <a:rPr lang="en-US" dirty="0" smtClean="0"/>
+              <a:rPr lang="en-US" dirty="0"/>
               <a:t>Takes minutes to run</a:t>
             </a:r>
           </a:p>
@@ -915,21 +943,21 @@
               <a:buChar char="•"/>
             </a:pPr>
             <a:r>
-              <a:rPr lang="en-US" dirty="0" smtClean="0"/>
+              <a:rPr lang="en-US" dirty="0"/>
               <a:t>Assumes units do not affect grid operation (price suppression</a:t>
             </a:r>
             <a:r>
-              <a:rPr lang="en-US" baseline="0" dirty="0" smtClean="0"/>
+              <a:rPr lang="en-US" baseline="0" dirty="0"/>
               <a:t> effect)</a:t>
             </a:r>
-            <a:endParaRPr lang="en-US" dirty="0" smtClean="0"/>
-          </a:p>
-          <a:p>
-            <a:endParaRPr lang="en-US" dirty="0" smtClean="0"/>
-          </a:p>
-          <a:p>
-            <a:r>
-              <a:rPr lang="en-US" dirty="0" smtClean="0"/>
+            <a:endParaRPr lang="en-US" dirty="0"/>
+          </a:p>
+          <a:p>
+            <a:endParaRPr lang="en-US" dirty="0"/>
+          </a:p>
+          <a:p>
+            <a:r>
+              <a:rPr lang="en-US" dirty="0"/>
               <a:t>Production Cost model</a:t>
             </a:r>
           </a:p>
@@ -939,7 +967,7 @@
               <a:buChar char="•"/>
             </a:pPr>
             <a:r>
-              <a:rPr lang="en-US" dirty="0" smtClean="0"/>
+              <a:rPr lang="en-US" dirty="0"/>
               <a:t>Reconstructs electricity markets</a:t>
             </a:r>
           </a:p>
@@ -949,7 +977,7 @@
               <a:buChar char="•"/>
             </a:pPr>
             <a:r>
-              <a:rPr lang="en-US" dirty="0" smtClean="0"/>
+              <a:rPr lang="en-US" dirty="0"/>
               <a:t>Takes hours, days or weeks to run</a:t>
             </a:r>
           </a:p>
@@ -959,7 +987,7 @@
               <a:buChar char="•"/>
             </a:pPr>
             <a:r>
-              <a:rPr lang="en-US" dirty="0" smtClean="0"/>
+              <a:rPr lang="en-US" dirty="0"/>
               <a:t>Can determine how units affect grid operation</a:t>
             </a:r>
           </a:p>
@@ -1050,18 +1078,18 @@
           <a:lstStyle/>
           <a:p>
             <a:r>
-              <a:rPr lang="en-US" dirty="0" smtClean="0"/>
+              <a:rPr lang="en-US" dirty="0"/>
               <a:t>How can we model value to system and for owner</a:t>
             </a:r>
             <a:r>
-              <a:rPr lang="en-US" baseline="0" dirty="0" smtClean="0"/>
+              <a:rPr lang="en-US" baseline="0" dirty="0"/>
               <a:t> to alleviate any concerns.</a:t>
             </a:r>
-            <a:endParaRPr lang="en-US" dirty="0" smtClean="0"/>
-          </a:p>
-          <a:p>
-            <a:r>
-              <a:rPr lang="en-US" dirty="0" smtClean="0"/>
+            <a:endParaRPr lang="en-US" dirty="0"/>
+          </a:p>
+          <a:p>
+            <a:r>
+              <a:rPr lang="en-US" dirty="0"/>
               <a:t>Price taker model (described herein)</a:t>
             </a:r>
           </a:p>
@@ -1071,7 +1099,7 @@
               <a:buChar char="•"/>
             </a:pPr>
             <a:r>
-              <a:rPr lang="en-US" dirty="0" smtClean="0"/>
+              <a:rPr lang="en-US" dirty="0"/>
               <a:t>Uses market data</a:t>
             </a:r>
           </a:p>
@@ -1081,7 +1109,7 @@
               <a:buChar char="•"/>
             </a:pPr>
             <a:r>
-              <a:rPr lang="en-US" dirty="0" smtClean="0"/>
+              <a:rPr lang="en-US" dirty="0"/>
               <a:t>Takes minutes to run</a:t>
             </a:r>
           </a:p>
@@ -1091,21 +1119,21 @@
               <a:buChar char="•"/>
             </a:pPr>
             <a:r>
-              <a:rPr lang="en-US" dirty="0" smtClean="0"/>
+              <a:rPr lang="en-US" dirty="0"/>
               <a:t>Assumes units do not affect grid operation (price suppression</a:t>
             </a:r>
             <a:r>
-              <a:rPr lang="en-US" baseline="0" dirty="0" smtClean="0"/>
+              <a:rPr lang="en-US" baseline="0" dirty="0"/>
               <a:t> effect)</a:t>
             </a:r>
-            <a:endParaRPr lang="en-US" dirty="0" smtClean="0"/>
-          </a:p>
-          <a:p>
-            <a:endParaRPr lang="en-US" dirty="0" smtClean="0"/>
-          </a:p>
-          <a:p>
-            <a:r>
-              <a:rPr lang="en-US" dirty="0" smtClean="0"/>
+            <a:endParaRPr lang="en-US" dirty="0"/>
+          </a:p>
+          <a:p>
+            <a:endParaRPr lang="en-US" dirty="0"/>
+          </a:p>
+          <a:p>
+            <a:r>
+              <a:rPr lang="en-US" dirty="0"/>
               <a:t>Production Cost model</a:t>
             </a:r>
           </a:p>
@@ -1115,7 +1143,7 @@
               <a:buChar char="•"/>
             </a:pPr>
             <a:r>
-              <a:rPr lang="en-US" dirty="0" smtClean="0"/>
+              <a:rPr lang="en-US" dirty="0"/>
               <a:t>Reconstructs electricity markets</a:t>
             </a:r>
           </a:p>
@@ -1125,7 +1153,7 @@
               <a:buChar char="•"/>
             </a:pPr>
             <a:r>
-              <a:rPr lang="en-US" dirty="0" smtClean="0"/>
+              <a:rPr lang="en-US" dirty="0"/>
               <a:t>Takes hours, days or weeks to run</a:t>
             </a:r>
           </a:p>
@@ -1135,7 +1163,7 @@
               <a:buChar char="•"/>
             </a:pPr>
             <a:r>
-              <a:rPr lang="en-US" dirty="0" smtClean="0"/>
+              <a:rPr lang="en-US" dirty="0"/>
               <a:t>Can determine how units affect grid operation</a:t>
             </a:r>
           </a:p>
@@ -1356,7 +1384,7 @@
           <a:lstStyle/>
           <a:p>
             <a:r>
-              <a:rPr lang="en-US" sz="1000" dirty="0" smtClean="0">
+              <a:rPr lang="en-US" sz="1000" dirty="0">
                 <a:solidFill>
                   <a:schemeClr val="tx2"/>
                 </a:solidFill>
@@ -1364,7 +1392,7 @@
               <a:t>NREL is a national laboratory of the U.S. Department of Energy, Office of Energy Efficiency and Renewable Energy, operated</a:t>
             </a:r>
             <a:r>
-              <a:rPr lang="en-US" sz="1000" baseline="0" dirty="0" smtClean="0">
+              <a:rPr lang="en-US" sz="1000" baseline="0" dirty="0">
                 <a:solidFill>
                   <a:schemeClr val="tx2"/>
                 </a:solidFill>
@@ -1412,7 +1440,7 @@
           <a:p>
             <a:pPr lvl="0"/>
             <a:r>
-              <a:rPr lang="en-US" dirty="0" smtClean="0"/>
+              <a:rPr lang="en-US" dirty="0"/>
               <a:t>Click to edit Master title Style</a:t>
             </a:r>
           </a:p>
@@ -1454,7 +1482,7 @@
           <a:p>
             <a:pPr lvl="0"/>
             <a:r>
-              <a:rPr lang="en-US" dirty="0" smtClean="0"/>
+              <a:rPr lang="en-US" dirty="0"/>
               <a:t>Click to edit Master subtitle style </a:t>
             </a:r>
           </a:p>
@@ -1773,7 +1801,7 @@
           <a:p>
             <a:pPr lvl="0"/>
             <a:r>
-              <a:rPr lang="en-US" dirty="0" smtClean="0"/>
+              <a:rPr lang="en-US" dirty="0"/>
               <a:t>Click to edit Master title Style</a:t>
             </a:r>
           </a:p>
@@ -1831,7 +1859,7 @@
           </a:lstStyle>
           <a:p>
             <a:r>
-              <a:rPr lang="en-US" smtClean="0"/>
+              <a:rPr lang="en-US"/>
               <a:t>Click to edit Master title style</a:t>
             </a:r>
             <a:endParaRPr lang="en-US" dirty="0"/>
@@ -1877,35 +1905,35 @@
           <a:p>
             <a:pPr lvl="0"/>
             <a:r>
-              <a:rPr lang="en-US" smtClean="0"/>
+              <a:rPr lang="en-US"/>
               <a:t>Click to edit Master text styles</a:t>
             </a:r>
           </a:p>
           <a:p>
             <a:pPr lvl="1"/>
             <a:r>
-              <a:rPr lang="en-US" smtClean="0"/>
+              <a:rPr lang="en-US"/>
               <a:t>Second level</a:t>
             </a:r>
           </a:p>
           <a:p>
             <a:pPr lvl="2"/>
             <a:r>
-              <a:rPr lang="en-US" smtClean="0"/>
+              <a:rPr lang="en-US"/>
               <a:t>Third level</a:t>
             </a:r>
           </a:p>
           <a:p>
             <a:pPr lvl="3"/>
             <a:r>
-              <a:rPr lang="en-US" smtClean="0"/>
+              <a:rPr lang="en-US"/>
               <a:t>Fourth level</a:t>
             </a:r>
           </a:p>
           <a:p>
             <a:pPr lvl="4"/>
             <a:r>
-              <a:rPr lang="en-US" smtClean="0"/>
+              <a:rPr lang="en-US"/>
               <a:t>Fifth level</a:t>
             </a:r>
             <a:endParaRPr lang="en-US" dirty="0"/>
@@ -1959,7 +1987,7 @@
               <a:tabLst/>
               <a:defRPr/>
             </a:pPr>
-            <a:endParaRPr kumimoji="0" lang="en-US" sz="2200" b="0" i="0" u="none" strike="noStrike" kern="1200" cap="none" spc="0" normalizeH="0" baseline="0" noProof="0" smtClean="0">
+            <a:endParaRPr kumimoji="0" lang="en-US" sz="2200" b="0" i="0" u="none" strike="noStrike" kern="1200" cap="none" spc="0" normalizeH="0" baseline="0" noProof="0">
               <a:ln>
                 <a:noFill/>
               </a:ln>
@@ -2018,7 +2046,7 @@
           <a:lstStyle/>
           <a:p>
             <a:r>
-              <a:rPr lang="en-US" smtClean="0"/>
+              <a:rPr lang="en-US"/>
               <a:t>Click to edit Master title style</a:t>
             </a:r>
             <a:endParaRPr lang="en-US" dirty="0"/>
@@ -2089,35 +2117,35 @@
           <a:p>
             <a:pPr lvl="0"/>
             <a:r>
-              <a:rPr lang="en-US" smtClean="0"/>
+              <a:rPr lang="en-US"/>
               <a:t>Click to edit Master text styles</a:t>
             </a:r>
           </a:p>
           <a:p>
             <a:pPr lvl="1"/>
             <a:r>
-              <a:rPr lang="en-US" smtClean="0"/>
+              <a:rPr lang="en-US"/>
               <a:t>Second level</a:t>
             </a:r>
           </a:p>
           <a:p>
             <a:pPr lvl="2"/>
             <a:r>
-              <a:rPr lang="en-US" smtClean="0"/>
+              <a:rPr lang="en-US"/>
               <a:t>Third level</a:t>
             </a:r>
           </a:p>
           <a:p>
             <a:pPr lvl="3"/>
             <a:r>
-              <a:rPr lang="en-US" smtClean="0"/>
+              <a:rPr lang="en-US"/>
               <a:t>Fourth level</a:t>
             </a:r>
           </a:p>
           <a:p>
             <a:pPr lvl="4"/>
             <a:r>
-              <a:rPr lang="en-US" smtClean="0"/>
+              <a:rPr lang="en-US"/>
               <a:t>Fifth level</a:t>
             </a:r>
             <a:endParaRPr lang="en-US" dirty="0"/>
@@ -2181,35 +2209,35 @@
           <a:p>
             <a:pPr lvl="0"/>
             <a:r>
-              <a:rPr lang="en-US" smtClean="0"/>
+              <a:rPr lang="en-US"/>
               <a:t>Click to edit Master text styles</a:t>
             </a:r>
           </a:p>
           <a:p>
             <a:pPr lvl="1"/>
             <a:r>
-              <a:rPr lang="en-US" smtClean="0"/>
+              <a:rPr lang="en-US"/>
               <a:t>Second level</a:t>
             </a:r>
           </a:p>
           <a:p>
             <a:pPr lvl="2"/>
             <a:r>
-              <a:rPr lang="en-US" smtClean="0"/>
+              <a:rPr lang="en-US"/>
               <a:t>Third level</a:t>
             </a:r>
           </a:p>
           <a:p>
             <a:pPr lvl="3"/>
             <a:r>
-              <a:rPr lang="en-US" smtClean="0"/>
+              <a:rPr lang="en-US"/>
               <a:t>Fourth level</a:t>
             </a:r>
           </a:p>
           <a:p>
             <a:pPr lvl="4"/>
             <a:r>
-              <a:rPr lang="en-US" smtClean="0"/>
+              <a:rPr lang="en-US"/>
               <a:t>Fifth level</a:t>
             </a:r>
             <a:endParaRPr lang="en-US" dirty="0"/>
@@ -2245,7 +2273,7 @@
           <a:p>
             <a:pPr lvl="0"/>
             <a:r>
-              <a:rPr lang="en-US" smtClean="0"/>
+              <a:rPr lang="en-US"/>
               <a:t>Click to edit Master text styles</a:t>
             </a:r>
           </a:p>
@@ -2280,7 +2308,7 @@
           <a:p>
             <a:pPr lvl="0"/>
             <a:r>
-              <a:rPr lang="en-US" smtClean="0"/>
+              <a:rPr lang="en-US"/>
               <a:t>Click to edit Master text styles</a:t>
             </a:r>
           </a:p>
@@ -2327,10 +2355,9 @@
           <a:lstStyle/>
           <a:p>
             <a:r>
-              <a:rPr lang="en-US" smtClean="0"/>
+              <a:rPr lang="en-US"/>
               <a:t>Click to edit Master title style</a:t>
             </a:r>
-            <a:endParaRPr lang="en-US"/>
           </a:p>
         </p:txBody>
       </p:sp>
@@ -2391,35 +2418,35 @@
           <a:p>
             <a:pPr lvl="0"/>
             <a:r>
-              <a:rPr lang="en-US" smtClean="0"/>
+              <a:rPr lang="en-US"/>
               <a:t>Click to edit Master text styles</a:t>
             </a:r>
           </a:p>
           <a:p>
             <a:pPr lvl="1"/>
             <a:r>
-              <a:rPr lang="en-US" smtClean="0"/>
+              <a:rPr lang="en-US"/>
               <a:t>Second level</a:t>
             </a:r>
           </a:p>
           <a:p>
             <a:pPr lvl="2"/>
             <a:r>
-              <a:rPr lang="en-US" smtClean="0"/>
+              <a:rPr lang="en-US"/>
               <a:t>Third level</a:t>
             </a:r>
           </a:p>
           <a:p>
             <a:pPr lvl="3"/>
             <a:r>
-              <a:rPr lang="en-US" smtClean="0"/>
+              <a:rPr lang="en-US"/>
               <a:t>Fourth level</a:t>
             </a:r>
           </a:p>
           <a:p>
             <a:pPr lvl="4"/>
             <a:r>
-              <a:rPr lang="en-US" smtClean="0"/>
+              <a:rPr lang="en-US"/>
               <a:t>Fifth level</a:t>
             </a:r>
             <a:endParaRPr lang="en-US" dirty="0"/>
@@ -2477,7 +2504,7 @@
           <a:p>
             <a:pPr lvl="0"/>
             <a:r>
-              <a:rPr lang="en-US" smtClean="0"/>
+              <a:rPr lang="en-US"/>
               <a:t>Click to edit Master text styles</a:t>
             </a:r>
           </a:p>
@@ -2535,7 +2562,7 @@
           </a:lstStyle>
           <a:p>
             <a:r>
-              <a:rPr lang="en-US" smtClean="0"/>
+              <a:rPr lang="en-US"/>
               <a:t>Click to edit Master title style</a:t>
             </a:r>
             <a:endParaRPr lang="en-US" dirty="0"/>
@@ -2581,35 +2608,35 @@
           <a:p>
             <a:pPr lvl="0"/>
             <a:r>
-              <a:rPr lang="en-US" smtClean="0"/>
+              <a:rPr lang="en-US"/>
               <a:t>Click to edit Master text styles</a:t>
             </a:r>
           </a:p>
           <a:p>
             <a:pPr lvl="1"/>
             <a:r>
-              <a:rPr lang="en-US" smtClean="0"/>
+              <a:rPr lang="en-US"/>
               <a:t>Second level</a:t>
             </a:r>
           </a:p>
           <a:p>
             <a:pPr lvl="2"/>
             <a:r>
-              <a:rPr lang="en-US" smtClean="0"/>
+              <a:rPr lang="en-US"/>
               <a:t>Third level</a:t>
             </a:r>
           </a:p>
           <a:p>
             <a:pPr lvl="3"/>
             <a:r>
-              <a:rPr lang="en-US" smtClean="0"/>
+              <a:rPr lang="en-US"/>
               <a:t>Fourth level</a:t>
             </a:r>
           </a:p>
           <a:p>
             <a:pPr lvl="4"/>
             <a:r>
-              <a:rPr lang="en-US" smtClean="0"/>
+              <a:rPr lang="en-US"/>
               <a:t>Fifth level</a:t>
             </a:r>
             <a:endParaRPr lang="en-US" dirty="0"/>
@@ -2703,10 +2730,9 @@
           <a:lstStyle/>
           <a:p>
             <a:r>
-              <a:rPr lang="en-US" smtClean="0"/>
+              <a:rPr lang="en-US"/>
               <a:t>Click to edit Master title style</a:t>
             </a:r>
-            <a:endParaRPr lang="en-US"/>
           </a:p>
         </p:txBody>
       </p:sp>
@@ -2782,35 +2808,35 @@
           <a:p>
             <a:pPr lvl="0"/>
             <a:r>
-              <a:rPr lang="en-US" smtClean="0"/>
+              <a:rPr lang="en-US"/>
               <a:t>Click to edit Master text styles</a:t>
             </a:r>
           </a:p>
           <a:p>
             <a:pPr lvl="1"/>
             <a:r>
-              <a:rPr lang="en-US" smtClean="0"/>
+              <a:rPr lang="en-US"/>
               <a:t>Second level</a:t>
             </a:r>
           </a:p>
           <a:p>
             <a:pPr lvl="2"/>
             <a:r>
-              <a:rPr lang="en-US" smtClean="0"/>
+              <a:rPr lang="en-US"/>
               <a:t>Third level</a:t>
             </a:r>
           </a:p>
           <a:p>
             <a:pPr lvl="3"/>
             <a:r>
-              <a:rPr lang="en-US" smtClean="0"/>
+              <a:rPr lang="en-US"/>
               <a:t>Fourth level</a:t>
             </a:r>
           </a:p>
           <a:p>
             <a:pPr lvl="4"/>
             <a:r>
-              <a:rPr lang="en-US" smtClean="0"/>
+              <a:rPr lang="en-US"/>
               <a:t>Fifth level</a:t>
             </a:r>
             <a:endParaRPr lang="en-US" dirty="0"/>
@@ -2874,35 +2900,35 @@
           <a:p>
             <a:pPr lvl="0"/>
             <a:r>
-              <a:rPr lang="en-US" smtClean="0"/>
+              <a:rPr lang="en-US"/>
               <a:t>Click to edit Master text styles</a:t>
             </a:r>
           </a:p>
           <a:p>
             <a:pPr lvl="1"/>
             <a:r>
-              <a:rPr lang="en-US" smtClean="0"/>
+              <a:rPr lang="en-US"/>
               <a:t>Second level</a:t>
             </a:r>
           </a:p>
           <a:p>
             <a:pPr lvl="2"/>
             <a:r>
-              <a:rPr lang="en-US" smtClean="0"/>
+              <a:rPr lang="en-US"/>
               <a:t>Third level</a:t>
             </a:r>
           </a:p>
           <a:p>
             <a:pPr lvl="3"/>
             <a:r>
-              <a:rPr lang="en-US" smtClean="0"/>
+              <a:rPr lang="en-US"/>
               <a:t>Fourth level</a:t>
             </a:r>
           </a:p>
           <a:p>
             <a:pPr lvl="4"/>
             <a:r>
-              <a:rPr lang="en-US" smtClean="0"/>
+              <a:rPr lang="en-US"/>
               <a:t>Fifth level</a:t>
             </a:r>
             <a:endParaRPr lang="en-US" dirty="0"/>
@@ -2984,7 +3010,7 @@
           <a:p>
             <a:pPr lvl="0"/>
             <a:r>
-              <a:rPr lang="en-US" smtClean="0"/>
+              <a:rPr lang="en-US"/>
               <a:t>Click to edit Master text styles</a:t>
             </a:r>
           </a:p>
@@ -3019,7 +3045,7 @@
           <a:p>
             <a:pPr lvl="0"/>
             <a:r>
-              <a:rPr lang="en-US" smtClean="0"/>
+              <a:rPr lang="en-US"/>
               <a:t>Click to edit Master text styles</a:t>
             </a:r>
           </a:p>
@@ -3066,10 +3092,9 @@
           <a:lstStyle/>
           <a:p>
             <a:r>
-              <a:rPr lang="en-US" smtClean="0"/>
+              <a:rPr lang="en-US"/>
               <a:t>Click to edit Master title style</a:t>
             </a:r>
-            <a:endParaRPr lang="en-US"/>
           </a:p>
         </p:txBody>
       </p:sp>
@@ -3130,35 +3155,35 @@
           <a:p>
             <a:pPr lvl="0"/>
             <a:r>
-              <a:rPr lang="en-US" smtClean="0"/>
+              <a:rPr lang="en-US"/>
               <a:t>Click to edit Master text styles</a:t>
             </a:r>
           </a:p>
           <a:p>
             <a:pPr lvl="1"/>
             <a:r>
-              <a:rPr lang="en-US" smtClean="0"/>
+              <a:rPr lang="en-US"/>
               <a:t>Second level</a:t>
             </a:r>
           </a:p>
           <a:p>
             <a:pPr lvl="2"/>
             <a:r>
-              <a:rPr lang="en-US" smtClean="0"/>
+              <a:rPr lang="en-US"/>
               <a:t>Third level</a:t>
             </a:r>
           </a:p>
           <a:p>
             <a:pPr lvl="3"/>
             <a:r>
-              <a:rPr lang="en-US" smtClean="0"/>
+              <a:rPr lang="en-US"/>
               <a:t>Fourth level</a:t>
             </a:r>
           </a:p>
           <a:p>
             <a:pPr lvl="4"/>
             <a:r>
-              <a:rPr lang="en-US" smtClean="0"/>
+              <a:rPr lang="en-US"/>
               <a:t>Fifth level</a:t>
             </a:r>
             <a:endParaRPr lang="en-US" dirty="0"/>
@@ -3216,7 +3241,7 @@
           <a:p>
             <a:pPr lvl="0"/>
             <a:r>
-              <a:rPr lang="en-US" smtClean="0"/>
+              <a:rPr lang="en-US"/>
               <a:t>Click to edit Master text styles</a:t>
             </a:r>
           </a:p>
@@ -3318,7 +3343,7 @@
           </a:lstStyle>
           <a:p>
             <a:r>
-              <a:rPr lang="en-US" smtClean="0"/>
+              <a:rPr lang="en-US"/>
               <a:t>Click to edit Master title style</a:t>
             </a:r>
             <a:endParaRPr lang="en-US" dirty="0"/>
@@ -3400,7 +3425,7 @@
           <a:p>
             <a:pPr lvl="0"/>
             <a:r>
-              <a:rPr lang="en-US" smtClean="0"/>
+              <a:rPr lang="en-US"/>
               <a:t>Click to edit Master text styles</a:t>
             </a:r>
           </a:p>
@@ -3465,7 +3490,7 @@
           <a:lstStyle/>
           <a:p>
             <a:r>
-              <a:rPr lang="en-US" smtClean="0"/>
+              <a:rPr lang="en-US"/>
               <a:t>Click to edit Master title style</a:t>
             </a:r>
             <a:endParaRPr lang="en-US" dirty="0"/>
@@ -3499,35 +3524,35 @@
           <a:p>
             <a:pPr lvl="0"/>
             <a:r>
-              <a:rPr lang="en-US" smtClean="0"/>
+              <a:rPr lang="en-US"/>
               <a:t>Click to edit Master text styles</a:t>
             </a:r>
           </a:p>
           <a:p>
             <a:pPr lvl="1"/>
             <a:r>
-              <a:rPr lang="en-US" smtClean="0"/>
+              <a:rPr lang="en-US"/>
               <a:t>Second level</a:t>
             </a:r>
           </a:p>
           <a:p>
             <a:pPr lvl="2"/>
             <a:r>
-              <a:rPr lang="en-US" smtClean="0"/>
+              <a:rPr lang="en-US"/>
               <a:t>Third level</a:t>
             </a:r>
           </a:p>
           <a:p>
             <a:pPr lvl="3"/>
             <a:r>
-              <a:rPr lang="en-US" smtClean="0"/>
+              <a:rPr lang="en-US"/>
               <a:t>Fourth level</a:t>
             </a:r>
           </a:p>
           <a:p>
             <a:pPr lvl="4"/>
             <a:r>
-              <a:rPr lang="en-US" smtClean="0"/>
+              <a:rPr lang="en-US"/>
               <a:t>Fifth level</a:t>
             </a:r>
             <a:endParaRPr lang="en-US" dirty="0"/>
@@ -3581,7 +3606,7 @@
               <a:tabLst/>
               <a:defRPr/>
             </a:pPr>
-            <a:endParaRPr kumimoji="0" lang="en-US" sz="2200" b="0" i="0" u="none" strike="noStrike" kern="1200" cap="none" spc="0" normalizeH="0" baseline="0" noProof="0" smtClean="0">
+            <a:endParaRPr kumimoji="0" lang="en-US" sz="2200" b="0" i="0" u="none" strike="noStrike" kern="1200" cap="none" spc="0" normalizeH="0" baseline="0" noProof="0">
               <a:ln>
                 <a:noFill/>
               </a:ln>
@@ -3692,7 +3717,7 @@
               </a:pPr>
               <a:t>‹#›</a:t>
             </a:fld>
-            <a:endParaRPr lang="en-US" sz="1100" dirty="0" smtClean="0">
+            <a:endParaRPr lang="en-US" sz="1100" dirty="0">
               <a:solidFill>
                 <a:schemeClr val="tx1"/>
               </a:solidFill>
@@ -4033,7 +4058,7 @@
               <a:buChar char="•"/>
             </a:pPr>
             <a:r>
-              <a:rPr lang="en-US" sz="1650" dirty="0" smtClean="0">
+              <a:rPr lang="en-US" sz="1650" dirty="0">
                 <a:solidFill>
                   <a:schemeClr val="bg2"/>
                 </a:solidFill>
@@ -4047,7 +4072,7 @@
               <a:buChar char="•"/>
             </a:pPr>
             <a:r>
-              <a:rPr lang="en-US" sz="1650" dirty="0" smtClean="0">
+              <a:rPr lang="en-US" sz="1650" dirty="0">
                 <a:solidFill>
                   <a:schemeClr val="bg2"/>
                 </a:solidFill>
@@ -4061,7 +4086,7 @@
               <a:buChar char="•"/>
             </a:pPr>
             <a:r>
-              <a:rPr lang="en-US" sz="1650" dirty="0" smtClean="0">
+              <a:rPr lang="en-US" sz="1650" dirty="0">
                 <a:solidFill>
                   <a:schemeClr val="bg2"/>
                 </a:solidFill>
@@ -4075,7 +4100,7 @@
               <a:buChar char="•"/>
             </a:pPr>
             <a:r>
-              <a:rPr lang="en-US" sz="1650" dirty="0" smtClean="0">
+              <a:rPr lang="en-US" sz="1650" dirty="0">
                 <a:solidFill>
                   <a:schemeClr val="bg2"/>
                 </a:solidFill>
@@ -4083,25 +4108,20 @@
               <a:t>Operational </a:t>
             </a:r>
             <a:br>
-              <a:rPr lang="en-US" sz="1650" dirty="0" smtClean="0">
+              <a:rPr lang="en-US" sz="1650" dirty="0">
                 <a:solidFill>
                   <a:schemeClr val="bg2"/>
                 </a:solidFill>
               </a:rPr>
             </a:br>
             <a:r>
-              <a:rPr lang="en-US" sz="1650" dirty="0" smtClean="0">
+              <a:rPr lang="en-US" sz="1650" dirty="0">
                 <a:solidFill>
                   <a:schemeClr val="bg2"/>
                 </a:solidFill>
               </a:rPr>
               <a:t>parameters</a:t>
             </a:r>
-            <a:endParaRPr lang="en-US" sz="1650" dirty="0">
-              <a:solidFill>
-                <a:schemeClr val="bg2"/>
-              </a:solidFill>
-            </a:endParaRPr>
           </a:p>
         </p:txBody>
       </p:sp>
@@ -4199,7 +4219,7 @@
           <a:p>
             <a:pPr algn="ctr"/>
             <a:r>
-              <a:rPr lang="en-US" sz="3000" dirty="0" smtClean="0"/>
+              <a:rPr lang="en-US" sz="3000" dirty="0"/>
               <a:t>Optimization model</a:t>
             </a:r>
           </a:p>
@@ -4228,7 +4248,7 @@
           <a:lstStyle/>
           <a:p>
             <a:r>
-              <a:rPr lang="en-US" dirty="0" smtClean="0">
+              <a:rPr lang="en-US" dirty="0">
                 <a:solidFill>
                   <a:schemeClr val="bg2"/>
                 </a:solidFill>
@@ -4236,14 +4256,14 @@
               <a:t>Profit based on operation </a:t>
             </a:r>
             <a:br>
-              <a:rPr lang="en-US" dirty="0" smtClean="0">
+              <a:rPr lang="en-US" dirty="0">
                 <a:solidFill>
                   <a:schemeClr val="bg2"/>
                 </a:solidFill>
               </a:rPr>
             </a:br>
             <a:r>
-              <a:rPr lang="en-US" dirty="0" smtClean="0">
+              <a:rPr lang="en-US" dirty="0">
                 <a:solidFill>
                   <a:schemeClr val="bg2"/>
                 </a:solidFill>
@@ -4251,7 +4271,7 @@
               <a:t> (arbitrage, AS, H</a:t>
             </a:r>
             <a:r>
-              <a:rPr lang="en-US" baseline="-25000" dirty="0" smtClean="0">
+              <a:rPr lang="en-US" baseline="-25000" dirty="0">
                 <a:solidFill>
                   <a:schemeClr val="bg2"/>
                 </a:solidFill>
@@ -4259,7 +4279,7 @@
               <a:t>2</a:t>
             </a:r>
             <a:r>
-              <a:rPr lang="en-US" dirty="0" smtClean="0">
+              <a:rPr lang="en-US" dirty="0">
                 <a:solidFill>
                   <a:schemeClr val="bg2"/>
                 </a:solidFill>
@@ -4363,7 +4383,7 @@
           <a:p>
             <a:pPr algn="ctr"/>
             <a:r>
-              <a:rPr lang="en-US" sz="3000" dirty="0" smtClean="0"/>
+              <a:rPr lang="en-US" sz="3000" dirty="0"/>
               <a:t>ISO/RTO electricity markets</a:t>
             </a:r>
           </a:p>
@@ -4449,7 +4469,7 @@
           <a:lstStyle/>
           <a:p>
             <a:r>
-              <a:rPr lang="en-US" sz="1650" dirty="0" smtClean="0">
+              <a:rPr lang="en-US" sz="1650" dirty="0">
                 <a:solidFill>
                   <a:schemeClr val="bg2"/>
                 </a:solidFill>
@@ -4459,7 +4479,7 @@
           </a:p>
           <a:p>
             <a:r>
-              <a:rPr lang="en-US" sz="1650" dirty="0" smtClean="0">
+              <a:rPr lang="en-US" sz="1650" dirty="0">
                 <a:solidFill>
                   <a:schemeClr val="bg2"/>
                 </a:solidFill>
@@ -4549,7 +4569,7 @@
           <a:lstStyle/>
           <a:p>
             <a:r>
-              <a:rPr lang="en-US" sz="1650" dirty="0" smtClean="0">
+              <a:rPr lang="en-US" sz="1650" dirty="0">
                 <a:solidFill>
                   <a:schemeClr val="bg2"/>
                 </a:solidFill>
@@ -4559,7 +4579,7 @@
           </a:p>
           <a:p>
             <a:r>
-              <a:rPr lang="en-US" sz="1650" dirty="0" smtClean="0">
+              <a:rPr lang="en-US" sz="1650" dirty="0">
                 <a:solidFill>
                   <a:schemeClr val="bg2"/>
                 </a:solidFill>
@@ -4606,7 +4626,7 @@
           <a:p>
             <a:pPr algn="ctr"/>
             <a:r>
-              <a:rPr lang="en-US" sz="3000" dirty="0" smtClean="0"/>
+              <a:rPr lang="en-US" sz="3000" dirty="0"/>
               <a:t>Utility Service</a:t>
             </a:r>
           </a:p>
@@ -4622,13 +4642,6 @@
   <p:clrMapOvr>
     <a:masterClrMapping/>
   </p:clrMapOvr>
-  <p:timing>
-    <p:tnLst>
-      <p:par>
-        <p:cTn id="1" dur="indefinite" restart="never" nodeType="tmRoot"/>
-      </p:par>
-    </p:tnLst>
-  </p:timing>
 </p:sld>
 </file>
 
@@ -4729,7 +4742,7 @@
           <a:lstStyle/>
           <a:p>
             <a:r>
-              <a:rPr lang="en-US" sz="1650" dirty="0" smtClean="0">
+              <a:rPr lang="en-US" sz="1650" dirty="0">
                 <a:solidFill>
                   <a:schemeClr val="bg2"/>
                 </a:solidFill>
@@ -4819,7 +4832,7 @@
           <a:lstStyle/>
           <a:p>
             <a:r>
-              <a:rPr lang="en-US" sz="1650" dirty="0" smtClean="0">
+              <a:rPr lang="en-US" sz="1650" dirty="0">
                 <a:solidFill>
                   <a:schemeClr val="bg2"/>
                 </a:solidFill>
@@ -4909,7 +4922,7 @@
           <a:lstStyle/>
           <a:p>
             <a:r>
-              <a:rPr lang="en-US" sz="1650" dirty="0" smtClean="0">
+              <a:rPr lang="en-US" sz="1650" dirty="0">
                 <a:solidFill>
                   <a:schemeClr val="bg2"/>
                 </a:solidFill>
@@ -4999,7 +5012,7 @@
           <a:lstStyle/>
           <a:p>
             <a:r>
-              <a:rPr lang="en-US" sz="1650" dirty="0" smtClean="0">
+              <a:rPr lang="en-US" sz="1650" dirty="0">
                 <a:solidFill>
                   <a:schemeClr val="bg2"/>
                 </a:solidFill>
@@ -5089,7 +5102,7 @@
           <a:lstStyle/>
           <a:p>
             <a:r>
-              <a:rPr lang="en-US" sz="1650" dirty="0" smtClean="0">
+              <a:rPr lang="en-US" sz="1650" dirty="0">
                 <a:solidFill>
                   <a:schemeClr val="bg2"/>
                 </a:solidFill>
@@ -5179,7 +5192,7 @@
           <a:lstStyle/>
           <a:p>
             <a:r>
-              <a:rPr lang="en-US" sz="1650" dirty="0" smtClean="0">
+              <a:rPr lang="en-US" sz="1650" dirty="0">
                 <a:solidFill>
                   <a:schemeClr val="bg2"/>
                 </a:solidFill>
@@ -5228,7 +5241,7 @@
           <a:p>
             <a:pPr algn="ctr"/>
             <a:r>
-              <a:rPr lang="en-US" sz="2800" dirty="0" smtClean="0"/>
+              <a:rPr lang="en-US" sz="2800" dirty="0"/>
               <a:t>Utility Service</a:t>
             </a:r>
           </a:p>
@@ -5359,7 +5372,7 @@
           <a:lstStyle/>
           <a:p>
             <a:r>
-              <a:rPr lang="en-US" sz="1650" dirty="0" smtClean="0">
+              <a:rPr lang="en-US" sz="1650" dirty="0">
                 <a:solidFill>
                   <a:schemeClr val="bg2"/>
                 </a:solidFill>
@@ -5449,7 +5462,7 @@
           <a:lstStyle/>
           <a:p>
             <a:r>
-              <a:rPr lang="en-US" sz="1600" dirty="0" smtClean="0">
+              <a:rPr lang="en-US" sz="1600" dirty="0">
                 <a:solidFill>
                   <a:schemeClr val="bg2"/>
                 </a:solidFill>
@@ -5498,10 +5511,9 @@
           <a:p>
             <a:pPr algn="ctr"/>
             <a:r>
-              <a:rPr lang="en-US" sz="2800" dirty="0" smtClean="0"/>
+              <a:rPr lang="en-US" sz="2800" dirty="0"/>
               <a:t>Other Inputs</a:t>
             </a:r>
-            <a:endParaRPr lang="en-US" sz="2800" dirty="0"/>
           </a:p>
         </p:txBody>
       </p:sp>
@@ -5528,7 +5540,7 @@
           <a:lstStyle/>
           <a:p>
             <a:r>
-              <a:rPr lang="en-US" sz="2000" b="1" dirty="0" smtClean="0">
+              <a:rPr lang="en-US" sz="2000" b="1" dirty="0">
                 <a:solidFill>
                   <a:schemeClr val="bg2"/>
                 </a:solidFill>
@@ -5561,7 +5573,7 @@
           <a:lstStyle/>
           <a:p>
             <a:r>
-              <a:rPr lang="en-US" sz="2000" b="1" dirty="0" smtClean="0">
+              <a:rPr lang="en-US" sz="2000" b="1" dirty="0">
                 <a:solidFill>
                   <a:schemeClr val="bg2"/>
                 </a:solidFill>
@@ -5595,7 +5607,7 @@
           <a:p>
             <a:pPr algn="ctr"/>
             <a:r>
-              <a:rPr lang="en-US" sz="2000" b="1" dirty="0" smtClean="0">
+              <a:rPr lang="en-US" sz="2000" b="1" dirty="0">
                 <a:solidFill>
                   <a:schemeClr val="bg2"/>
                 </a:solidFill>
@@ -5685,7 +5697,7 @@
           <a:lstStyle/>
           <a:p>
             <a:r>
-              <a:rPr lang="en-US" sz="1650" dirty="0" smtClean="0">
+              <a:rPr lang="en-US" sz="1650" dirty="0">
                 <a:solidFill>
                   <a:schemeClr val="bg2"/>
                 </a:solidFill>
@@ -5695,7 +5707,7 @@
           </a:p>
           <a:p>
             <a:r>
-              <a:rPr lang="en-US" sz="1650" dirty="0" smtClean="0">
+              <a:rPr lang="en-US" sz="1650" dirty="0">
                 <a:solidFill>
                   <a:schemeClr val="bg2"/>
                 </a:solidFill>
@@ -5704,7 +5716,7 @@
             </a:r>
           </a:p>
           <a:p>
-            <a:endParaRPr lang="en-US" sz="800" dirty="0" smtClean="0">
+            <a:endParaRPr lang="en-US" sz="800" dirty="0">
               <a:solidFill>
                 <a:schemeClr val="bg2"/>
               </a:solidFill>
@@ -5712,7 +5724,7 @@
           </a:p>
           <a:p>
             <a:r>
-              <a:rPr lang="en-US" sz="1650" dirty="0" smtClean="0">
+              <a:rPr lang="en-US" sz="1650" dirty="0">
                 <a:solidFill>
                   <a:schemeClr val="bg2"/>
                 </a:solidFill>
@@ -5721,14 +5733,14 @@
             </a:r>
           </a:p>
           <a:p>
-            <a:endParaRPr lang="en-US" sz="1650" dirty="0" smtClean="0">
+            <a:endParaRPr lang="en-US" sz="1650" dirty="0">
               <a:solidFill>
                 <a:schemeClr val="bg2"/>
               </a:solidFill>
             </a:endParaRPr>
           </a:p>
           <a:p>
-            <a:endParaRPr lang="en-US" sz="1650" dirty="0" smtClean="0">
+            <a:endParaRPr lang="en-US" sz="1650" dirty="0">
               <a:solidFill>
                 <a:schemeClr val="bg2"/>
               </a:solidFill>
@@ -5760,7 +5772,7 @@
           <a:p>
             <a:pPr algn="ctr"/>
             <a:r>
-              <a:rPr lang="en-US" sz="2000" b="1" dirty="0" smtClean="0">
+              <a:rPr lang="en-US" sz="2000" b="1" dirty="0">
                 <a:solidFill>
                   <a:schemeClr val="bg2"/>
                 </a:solidFill>
@@ -5810,25 +5822,21 @@
             <a:pPr algn="ctr"/>
             <a:r>
               <a:rPr lang="en-US" sz="2800" dirty="0"/>
-              <a:t>Revenue Operation and Device Optimization </a:t>
-            </a:r>
-            <a:r>
-              <a:rPr lang="en-US" sz="2800" dirty="0" smtClean="0"/>
-              <a:t>Model</a:t>
+              <a:t>Revenue Operation and Device Optimization Model</a:t>
             </a:r>
           </a:p>
           <a:p>
             <a:pPr algn="ctr"/>
             <a:r>
-              <a:rPr lang="en-US" sz="2800" dirty="0" smtClean="0"/>
+              <a:rPr lang="en-US" sz="2800" dirty="0"/>
               <a:t>(</a:t>
             </a:r>
             <a:r>
-              <a:rPr lang="en-US" sz="2800" dirty="0" err="1" smtClean="0"/>
+              <a:rPr lang="en-US" sz="2800" dirty="0" err="1"/>
               <a:t>RODeO</a:t>
             </a:r>
             <a:r>
-              <a:rPr lang="en-US" sz="2800" dirty="0" smtClean="0"/>
+              <a:rPr lang="en-US" sz="2800" dirty="0"/>
               <a:t>)</a:t>
             </a:r>
           </a:p>
@@ -5844,13 +5852,6 @@
   <p:clrMapOvr>
     <a:masterClrMapping/>
   </p:clrMapOvr>
-  <p:timing>
-    <p:tnLst>
-      <p:par>
-        <p:cTn id="1" dur="indefinite" restart="never" nodeType="tmRoot"/>
-      </p:par>
-    </p:tnLst>
-  </p:timing>
 </p:sld>
 </file>
 
@@ -5951,7 +5952,7 @@
           <a:lstStyle/>
           <a:p>
             <a:r>
-              <a:rPr lang="en-US" sz="1650" dirty="0" smtClean="0">
+              <a:rPr lang="en-US" sz="1650" dirty="0">
                 <a:solidFill>
                   <a:schemeClr val="bg2"/>
                 </a:solidFill>
@@ -6042,7 +6043,7 @@
           <a:p>
             <a:pPr algn="ctr"/>
             <a:r>
-              <a:rPr lang="en-US" sz="1650" dirty="0" smtClean="0">
+              <a:rPr lang="en-US" sz="1650" dirty="0">
                 <a:solidFill>
                   <a:schemeClr val="bg2"/>
                 </a:solidFill>
@@ -6133,7 +6134,7 @@
           <a:p>
             <a:pPr algn="ctr"/>
             <a:r>
-              <a:rPr lang="en-US" sz="1650" dirty="0" smtClean="0">
+              <a:rPr lang="en-US" sz="1650" dirty="0">
                 <a:solidFill>
                   <a:schemeClr val="bg2"/>
                 </a:solidFill>
@@ -6223,7 +6224,7 @@
           <a:lstStyle/>
           <a:p>
             <a:r>
-              <a:rPr lang="en-US" sz="1650" dirty="0" smtClean="0">
+              <a:rPr lang="en-US" sz="1650" dirty="0">
                 <a:solidFill>
                   <a:schemeClr val="bg2"/>
                 </a:solidFill>
@@ -6272,7 +6273,7 @@
           <a:p>
             <a:pPr algn="ctr"/>
             <a:r>
-              <a:rPr lang="en-US" sz="2800" dirty="0" smtClean="0"/>
+              <a:rPr lang="en-US" sz="2800" dirty="0"/>
               <a:t>Cost Inputs</a:t>
             </a:r>
           </a:p>
@@ -6358,7 +6359,7 @@
           <a:lstStyle/>
           <a:p>
             <a:r>
-              <a:rPr lang="en-US" sz="1650" dirty="0" smtClean="0">
+              <a:rPr lang="en-US" sz="1650" dirty="0">
                 <a:solidFill>
                   <a:schemeClr val="bg2"/>
                 </a:solidFill>
@@ -6368,31 +6369,23 @@
           </a:p>
           <a:p>
             <a:r>
-              <a:rPr lang="en-US" sz="1650" dirty="0" smtClean="0">
-                <a:solidFill>
-                  <a:schemeClr val="bg2"/>
-                </a:solidFill>
-              </a:rPr>
-              <a:t>  (</a:t>
-            </a:r>
-            <a:r>
               <a:rPr lang="en-US" sz="1650" dirty="0">
                 <a:solidFill>
                   <a:schemeClr val="bg2"/>
                 </a:solidFill>
               </a:rPr>
-              <a:t>by component)</a:t>
-            </a:r>
-          </a:p>
-          <a:p>
-            <a:endParaRPr lang="en-US" sz="1650" dirty="0" smtClean="0">
+              <a:t>  (by component)</a:t>
+            </a:r>
+          </a:p>
+          <a:p>
+            <a:endParaRPr lang="en-US" sz="1650" dirty="0">
               <a:solidFill>
                 <a:schemeClr val="bg2"/>
               </a:solidFill>
             </a:endParaRPr>
           </a:p>
           <a:p>
-            <a:endParaRPr lang="en-US" sz="1650" dirty="0" smtClean="0">
+            <a:endParaRPr lang="en-US" sz="1650" dirty="0">
               <a:solidFill>
                 <a:schemeClr val="bg2"/>
               </a:solidFill>
@@ -6423,7 +6416,7 @@
           <a:lstStyle/>
           <a:p>
             <a:r>
-              <a:rPr lang="en-US" sz="2000" b="1" dirty="0" smtClean="0">
+              <a:rPr lang="en-US" sz="2000" b="1" dirty="0">
                 <a:solidFill>
                   <a:schemeClr val="bg2"/>
                 </a:solidFill>
@@ -6456,7 +6449,7 @@
           <a:lstStyle/>
           <a:p>
             <a:r>
-              <a:rPr lang="en-US" sz="2000" b="1" dirty="0" smtClean="0">
+              <a:rPr lang="en-US" sz="2000" b="1" dirty="0">
                 <a:solidFill>
                   <a:schemeClr val="bg2"/>
                 </a:solidFill>
@@ -6505,7 +6498,7 @@
           <a:p>
             <a:pPr algn="ctr"/>
             <a:r>
-              <a:rPr lang="en-US" sz="2800" dirty="0" smtClean="0"/>
+              <a:rPr lang="en-US" sz="2800" dirty="0"/>
               <a:t>Cost Model</a:t>
             </a:r>
           </a:p>
@@ -6535,7 +6528,7 @@
           <a:p>
             <a:pPr algn="ctr"/>
             <a:r>
-              <a:rPr lang="en-US" sz="2000" b="1" dirty="0" smtClean="0">
+              <a:rPr lang="en-US" sz="2000" b="1" dirty="0">
                 <a:solidFill>
                   <a:schemeClr val="bg2"/>
                 </a:solidFill>
@@ -6569,7 +6562,7 @@
           <a:p>
             <a:pPr algn="ctr"/>
             <a:r>
-              <a:rPr lang="en-US" sz="2000" b="1" dirty="0" smtClean="0">
+              <a:rPr lang="en-US" sz="2000" b="1" dirty="0">
                 <a:solidFill>
                   <a:schemeClr val="bg2"/>
                 </a:solidFill>
@@ -6659,7 +6652,7 @@
           <a:lstStyle/>
           <a:p>
             <a:r>
-              <a:rPr lang="en-US" sz="1600" dirty="0" smtClean="0">
+              <a:rPr lang="en-US" sz="1600" dirty="0">
                 <a:solidFill>
                   <a:schemeClr val="bg2"/>
                 </a:solidFill>
@@ -6708,10 +6701,9 @@
           <a:p>
             <a:pPr algn="ctr"/>
             <a:r>
-              <a:rPr lang="en-US" sz="2800" dirty="0" smtClean="0"/>
+              <a:rPr lang="en-US" sz="2800" dirty="0"/>
               <a:t>Other Inputs</a:t>
             </a:r>
-            <a:endParaRPr lang="en-US" sz="2800" dirty="0"/>
           </a:p>
         </p:txBody>
       </p:sp>
@@ -6725,13 +6717,6 @@
   <p:clrMapOvr>
     <a:masterClrMapping/>
   </p:clrMapOvr>
-  <p:timing>
-    <p:tnLst>
-      <p:par>
-        <p:cTn id="1" dur="indefinite" restart="never" nodeType="tmRoot"/>
-      </p:par>
-    </p:tnLst>
-  </p:timing>
 </p:sld>
 </file>
 
@@ -7546,7 +7531,7 @@
             <a:p>
               <a:pPr algn="ctr"/>
               <a:r>
-                <a:rPr lang="en-US" sz="2400" dirty="0" smtClean="0">
+                <a:rPr lang="en-US" sz="2400" dirty="0">
                   <a:solidFill>
                     <a:schemeClr val="bg2"/>
                   </a:solidFill>
@@ -7580,7 +7565,7 @@
             <a:p>
               <a:pPr algn="ctr"/>
               <a:r>
-                <a:rPr lang="en-US" sz="2400" dirty="0" smtClean="0">
+                <a:rPr lang="en-US" sz="2400" dirty="0">
                   <a:solidFill>
                     <a:schemeClr val="bg2"/>
                   </a:solidFill>
@@ -7614,7 +7599,7 @@
             <a:p>
               <a:pPr algn="ctr"/>
               <a:r>
-                <a:rPr lang="en-US" sz="2400" dirty="0" smtClean="0">
+                <a:rPr lang="en-US" sz="2400" dirty="0">
                   <a:solidFill>
                     <a:schemeClr val="bg2"/>
                   </a:solidFill>
@@ -7648,7 +7633,7 @@
             <a:p>
               <a:pPr algn="ctr"/>
               <a:r>
-                <a:rPr lang="en-US" sz="2400" dirty="0" smtClean="0">
+                <a:rPr lang="en-US" sz="2400" dirty="0">
                   <a:solidFill>
                     <a:schemeClr val="bg2"/>
                   </a:solidFill>
@@ -7682,7 +7667,7 @@
             <a:p>
               <a:pPr algn="ctr"/>
               <a:r>
-                <a:rPr lang="en-US" sz="2400" dirty="0" smtClean="0">
+                <a:rPr lang="en-US" sz="2400" dirty="0">
                   <a:solidFill>
                     <a:schemeClr val="bg2"/>
                   </a:solidFill>
@@ -7716,7 +7701,7 @@
             <a:p>
               <a:pPr algn="ctr"/>
               <a:r>
-                <a:rPr lang="en-US" sz="2400" dirty="0" smtClean="0">
+                <a:rPr lang="en-US" sz="2400" dirty="0">
                   <a:solidFill>
                     <a:schemeClr val="bg2"/>
                   </a:solidFill>
@@ -7750,7 +7735,7 @@
             <a:p>
               <a:pPr algn="ctr"/>
               <a:r>
-                <a:rPr lang="en-US" sz="2400" dirty="0" smtClean="0">
+                <a:rPr lang="en-US" sz="2400" dirty="0">
                   <a:solidFill>
                     <a:schemeClr val="bg2"/>
                   </a:solidFill>
@@ -7784,7 +7769,7 @@
             <a:p>
               <a:pPr algn="ctr"/>
               <a:r>
-                <a:rPr lang="en-US" sz="2400" dirty="0" smtClean="0">
+                <a:rPr lang="en-US" sz="2400" dirty="0">
                   <a:solidFill>
                     <a:schemeClr val="bg2"/>
                   </a:solidFill>
@@ -7818,7 +7803,7 @@
             <a:p>
               <a:pPr algn="ctr"/>
               <a:r>
-                <a:rPr lang="en-US" sz="2400" dirty="0" smtClean="0">
+                <a:rPr lang="en-US" sz="2400" dirty="0">
                   <a:solidFill>
                     <a:schemeClr val="bg2"/>
                   </a:solidFill>
@@ -7852,7 +7837,7 @@
             <a:p>
               <a:pPr algn="ctr"/>
               <a:r>
-                <a:rPr lang="en-US" sz="2400" dirty="0" smtClean="0">
+                <a:rPr lang="en-US" sz="2400" dirty="0">
                   <a:solidFill>
                     <a:schemeClr val="bg2"/>
                   </a:solidFill>
@@ -7886,7 +7871,7 @@
             <a:p>
               <a:pPr algn="ctr"/>
               <a:r>
-                <a:rPr lang="en-US" sz="2400" dirty="0" smtClean="0">
+                <a:rPr lang="en-US" sz="2400" dirty="0">
                   <a:solidFill>
                     <a:schemeClr val="bg2"/>
                   </a:solidFill>
@@ -7920,7 +7905,7 @@
             <a:p>
               <a:pPr algn="ctr"/>
               <a:r>
-                <a:rPr lang="en-US" sz="2400" dirty="0" smtClean="0">
+                <a:rPr lang="en-US" sz="2400" dirty="0">
                   <a:solidFill>
                     <a:schemeClr val="bg2"/>
                   </a:solidFill>
@@ -7954,7 +7939,7 @@
             <a:p>
               <a:pPr algn="ctr"/>
               <a:r>
-                <a:rPr lang="en-US" sz="2400" dirty="0" smtClean="0">
+                <a:rPr lang="en-US" sz="2400" dirty="0">
                   <a:solidFill>
                     <a:schemeClr val="bg2"/>
                   </a:solidFill>
@@ -8004,7 +7989,7 @@
           <a:p>
             <a:pPr algn="ctr"/>
             <a:r>
-              <a:rPr lang="en-US" sz="2800" dirty="0" smtClean="0"/>
+              <a:rPr lang="en-US" sz="2800" dirty="0"/>
               <a:t>Cost Inputs</a:t>
             </a:r>
           </a:p>
@@ -8049,7 +8034,7 @@
           <a:p>
             <a:pPr algn="ctr"/>
             <a:r>
-              <a:rPr lang="en-US" sz="2800" dirty="0" smtClean="0"/>
+              <a:rPr lang="en-US" sz="2800" dirty="0"/>
               <a:t>Cost Model</a:t>
             </a:r>
           </a:p>
@@ -8094,10 +8079,9 @@
           <a:p>
             <a:pPr algn="ctr"/>
             <a:r>
-              <a:rPr lang="en-US" sz="2800" dirty="0" smtClean="0"/>
+              <a:rPr lang="en-US" sz="2800" dirty="0"/>
               <a:t>Other Inputs</a:t>
             </a:r>
-            <a:endParaRPr lang="en-US" sz="2800" dirty="0"/>
           </a:p>
         </p:txBody>
       </p:sp>
@@ -8140,7 +8124,7 @@
           <a:p>
             <a:pPr algn="ctr"/>
             <a:r>
-              <a:rPr lang="en-US" sz="2800" dirty="0" smtClean="0"/>
+              <a:rPr lang="en-US" sz="2800" dirty="0"/>
               <a:t>Utility Service</a:t>
             </a:r>
           </a:p>
@@ -8230,10 +8214,9 @@
           <a:p>
             <a:pPr algn="ctr"/>
             <a:r>
-              <a:rPr lang="en-US" sz="2800" dirty="0" smtClean="0"/>
+              <a:rPr lang="en-US" sz="2800" dirty="0"/>
               <a:t>Other Inputs</a:t>
             </a:r>
-            <a:endParaRPr lang="en-US" sz="2800" dirty="0"/>
           </a:p>
         </p:txBody>
       </p:sp>
@@ -8260,7 +8243,7 @@
           <a:lstStyle/>
           <a:p>
             <a:r>
-              <a:rPr lang="en-US" sz="2400" b="1" dirty="0" smtClean="0">
+              <a:rPr lang="en-US" sz="2400" b="1" dirty="0">
                 <a:solidFill>
                   <a:schemeClr val="bg2"/>
                 </a:solidFill>
@@ -8293,7 +8276,7 @@
           <a:lstStyle/>
           <a:p>
             <a:r>
-              <a:rPr lang="en-US" sz="2400" b="1" dirty="0" smtClean="0">
+              <a:rPr lang="en-US" sz="2400" b="1" dirty="0">
                 <a:solidFill>
                   <a:schemeClr val="bg2"/>
                 </a:solidFill>
@@ -8327,7 +8310,7 @@
           <a:p>
             <a:pPr algn="ctr"/>
             <a:r>
-              <a:rPr lang="en-US" sz="2400" b="1" dirty="0" smtClean="0">
+              <a:rPr lang="en-US" sz="2400" b="1" dirty="0">
                 <a:solidFill>
                   <a:schemeClr val="bg2"/>
                 </a:solidFill>
@@ -8417,7 +8400,7 @@
           <a:lstStyle/>
           <a:p>
             <a:r>
-              <a:rPr lang="en-US" sz="2400" dirty="0" smtClean="0">
+              <a:rPr lang="en-US" sz="2400" dirty="0">
                 <a:solidFill>
                   <a:schemeClr val="bg2"/>
                 </a:solidFill>
@@ -8427,7 +8410,7 @@
           </a:p>
           <a:p>
             <a:r>
-              <a:rPr lang="en-US" sz="2400" dirty="0" smtClean="0">
+              <a:rPr lang="en-US" sz="2400" dirty="0">
                 <a:solidFill>
                   <a:schemeClr val="bg2"/>
                 </a:solidFill>
@@ -8436,28 +8419,20 @@
             </a:r>
           </a:p>
           <a:p>
-            <a:endParaRPr lang="en-US" sz="400" dirty="0" smtClean="0">
+            <a:endParaRPr lang="en-US" sz="400" dirty="0">
               <a:solidFill>
                 <a:schemeClr val="bg2"/>
               </a:solidFill>
             </a:endParaRPr>
           </a:p>
           <a:p>
-            <a:r>
-              <a:rPr lang="en-US" sz="2400" dirty="0" smtClean="0">
-                <a:solidFill>
-                  <a:schemeClr val="bg2"/>
-                </a:solidFill>
-              </a:rPr>
-              <a:t>Annualized </a:t>
-            </a:r>
             <a:r>
               <a:rPr lang="en-US" sz="2400" dirty="0">
                 <a:solidFill>
                   <a:schemeClr val="bg2"/>
                 </a:solidFill>
               </a:rPr>
-              <a:t>Cost</a:t>
+              <a:t>Annualized Cost</a:t>
             </a:r>
           </a:p>
           <a:p>
@@ -8471,7 +8446,7 @@
             </a:r>
           </a:p>
           <a:p>
-            <a:endParaRPr lang="en-US" sz="400" dirty="0" smtClean="0">
+            <a:endParaRPr lang="en-US" sz="400" dirty="0">
               <a:solidFill>
                 <a:schemeClr val="bg2"/>
               </a:solidFill>
@@ -8479,7 +8454,7 @@
           </a:p>
           <a:p>
             <a:r>
-              <a:rPr lang="en-US" sz="2400" dirty="0" smtClean="0">
+              <a:rPr lang="en-US" sz="2400" dirty="0">
                 <a:solidFill>
                   <a:schemeClr val="bg2"/>
                 </a:solidFill>
@@ -8513,7 +8488,7 @@
           <a:p>
             <a:pPr algn="ctr"/>
             <a:r>
-              <a:rPr lang="en-US" sz="2400" b="1" dirty="0" smtClean="0">
+              <a:rPr lang="en-US" sz="2400" b="1" dirty="0">
                 <a:solidFill>
                   <a:schemeClr val="bg2"/>
                 </a:solidFill>
@@ -8734,25 +8709,21 @@
             <a:pPr algn="ctr"/>
             <a:r>
               <a:rPr lang="en-US" sz="2800" dirty="0"/>
-              <a:t>Revenue Operation and Device Optimization </a:t>
-            </a:r>
-            <a:r>
-              <a:rPr lang="en-US" sz="2800" dirty="0" smtClean="0"/>
-              <a:t>Model</a:t>
+              <a:t>Revenue Operation and Device Optimization Model</a:t>
             </a:r>
           </a:p>
           <a:p>
             <a:pPr algn="ctr"/>
             <a:r>
-              <a:rPr lang="en-US" sz="2800" dirty="0" smtClean="0"/>
+              <a:rPr lang="en-US" sz="2800" dirty="0"/>
               <a:t>(</a:t>
             </a:r>
             <a:r>
-              <a:rPr lang="en-US" sz="2800" dirty="0" err="1" smtClean="0"/>
+              <a:rPr lang="en-US" sz="2800" dirty="0" err="1"/>
               <a:t>RODeO</a:t>
             </a:r>
             <a:r>
-              <a:rPr lang="en-US" sz="2800" dirty="0" smtClean="0"/>
+              <a:rPr lang="en-US" sz="2800" dirty="0"/>
               <a:t>)</a:t>
             </a:r>
           </a:p>
@@ -8781,7 +8752,7 @@
           <a:lstStyle/>
           <a:p>
             <a:r>
-              <a:rPr lang="en-US" sz="2400" dirty="0" smtClean="0">
+              <a:rPr lang="en-US" sz="2400" dirty="0">
                 <a:solidFill>
                   <a:schemeClr val="bg2"/>
                 </a:solidFill>
@@ -8791,7 +8762,7 @@
           </a:p>
           <a:p>
             <a:r>
-              <a:rPr lang="en-US" sz="2400" dirty="0" smtClean="0">
+              <a:rPr lang="en-US" sz="2400" dirty="0">
                 <a:solidFill>
                   <a:schemeClr val="bg2"/>
                 </a:solidFill>
@@ -8823,28 +8794,20 @@
           </a:bodyPr>
           <a:lstStyle/>
           <a:p>
-            <a:endParaRPr lang="en-US" sz="400" dirty="0" smtClean="0">
+            <a:endParaRPr lang="en-US" sz="400" dirty="0">
               <a:solidFill>
                 <a:schemeClr val="bg2"/>
               </a:solidFill>
             </a:endParaRPr>
           </a:p>
           <a:p>
-            <a:r>
-              <a:rPr lang="en-US" sz="2400" dirty="0" smtClean="0">
-                <a:solidFill>
-                  <a:schemeClr val="bg2"/>
-                </a:solidFill>
-              </a:rPr>
-              <a:t>Annualized </a:t>
-            </a:r>
             <a:r>
               <a:rPr lang="en-US" sz="2400" dirty="0">
                 <a:solidFill>
                   <a:schemeClr val="bg2"/>
                 </a:solidFill>
               </a:rPr>
-              <a:t>Cost</a:t>
+              <a:t>Annualized Cost</a:t>
             </a:r>
           </a:p>
           <a:p>
@@ -8854,55 +8817,42 @@
                   <a:schemeClr val="bg2"/>
                 </a:solidFill>
               </a:rPr>
-              <a:t>  (by component</a:t>
-            </a:r>
-            <a:r>
-              <a:rPr lang="en-US" sz="2400" dirty="0" smtClean="0">
-                <a:solidFill>
-                  <a:schemeClr val="bg2"/>
-                </a:solidFill>
-              </a:rPr>
-              <a:t>)</a:t>
-            </a:r>
-            <a:endParaRPr lang="en-US" sz="2400" dirty="0">
+              <a:t>  (by component)</a:t>
+            </a:r>
+          </a:p>
+        </p:txBody>
+      </p:sp>
+      <p:sp>
+        <p:nvSpPr>
+          <p:cNvPr id="52" name="Output"/>
+          <p:cNvSpPr txBox="1"/>
+          <p:nvPr/>
+        </p:nvSpPr>
+        <p:spPr>
+          <a:xfrm>
+            <a:off x="7262288" y="1838980"/>
+            <a:ext cx="2430794" cy="523220"/>
+          </a:xfrm>
+          <a:prstGeom prst="rect">
+            <a:avLst/>
+          </a:prstGeom>
+          <a:noFill/>
+        </p:spPr>
+        <p:txBody>
+          <a:bodyPr wrap="none" rtlCol="0">
+            <a:spAutoFit/>
+          </a:bodyPr>
+          <a:lstStyle/>
+          <a:p>
+            <a:endParaRPr lang="en-US" sz="400" dirty="0">
               <a:solidFill>
                 <a:schemeClr val="bg2"/>
               </a:solidFill>
             </a:endParaRPr>
           </a:p>
-        </p:txBody>
-      </p:sp>
-      <p:sp>
-        <p:nvSpPr>
-          <p:cNvPr id="52" name="Output"/>
-          <p:cNvSpPr txBox="1"/>
-          <p:nvPr/>
-        </p:nvSpPr>
-        <p:spPr>
-          <a:xfrm>
-            <a:off x="7262288" y="1838980"/>
-            <a:ext cx="2430794" cy="523220"/>
-          </a:xfrm>
-          <a:prstGeom prst="rect">
-            <a:avLst/>
-          </a:prstGeom>
-          <a:noFill/>
-        </p:spPr>
-        <p:txBody>
-          <a:bodyPr wrap="none" rtlCol="0">
-            <a:spAutoFit/>
-          </a:bodyPr>
-          <a:lstStyle/>
-          <a:p>
-            <a:endParaRPr lang="en-US" sz="400" dirty="0" smtClean="0">
-              <a:solidFill>
-                <a:schemeClr val="bg2"/>
-              </a:solidFill>
-            </a:endParaRPr>
-          </a:p>
-          <a:p>
-            <a:r>
-              <a:rPr lang="en-US" sz="2400" dirty="0" smtClean="0">
+          <a:p>
+            <a:r>
+              <a:rPr lang="en-US" sz="2400" dirty="0">
                 <a:solidFill>
                   <a:schemeClr val="bg2"/>
                 </a:solidFill>
@@ -9650,7 +9600,7 @@
           <a:p>
             <a:pPr algn="ctr"/>
             <a:r>
-              <a:rPr lang="en-US" sz="2400" dirty="0" smtClean="0">
+              <a:rPr lang="en-US" sz="2400" dirty="0">
                 <a:solidFill>
                   <a:schemeClr val="bg2"/>
                 </a:solidFill>
@@ -9684,7 +9634,7 @@
           <a:p>
             <a:pPr algn="ctr"/>
             <a:r>
-              <a:rPr lang="en-US" sz="2400" dirty="0" smtClean="0">
+              <a:rPr lang="en-US" sz="2400" dirty="0">
                 <a:solidFill>
                   <a:schemeClr val="bg2"/>
                 </a:solidFill>
@@ -9718,7 +9668,7 @@
           <a:p>
             <a:pPr algn="ctr"/>
             <a:r>
-              <a:rPr lang="en-US" sz="2400" dirty="0" smtClean="0">
+              <a:rPr lang="en-US" sz="2400" dirty="0">
                 <a:solidFill>
                   <a:schemeClr val="bg2"/>
                 </a:solidFill>
@@ -9752,7 +9702,7 @@
           <a:p>
             <a:pPr algn="ctr"/>
             <a:r>
-              <a:rPr lang="en-US" sz="2400" dirty="0" smtClean="0">
+              <a:rPr lang="en-US" sz="2400" dirty="0">
                 <a:solidFill>
                   <a:schemeClr val="bg2"/>
                 </a:solidFill>
@@ -9786,7 +9736,7 @@
           <a:p>
             <a:pPr algn="ctr"/>
             <a:r>
-              <a:rPr lang="en-US" sz="2400" dirty="0" smtClean="0">
+              <a:rPr lang="en-US" sz="2400" dirty="0">
                 <a:solidFill>
                   <a:schemeClr val="bg2"/>
                 </a:solidFill>
@@ -9820,20 +9770,12 @@
           <a:p>
             <a:pPr algn="ctr"/>
             <a:r>
-              <a:rPr lang="en-US" sz="2400" dirty="0" smtClean="0">
+              <a:rPr lang="en-US" sz="2400" dirty="0">
                 <a:solidFill>
                   <a:schemeClr val="bg2"/>
                 </a:solidFill>
               </a:rPr>
-              <a:t>Ancillary Service </a:t>
-            </a:r>
-            <a:r>
-              <a:rPr lang="en-US" sz="2400" dirty="0" smtClean="0">
-                <a:solidFill>
-                  <a:schemeClr val="bg2"/>
-                </a:solidFill>
-              </a:rPr>
-              <a:t>Prices</a:t>
+              <a:t>Ancillary Service Prices</a:t>
             </a:r>
           </a:p>
         </p:txBody>
@@ -9862,7 +9804,7 @@
           <a:p>
             <a:pPr algn="ctr"/>
             <a:r>
-              <a:rPr lang="en-US" sz="2400" dirty="0" smtClean="0">
+              <a:rPr lang="en-US" sz="2400" dirty="0">
                 <a:solidFill>
                   <a:schemeClr val="bg2"/>
                 </a:solidFill>
@@ -9896,7 +9838,7 @@
           <a:p>
             <a:pPr algn="ctr"/>
             <a:r>
-              <a:rPr lang="en-US" sz="2400" dirty="0" smtClean="0">
+              <a:rPr lang="en-US" sz="2400" dirty="0">
                 <a:solidFill>
                   <a:schemeClr val="bg2"/>
                 </a:solidFill>
@@ -9930,7 +9872,7 @@
           <a:p>
             <a:pPr algn="ctr"/>
             <a:r>
-              <a:rPr lang="en-US" sz="2400" dirty="0" smtClean="0">
+              <a:rPr lang="en-US" sz="2400" dirty="0">
                 <a:solidFill>
                   <a:schemeClr val="bg2"/>
                 </a:solidFill>
@@ -9964,7 +9906,7 @@
           <a:p>
             <a:pPr algn="ctr"/>
             <a:r>
-              <a:rPr lang="en-US" sz="2400" dirty="0" smtClean="0">
+              <a:rPr lang="en-US" sz="2400" dirty="0">
                 <a:solidFill>
                   <a:schemeClr val="bg2"/>
                 </a:solidFill>
@@ -9998,18 +9940,13 @@
           <a:p>
             <a:pPr algn="ctr"/>
             <a:r>
-              <a:rPr lang="en-US" sz="2400" dirty="0" smtClean="0">
+              <a:rPr lang="en-US" sz="2400" dirty="0">
                 <a:solidFill>
                   <a:schemeClr val="bg2"/>
                 </a:solidFill>
               </a:rPr>
               <a:t>Renewable Power</a:t>
             </a:r>
-            <a:endParaRPr lang="en-US" sz="2400" dirty="0" smtClean="0">
-              <a:solidFill>
-                <a:schemeClr val="bg2"/>
-              </a:solidFill>
-            </a:endParaRPr>
           </a:p>
         </p:txBody>
       </p:sp>
@@ -10151,18 +10088,13 @@
           <a:p>
             <a:pPr algn="ctr"/>
             <a:r>
-              <a:rPr lang="en-US" sz="2400" dirty="0" smtClean="0">
+              <a:rPr lang="en-US" sz="2400" dirty="0">
                 <a:solidFill>
                   <a:schemeClr val="bg2"/>
                 </a:solidFill>
               </a:rPr>
               <a:t>Hydrogen Demand</a:t>
             </a:r>
-            <a:endParaRPr lang="en-US" sz="2400" dirty="0" smtClean="0">
-              <a:solidFill>
-                <a:schemeClr val="bg2"/>
-              </a:solidFill>
-            </a:endParaRPr>
           </a:p>
         </p:txBody>
       </p:sp>
@@ -10190,18 +10122,13 @@
           <a:p>
             <a:pPr algn="ctr"/>
             <a:r>
-              <a:rPr lang="en-US" sz="2400" dirty="0" smtClean="0">
+              <a:rPr lang="en-US" sz="2400" dirty="0">
                 <a:solidFill>
                   <a:schemeClr val="bg2"/>
                 </a:solidFill>
               </a:rPr>
               <a:t>Building Load</a:t>
             </a:r>
-            <a:endParaRPr lang="en-US" sz="2400" dirty="0" smtClean="0">
-              <a:solidFill>
-                <a:schemeClr val="bg2"/>
-              </a:solidFill>
-            </a:endParaRPr>
           </a:p>
         </p:txBody>
       </p:sp>
@@ -10229,7 +10156,7 @@
           <a:p>
             <a:pPr algn="ctr"/>
             <a:r>
-              <a:rPr lang="en-US" sz="2400" dirty="0" smtClean="0">
+              <a:rPr lang="en-US" sz="2400" dirty="0">
                 <a:solidFill>
                   <a:schemeClr val="bg2"/>
                 </a:solidFill>
@@ -10278,7 +10205,7 @@
           <a:p>
             <a:pPr algn="ctr"/>
             <a:r>
-              <a:rPr lang="en-US" sz="2800" dirty="0" smtClean="0"/>
+              <a:rPr lang="en-US" sz="2800" dirty="0"/>
               <a:t>Cost Inputs</a:t>
             </a:r>
           </a:p>
@@ -10323,7 +10250,7 @@
           <a:p>
             <a:pPr algn="ctr"/>
             <a:r>
-              <a:rPr lang="en-US" sz="2800" dirty="0" smtClean="0"/>
+              <a:rPr lang="en-US" sz="2800" dirty="0"/>
               <a:t>Cost Model</a:t>
             </a:r>
           </a:p>
@@ -10368,7 +10295,7 @@
           <a:p>
             <a:pPr algn="ctr"/>
             <a:r>
-              <a:rPr lang="en-US" sz="2800" dirty="0" smtClean="0"/>
+              <a:rPr lang="en-US" sz="2800" dirty="0"/>
               <a:t>Utility Service</a:t>
             </a:r>
           </a:p>
@@ -10458,10 +10385,9 @@
           <a:p>
             <a:pPr algn="ctr"/>
             <a:r>
-              <a:rPr lang="en-US" sz="2800" dirty="0" smtClean="0"/>
+              <a:rPr lang="en-US" sz="2800" dirty="0"/>
               <a:t>Other Inputs</a:t>
             </a:r>
-            <a:endParaRPr lang="en-US" sz="2800" dirty="0"/>
           </a:p>
         </p:txBody>
       </p:sp>
@@ -10488,7 +10414,7 @@
           <a:lstStyle/>
           <a:p>
             <a:r>
-              <a:rPr lang="en-US" sz="2400" b="1" dirty="0" smtClean="0">
+              <a:rPr lang="en-US" sz="2400" b="1" dirty="0">
                 <a:solidFill>
                   <a:schemeClr val="bg2"/>
                 </a:solidFill>
@@ -10521,7 +10447,7 @@
           <a:lstStyle/>
           <a:p>
             <a:r>
-              <a:rPr lang="en-US" sz="2400" b="1" dirty="0" smtClean="0">
+              <a:rPr lang="en-US" sz="2400" b="1" dirty="0">
                 <a:solidFill>
                   <a:schemeClr val="bg2"/>
                 </a:solidFill>
@@ -10555,7 +10481,7 @@
           <a:p>
             <a:pPr algn="ctr"/>
             <a:r>
-              <a:rPr lang="en-US" sz="2400" b="1" dirty="0" smtClean="0">
+              <a:rPr lang="en-US" sz="2400" b="1" dirty="0">
                 <a:solidFill>
                   <a:schemeClr val="bg2"/>
                 </a:solidFill>
@@ -10645,7 +10571,7 @@
           <a:lstStyle/>
           <a:p>
             <a:r>
-              <a:rPr lang="en-US" sz="2400" dirty="0" smtClean="0">
+              <a:rPr lang="en-US" sz="2400" dirty="0">
                 <a:solidFill>
                   <a:schemeClr val="bg2"/>
                 </a:solidFill>
@@ -10655,7 +10581,7 @@
           </a:p>
           <a:p>
             <a:r>
-              <a:rPr lang="en-US" sz="2400" dirty="0" smtClean="0">
+              <a:rPr lang="en-US" sz="2400" dirty="0">
                 <a:solidFill>
                   <a:schemeClr val="bg2"/>
                 </a:solidFill>
@@ -10664,28 +10590,20 @@
             </a:r>
           </a:p>
           <a:p>
-            <a:endParaRPr lang="en-US" sz="400" dirty="0" smtClean="0">
+            <a:endParaRPr lang="en-US" sz="400" dirty="0">
               <a:solidFill>
                 <a:schemeClr val="bg2"/>
               </a:solidFill>
             </a:endParaRPr>
           </a:p>
           <a:p>
-            <a:r>
-              <a:rPr lang="en-US" sz="2400" dirty="0" smtClean="0">
-                <a:solidFill>
-                  <a:schemeClr val="bg2"/>
-                </a:solidFill>
-              </a:rPr>
-              <a:t>Annualized </a:t>
-            </a:r>
             <a:r>
               <a:rPr lang="en-US" sz="2400" dirty="0">
                 <a:solidFill>
                   <a:schemeClr val="bg2"/>
                 </a:solidFill>
               </a:rPr>
-              <a:t>Cost</a:t>
+              <a:t>Annualized Cost</a:t>
             </a:r>
           </a:p>
           <a:p>
@@ -10699,7 +10617,7 @@
             </a:r>
           </a:p>
           <a:p>
-            <a:endParaRPr lang="en-US" sz="400" dirty="0" smtClean="0">
+            <a:endParaRPr lang="en-US" sz="400" dirty="0">
               <a:solidFill>
                 <a:schemeClr val="bg2"/>
               </a:solidFill>
@@ -10707,7 +10625,7 @@
           </a:p>
           <a:p>
             <a:r>
-              <a:rPr lang="en-US" sz="2400" dirty="0" smtClean="0">
+              <a:rPr lang="en-US" sz="2400" dirty="0">
                 <a:solidFill>
                   <a:schemeClr val="bg2"/>
                 </a:solidFill>
@@ -10741,7 +10659,7 @@
           <a:p>
             <a:pPr algn="ctr"/>
             <a:r>
-              <a:rPr lang="en-US" sz="2400" b="1" dirty="0" smtClean="0">
+              <a:rPr lang="en-US" sz="2400" b="1" dirty="0">
                 <a:solidFill>
                   <a:schemeClr val="bg2"/>
                 </a:solidFill>
@@ -10962,25 +10880,21 @@
             <a:pPr algn="ctr"/>
             <a:r>
               <a:rPr lang="en-US" sz="2800" dirty="0"/>
-              <a:t>Revenue Operation and Device Optimization </a:t>
-            </a:r>
-            <a:r>
-              <a:rPr lang="en-US" sz="2800" dirty="0" smtClean="0"/>
-              <a:t>Model</a:t>
+              <a:t>Revenue Operation and Device Optimization Model</a:t>
             </a:r>
           </a:p>
           <a:p>
             <a:pPr algn="ctr"/>
             <a:r>
-              <a:rPr lang="en-US" sz="2800" dirty="0" smtClean="0"/>
+              <a:rPr lang="en-US" sz="2800" dirty="0"/>
               <a:t>(</a:t>
             </a:r>
             <a:r>
-              <a:rPr lang="en-US" sz="2800" dirty="0" err="1" smtClean="0"/>
+              <a:rPr lang="en-US" sz="2800" dirty="0" err="1"/>
               <a:t>RODeO</a:t>
             </a:r>
             <a:r>
-              <a:rPr lang="en-US" sz="2800" dirty="0" smtClean="0"/>
+              <a:rPr lang="en-US" sz="2800" dirty="0"/>
               <a:t>)</a:t>
             </a:r>
           </a:p>
@@ -11009,7 +10923,7 @@
           <a:lstStyle/>
           <a:p>
             <a:r>
-              <a:rPr lang="en-US" sz="2400" dirty="0" smtClean="0">
+              <a:rPr lang="en-US" sz="2400" dirty="0">
                 <a:solidFill>
                   <a:schemeClr val="bg2"/>
                 </a:solidFill>
@@ -11019,7 +10933,7 @@
           </a:p>
           <a:p>
             <a:r>
-              <a:rPr lang="en-US" sz="2400" dirty="0" smtClean="0">
+              <a:rPr lang="en-US" sz="2400" dirty="0">
                 <a:solidFill>
                   <a:schemeClr val="bg2"/>
                 </a:solidFill>
@@ -11051,28 +10965,20 @@
           </a:bodyPr>
           <a:lstStyle/>
           <a:p>
-            <a:endParaRPr lang="en-US" sz="400" dirty="0" smtClean="0">
+            <a:endParaRPr lang="en-US" sz="400" dirty="0">
               <a:solidFill>
                 <a:schemeClr val="bg2"/>
               </a:solidFill>
             </a:endParaRPr>
           </a:p>
           <a:p>
-            <a:r>
-              <a:rPr lang="en-US" sz="2400" dirty="0" smtClean="0">
-                <a:solidFill>
-                  <a:schemeClr val="bg2"/>
-                </a:solidFill>
-              </a:rPr>
-              <a:t>Annualized </a:t>
-            </a:r>
             <a:r>
               <a:rPr lang="en-US" sz="2400" dirty="0">
                 <a:solidFill>
                   <a:schemeClr val="bg2"/>
                 </a:solidFill>
               </a:rPr>
-              <a:t>Cost</a:t>
+              <a:t>Annualized Cost</a:t>
             </a:r>
           </a:p>
           <a:p>
@@ -11082,55 +10988,42 @@
                   <a:schemeClr val="bg2"/>
                 </a:solidFill>
               </a:rPr>
-              <a:t>  (by component</a:t>
-            </a:r>
-            <a:r>
-              <a:rPr lang="en-US" sz="2400" dirty="0" smtClean="0">
-                <a:solidFill>
-                  <a:schemeClr val="bg2"/>
-                </a:solidFill>
-              </a:rPr>
-              <a:t>)</a:t>
-            </a:r>
-            <a:endParaRPr lang="en-US" sz="2400" dirty="0">
+              <a:t>  (by component)</a:t>
+            </a:r>
+          </a:p>
+        </p:txBody>
+      </p:sp>
+      <p:sp>
+        <p:nvSpPr>
+          <p:cNvPr id="52" name="Output"/>
+          <p:cNvSpPr txBox="1"/>
+          <p:nvPr/>
+        </p:nvSpPr>
+        <p:spPr>
+          <a:xfrm>
+            <a:off x="7262288" y="1149142"/>
+            <a:ext cx="2430794" cy="523220"/>
+          </a:xfrm>
+          <a:prstGeom prst="rect">
+            <a:avLst/>
+          </a:prstGeom>
+          <a:noFill/>
+        </p:spPr>
+        <p:txBody>
+          <a:bodyPr wrap="none" rtlCol="0">
+            <a:spAutoFit/>
+          </a:bodyPr>
+          <a:lstStyle/>
+          <a:p>
+            <a:endParaRPr lang="en-US" sz="400" dirty="0">
               <a:solidFill>
                 <a:schemeClr val="bg2"/>
               </a:solidFill>
             </a:endParaRPr>
           </a:p>
-        </p:txBody>
-      </p:sp>
-      <p:sp>
-        <p:nvSpPr>
-          <p:cNvPr id="52" name="Output"/>
-          <p:cNvSpPr txBox="1"/>
-          <p:nvPr/>
-        </p:nvSpPr>
-        <p:spPr>
-          <a:xfrm>
-            <a:off x="7262288" y="1149142"/>
-            <a:ext cx="2430794" cy="523220"/>
-          </a:xfrm>
-          <a:prstGeom prst="rect">
-            <a:avLst/>
-          </a:prstGeom>
-          <a:noFill/>
-        </p:spPr>
-        <p:txBody>
-          <a:bodyPr wrap="none" rtlCol="0">
-            <a:spAutoFit/>
-          </a:bodyPr>
-          <a:lstStyle/>
-          <a:p>
-            <a:endParaRPr lang="en-US" sz="400" dirty="0" smtClean="0">
-              <a:solidFill>
-                <a:schemeClr val="bg2"/>
-              </a:solidFill>
-            </a:endParaRPr>
-          </a:p>
-          <a:p>
-            <a:r>
-              <a:rPr lang="en-US" sz="2400" dirty="0" smtClean="0">
+          <a:p>
+            <a:r>
+              <a:rPr lang="en-US" sz="2400" dirty="0">
                 <a:solidFill>
                   <a:schemeClr val="bg2"/>
                 </a:solidFill>
@@ -11188,10 +11081,9 @@
           <a:lstStyle/>
           <a:p>
             <a:r>
-              <a:rPr lang="en-US" dirty="0" smtClean="0"/>
+              <a:rPr lang="en-US" dirty="0"/>
               <a:t>Quantify the value of energy storage</a:t>
             </a:r>
-            <a:endParaRPr lang="en-US" dirty="0"/>
           </a:p>
         </p:txBody>
       </p:sp>
@@ -11222,7 +11114,7 @@
               <a:buChar char="•"/>
             </a:pPr>
             <a:r>
-              <a:rPr lang="en-US" sz="1650" dirty="0" smtClean="0">
+              <a:rPr lang="en-US" sz="1650" dirty="0">
                 <a:solidFill>
                   <a:schemeClr val="bg2"/>
                 </a:solidFill>
@@ -11236,7 +11128,7 @@
               <a:buChar char="•"/>
             </a:pPr>
             <a:r>
-              <a:rPr lang="en-US" sz="1650" dirty="0" smtClean="0">
+              <a:rPr lang="en-US" sz="1650" dirty="0">
                 <a:solidFill>
                   <a:schemeClr val="bg2"/>
                 </a:solidFill>
@@ -11250,7 +11142,7 @@
               <a:buChar char="•"/>
             </a:pPr>
             <a:r>
-              <a:rPr lang="en-US" sz="1650" dirty="0" smtClean="0">
+              <a:rPr lang="en-US" sz="1650" dirty="0">
                 <a:solidFill>
                   <a:schemeClr val="bg2"/>
                 </a:solidFill>
@@ -11264,7 +11156,7 @@
               <a:buChar char="•"/>
             </a:pPr>
             <a:r>
-              <a:rPr lang="en-US" sz="1650" dirty="0" smtClean="0">
+              <a:rPr lang="en-US" sz="1650" dirty="0">
                 <a:solidFill>
                   <a:schemeClr val="bg2"/>
                 </a:solidFill>
@@ -11272,25 +11164,20 @@
               <a:t>Operational </a:t>
             </a:r>
             <a:br>
-              <a:rPr lang="en-US" sz="1650" dirty="0" smtClean="0">
+              <a:rPr lang="en-US" sz="1650" dirty="0">
                 <a:solidFill>
                   <a:schemeClr val="bg2"/>
                 </a:solidFill>
               </a:rPr>
             </a:br>
             <a:r>
-              <a:rPr lang="en-US" sz="1650" dirty="0" smtClean="0">
+              <a:rPr lang="en-US" sz="1650" dirty="0">
                 <a:solidFill>
                   <a:schemeClr val="bg2"/>
                 </a:solidFill>
               </a:rPr>
               <a:t>parameters</a:t>
             </a:r>
-            <a:endParaRPr lang="en-US" sz="1650" dirty="0">
-              <a:solidFill>
-                <a:schemeClr val="bg2"/>
-              </a:solidFill>
-            </a:endParaRPr>
           </a:p>
         </p:txBody>
       </p:sp>
@@ -11317,18 +11204,13 @@
           <a:lstStyle/>
           <a:p>
             <a:r>
-              <a:rPr lang="en-US" sz="2000" b="1" u="sng" dirty="0" smtClean="0">
+              <a:rPr lang="en-US" sz="2000" b="1" u="sng" dirty="0">
                 <a:solidFill>
                   <a:schemeClr val="bg2"/>
                 </a:solidFill>
               </a:rPr>
               <a:t>Historical or Modelled</a:t>
             </a:r>
-            <a:endParaRPr lang="en-US" sz="2000" b="1" u="sng" dirty="0">
-              <a:solidFill>
-                <a:schemeClr val="bg2"/>
-              </a:solidFill>
-            </a:endParaRPr>
           </a:p>
         </p:txBody>
       </p:sp>
@@ -11426,7 +11308,7 @@
           <a:p>
             <a:pPr algn="ctr"/>
             <a:r>
-              <a:rPr lang="en-US" sz="3000" dirty="0" smtClean="0"/>
+              <a:rPr lang="en-US" sz="3000" dirty="0"/>
               <a:t>Optimization model</a:t>
             </a:r>
           </a:p>
@@ -11455,7 +11337,7 @@
           <a:lstStyle/>
           <a:p>
             <a:r>
-              <a:rPr lang="en-US" dirty="0" smtClean="0">
+              <a:rPr lang="en-US" dirty="0">
                 <a:solidFill>
                   <a:schemeClr val="bg2"/>
                 </a:solidFill>
@@ -11463,14 +11345,14 @@
               <a:t>Profit based on operation </a:t>
             </a:r>
             <a:br>
-              <a:rPr lang="en-US" dirty="0" smtClean="0">
+              <a:rPr lang="en-US" dirty="0">
                 <a:solidFill>
                   <a:schemeClr val="bg2"/>
                 </a:solidFill>
               </a:rPr>
             </a:br>
             <a:r>
-              <a:rPr lang="en-US" dirty="0" smtClean="0">
+              <a:rPr lang="en-US" dirty="0">
                 <a:solidFill>
                   <a:schemeClr val="bg2"/>
                 </a:solidFill>
@@ -11478,7 +11360,7 @@
               <a:t> (arbitrage, AS, H</a:t>
             </a:r>
             <a:r>
-              <a:rPr lang="en-US" baseline="-25000" dirty="0" smtClean="0">
+              <a:rPr lang="en-US" baseline="-25000" dirty="0">
                 <a:solidFill>
                   <a:schemeClr val="bg2"/>
                 </a:solidFill>
@@ -11486,7 +11368,7 @@
               <a:t>2</a:t>
             </a:r>
             <a:r>
-              <a:rPr lang="en-US" dirty="0" smtClean="0">
+              <a:rPr lang="en-US" dirty="0">
                 <a:solidFill>
                   <a:schemeClr val="bg2"/>
                 </a:solidFill>
@@ -11541,18 +11423,13 @@
           <a:p>
             <a:pPr algn="ctr"/>
             <a:r>
-              <a:rPr lang="en-US" sz="2400" b="1" dirty="0" smtClean="0">
+              <a:rPr lang="en-US" sz="2400" b="1" dirty="0">
                 <a:solidFill>
                   <a:schemeClr val="bg2"/>
                 </a:solidFill>
               </a:rPr>
               <a:t>An operations optimization model is used to quantify value from electricity markets and the sale of hydrogen</a:t>
             </a:r>
-            <a:endParaRPr lang="en-US" sz="2400" b="1" dirty="0">
-              <a:solidFill>
-                <a:schemeClr val="bg2"/>
-              </a:solidFill>
-            </a:endParaRPr>
           </a:p>
         </p:txBody>
       </p:sp>
@@ -11579,77 +11456,36 @@
           <a:lstStyle/>
           <a:p>
             <a:r>
-              <a:rPr lang="en-US" sz="2400" dirty="0" smtClean="0"/>
-              <a:t>Optimization model can perform </a:t>
-            </a:r>
-            <a:r>
               <a:rPr lang="en-US" sz="2400" dirty="0"/>
-              <a:t>time-resolved co-optimization of </a:t>
-            </a:r>
-            <a:r>
-              <a:rPr lang="en-US" sz="2400" dirty="0" smtClean="0"/>
-              <a:t>energy, ancillary service and hydrogen </a:t>
-            </a:r>
+              <a:t>Optimization model can perform time-resolved co-optimization of energy, ancillary service and hydrogen products quickly</a:t>
+            </a:r>
+          </a:p>
+          <a:p>
             <a:r>
               <a:rPr lang="en-US" sz="2400" dirty="0"/>
-              <a:t>products </a:t>
-            </a:r>
-            <a:r>
-              <a:rPr lang="en-US" sz="2400" dirty="0" smtClean="0"/>
-              <a:t>quickly</a:t>
-            </a:r>
-          </a:p>
-          <a:p>
-            <a:r>
-              <a:rPr lang="en-US" sz="2400" dirty="0" smtClean="0"/>
               <a:t>Assumptions</a:t>
             </a:r>
           </a:p>
           <a:p>
             <a:pPr lvl="1"/>
             <a:r>
-              <a:rPr lang="en-US" sz="2000" dirty="0" smtClean="0"/>
-              <a:t>Sufficient </a:t>
-            </a:r>
-            <a:r>
               <a:rPr lang="en-US" sz="2000" dirty="0"/>
-              <a:t>capacity is available in all </a:t>
-            </a:r>
-            <a:r>
-              <a:rPr lang="en-US" sz="2000" dirty="0" smtClean="0"/>
-              <a:t>markets</a:t>
+              <a:t>Sufficient capacity is available in all markets</a:t>
             </a:r>
           </a:p>
           <a:p>
             <a:pPr lvl="1"/>
             <a:r>
-              <a:rPr lang="en-US" sz="2000" dirty="0" smtClean="0"/>
-              <a:t>Objects </a:t>
-            </a:r>
-            <a:r>
               <a:rPr lang="en-US" sz="2000" dirty="0"/>
-              <a:t>don’t impact market outcome </a:t>
-            </a:r>
-            <a:r>
-              <a:rPr lang="en-US" sz="2000" dirty="0" smtClean="0"/>
-              <a:t/>
+              <a:t>Objects don’t impact market outcome </a:t>
             </a:r>
             <a:br>
-              <a:rPr lang="en-US" sz="2000" dirty="0" smtClean="0"/>
+              <a:rPr lang="en-US" sz="2000" dirty="0"/>
             </a:br>
             <a:r>
-              <a:rPr lang="en-US" sz="2000" dirty="0" smtClean="0"/>
-              <a:t>(</a:t>
-            </a:r>
-            <a:r>
               <a:rPr lang="en-US" sz="2000" dirty="0"/>
-              <a:t>i.e., small compared to market size</a:t>
-            </a:r>
-            <a:r>
-              <a:rPr lang="en-US" sz="2000" dirty="0" smtClean="0"/>
-              <a:t>)</a:t>
-            </a:r>
-            <a:endParaRPr lang="en-US" sz="2000" dirty="0"/>
+              <a:t>(i.e., small compared to market size)</a:t>
+            </a:r>
           </a:p>
         </p:txBody>
       </p:sp>
@@ -11720,13 +11556,6 @@
   <p:clrMapOvr>
     <a:masterClrMapping/>
   </p:clrMapOvr>
-  <p:timing>
-    <p:tnLst>
-      <p:par>
-        <p:cTn id="1" dur="indefinite" restart="never" nodeType="tmRoot"/>
-      </p:par>
-    </p:tnLst>
-  </p:timing>
 </p:sld>
 </file>
 

</xml_diff>

<commit_message>
Add RECs LCFSs H2 storage cost and renewable cost parameters
</commit_message>
<xml_diff>
--- a/Optimization model diagram.pptx
+++ b/Optimization model diagram.pptx
@@ -5,7 +5,7 @@
     <p:sldMasterId id="2147483648" r:id="rId1"/>
   </p:sldMasterIdLst>
   <p:notesMasterIdLst>
-    <p:notesMasterId r:id="rId8"/>
+    <p:notesMasterId r:id="rId9"/>
   </p:notesMasterIdLst>
   <p:sldIdLst>
     <p:sldId id="580" r:id="rId2"/>
@@ -13,7 +13,8 @@
     <p:sldId id="583" r:id="rId4"/>
     <p:sldId id="584" r:id="rId5"/>
     <p:sldId id="585" r:id="rId6"/>
-    <p:sldId id="581" r:id="rId7"/>
+    <p:sldId id="586" r:id="rId7"/>
+    <p:sldId id="581" r:id="rId8"/>
   </p:sldIdLst>
   <p:sldSz cx="9144000" cy="6858000" type="screen4x3"/>
   <p:notesSz cx="6858000" cy="9144000"/>
@@ -235,7 +236,7 @@
             <a:fld id="{62430CC7-8C13-4D51-BC46-B95A4AC4A04B}" type="datetimeFigureOut">
               <a:rPr lang="en-US" smtClean="0"/>
               <a:pPr/>
-              <a:t>3/21/2018</a:t>
+              <a:t>6/29/2018</a:t>
             </a:fld>
             <a:endParaRPr lang="en-US"/>
           </a:p>
@@ -1190,7 +1191,7 @@
             <a:fld id="{7CD645B7-0B3A-4239-8069-075A43B72B67}" type="slidenum">
               <a:rPr lang="en-US" smtClean="0"/>
               <a:pPr/>
-              <a:t>6</a:t>
+              <a:t>7</a:t>
             </a:fld>
             <a:endParaRPr lang="en-US"/>
           </a:p>
@@ -11065,6 +11066,2235 @@
       </p:grpSpPr>
       <p:sp>
         <p:nvSpPr>
+          <p:cNvPr id="4" name="Life Arrow"/>
+          <p:cNvSpPr/>
+          <p:nvPr/>
+        </p:nvSpPr>
+        <p:spPr>
+          <a:xfrm>
+            <a:off x="3139440" y="4768331"/>
+            <a:ext cx="366713" cy="3372369"/>
+          </a:xfrm>
+          <a:prstGeom prst="downArrow">
+            <a:avLst>
+              <a:gd name="adj1" fmla="val 100000"/>
+              <a:gd name="adj2" fmla="val 45681"/>
+            </a:avLst>
+          </a:prstGeom>
+          <a:solidFill>
+            <a:srgbClr val="FFC000"/>
+          </a:solidFill>
+          <a:ln>
+            <a:solidFill>
+              <a:schemeClr val="accent3"/>
+            </a:solidFill>
+          </a:ln>
+          <a:scene3d>
+            <a:camera prst="orthographicFront">
+              <a:rot lat="0" lon="10800000" rev="5400000"/>
+            </a:camera>
+            <a:lightRig rig="threePt" dir="t"/>
+          </a:scene3d>
+        </p:spPr>
+        <p:style>
+          <a:lnRef idx="2">
+            <a:schemeClr val="accent1">
+              <a:shade val="50000"/>
+            </a:schemeClr>
+          </a:lnRef>
+          <a:fillRef idx="1">
+            <a:schemeClr val="accent1"/>
+          </a:fillRef>
+          <a:effectRef idx="0">
+            <a:schemeClr val="accent1"/>
+          </a:effectRef>
+          <a:fontRef idx="minor">
+            <a:schemeClr val="lt1"/>
+          </a:fontRef>
+        </p:style>
+        <p:txBody>
+          <a:bodyPr lIns="0" rIns="0" rtlCol="0" anchor="ctr"/>
+          <a:lstStyle/>
+          <a:p>
+            <a:pPr algn="ctr"/>
+            <a:endParaRPr lang="en-US" sz="2400" dirty="0"/>
+          </a:p>
+        </p:txBody>
+      </p:sp>
+      <p:sp>
+        <p:nvSpPr>
+          <p:cNvPr id="6" name="Interest Arrow"/>
+          <p:cNvSpPr/>
+          <p:nvPr/>
+        </p:nvSpPr>
+        <p:spPr>
+          <a:xfrm>
+            <a:off x="3139440" y="4314759"/>
+            <a:ext cx="366713" cy="3372369"/>
+          </a:xfrm>
+          <a:prstGeom prst="downArrow">
+            <a:avLst>
+              <a:gd name="adj1" fmla="val 100000"/>
+              <a:gd name="adj2" fmla="val 45681"/>
+            </a:avLst>
+          </a:prstGeom>
+          <a:solidFill>
+            <a:srgbClr val="FFC000"/>
+          </a:solidFill>
+          <a:ln>
+            <a:solidFill>
+              <a:schemeClr val="accent3"/>
+            </a:solidFill>
+          </a:ln>
+          <a:scene3d>
+            <a:camera prst="orthographicFront">
+              <a:rot lat="0" lon="10800000" rev="5400000"/>
+            </a:camera>
+            <a:lightRig rig="threePt" dir="t"/>
+          </a:scene3d>
+        </p:spPr>
+        <p:style>
+          <a:lnRef idx="2">
+            <a:schemeClr val="accent1">
+              <a:shade val="50000"/>
+            </a:schemeClr>
+          </a:lnRef>
+          <a:fillRef idx="1">
+            <a:schemeClr val="accent1"/>
+          </a:fillRef>
+          <a:effectRef idx="0">
+            <a:schemeClr val="accent1"/>
+          </a:effectRef>
+          <a:fontRef idx="minor">
+            <a:schemeClr val="lt1"/>
+          </a:fontRef>
+        </p:style>
+        <p:txBody>
+          <a:bodyPr lIns="0" rIns="0" rtlCol="0" anchor="ctr"/>
+          <a:lstStyle/>
+          <a:p>
+            <a:pPr algn="ctr"/>
+            <a:endParaRPr lang="en-US" sz="2400" dirty="0"/>
+          </a:p>
+        </p:txBody>
+      </p:sp>
+      <p:sp>
+        <p:nvSpPr>
+          <p:cNvPr id="8" name="FOM Arrow"/>
+          <p:cNvSpPr/>
+          <p:nvPr/>
+        </p:nvSpPr>
+        <p:spPr>
+          <a:xfrm>
+            <a:off x="3139440" y="3861188"/>
+            <a:ext cx="366713" cy="3372369"/>
+          </a:xfrm>
+          <a:prstGeom prst="downArrow">
+            <a:avLst>
+              <a:gd name="adj1" fmla="val 100000"/>
+              <a:gd name="adj2" fmla="val 45681"/>
+            </a:avLst>
+          </a:prstGeom>
+          <a:solidFill>
+            <a:srgbClr val="FFC000"/>
+          </a:solidFill>
+          <a:ln>
+            <a:solidFill>
+              <a:schemeClr val="accent3"/>
+            </a:solidFill>
+          </a:ln>
+          <a:scene3d>
+            <a:camera prst="orthographicFront">
+              <a:rot lat="0" lon="10800000" rev="5400000"/>
+            </a:camera>
+            <a:lightRig rig="threePt" dir="t"/>
+          </a:scene3d>
+        </p:spPr>
+        <p:style>
+          <a:lnRef idx="2">
+            <a:schemeClr val="accent1">
+              <a:shade val="50000"/>
+            </a:schemeClr>
+          </a:lnRef>
+          <a:fillRef idx="1">
+            <a:schemeClr val="accent1"/>
+          </a:fillRef>
+          <a:effectRef idx="0">
+            <a:schemeClr val="accent1"/>
+          </a:effectRef>
+          <a:fontRef idx="minor">
+            <a:schemeClr val="lt1"/>
+          </a:fontRef>
+        </p:style>
+        <p:txBody>
+          <a:bodyPr lIns="0" rIns="0" rtlCol="0" anchor="ctr"/>
+          <a:lstStyle/>
+          <a:p>
+            <a:pPr algn="ctr"/>
+            <a:endParaRPr lang="en-US" sz="2400" dirty="0"/>
+          </a:p>
+        </p:txBody>
+      </p:sp>
+      <p:sp>
+        <p:nvSpPr>
+          <p:cNvPr id="44" name="Cap Arrow"/>
+          <p:cNvSpPr/>
+          <p:nvPr/>
+        </p:nvSpPr>
+        <p:spPr>
+          <a:xfrm>
+            <a:off x="3139440" y="3388748"/>
+            <a:ext cx="366713" cy="3372369"/>
+          </a:xfrm>
+          <a:prstGeom prst="downArrow">
+            <a:avLst>
+              <a:gd name="adj1" fmla="val 100000"/>
+              <a:gd name="adj2" fmla="val 45681"/>
+            </a:avLst>
+          </a:prstGeom>
+          <a:solidFill>
+            <a:srgbClr val="FFC000"/>
+          </a:solidFill>
+          <a:ln>
+            <a:solidFill>
+              <a:schemeClr val="accent3"/>
+            </a:solidFill>
+          </a:ln>
+          <a:scene3d>
+            <a:camera prst="orthographicFront">
+              <a:rot lat="0" lon="10800000" rev="5400000"/>
+            </a:camera>
+            <a:lightRig rig="threePt" dir="t"/>
+          </a:scene3d>
+        </p:spPr>
+        <p:style>
+          <a:lnRef idx="2">
+            <a:schemeClr val="accent1">
+              <a:shade val="50000"/>
+            </a:schemeClr>
+          </a:lnRef>
+          <a:fillRef idx="1">
+            <a:schemeClr val="accent1"/>
+          </a:fillRef>
+          <a:effectRef idx="0">
+            <a:schemeClr val="accent1"/>
+          </a:effectRef>
+          <a:fontRef idx="minor">
+            <a:schemeClr val="lt1"/>
+          </a:fontRef>
+        </p:style>
+        <p:txBody>
+          <a:bodyPr lIns="0" rIns="0" rtlCol="0" anchor="ctr"/>
+          <a:lstStyle/>
+          <a:p>
+            <a:pPr algn="ctr"/>
+            <a:endParaRPr lang="en-US" sz="2400" dirty="0"/>
+          </a:p>
+        </p:txBody>
+      </p:sp>
+      <p:sp>
+        <p:nvSpPr>
+          <p:cNvPr id="18" name="Energy Arrow"/>
+          <p:cNvSpPr/>
+          <p:nvPr/>
+        </p:nvSpPr>
+        <p:spPr>
+          <a:xfrm>
+            <a:off x="3139440" y="-502961"/>
+            <a:ext cx="366713" cy="3372369"/>
+          </a:xfrm>
+          <a:prstGeom prst="downArrow">
+            <a:avLst>
+              <a:gd name="adj1" fmla="val 100000"/>
+              <a:gd name="adj2" fmla="val 45681"/>
+            </a:avLst>
+          </a:prstGeom>
+          <a:solidFill>
+            <a:srgbClr val="FFC000"/>
+          </a:solidFill>
+          <a:ln>
+            <a:solidFill>
+              <a:schemeClr val="accent3"/>
+            </a:solidFill>
+          </a:ln>
+          <a:scene3d>
+            <a:camera prst="orthographicFront">
+              <a:rot lat="0" lon="10800000" rev="5400000"/>
+            </a:camera>
+            <a:lightRig rig="threePt" dir="t"/>
+          </a:scene3d>
+        </p:spPr>
+        <p:style>
+          <a:lnRef idx="2">
+            <a:schemeClr val="accent1">
+              <a:shade val="50000"/>
+            </a:schemeClr>
+          </a:lnRef>
+          <a:fillRef idx="1">
+            <a:schemeClr val="accent1"/>
+          </a:fillRef>
+          <a:effectRef idx="0">
+            <a:schemeClr val="accent1"/>
+          </a:effectRef>
+          <a:fontRef idx="minor">
+            <a:schemeClr val="lt1"/>
+          </a:fontRef>
+        </p:style>
+        <p:txBody>
+          <a:bodyPr lIns="0" rIns="0" rtlCol="0" anchor="ctr"/>
+          <a:lstStyle/>
+          <a:p>
+            <a:pPr algn="ctr"/>
+            <a:endParaRPr lang="en-US" sz="2400"/>
+          </a:p>
+        </p:txBody>
+      </p:sp>
+      <p:sp>
+        <p:nvSpPr>
+          <p:cNvPr id="20" name="Reserve Arrow"/>
+          <p:cNvSpPr/>
+          <p:nvPr/>
+        </p:nvSpPr>
+        <p:spPr>
+          <a:xfrm>
+            <a:off x="3139440" y="-56810"/>
+            <a:ext cx="366713" cy="3372369"/>
+          </a:xfrm>
+          <a:prstGeom prst="downArrow">
+            <a:avLst>
+              <a:gd name="adj1" fmla="val 100000"/>
+              <a:gd name="adj2" fmla="val 45681"/>
+            </a:avLst>
+          </a:prstGeom>
+          <a:solidFill>
+            <a:srgbClr val="FFC000"/>
+          </a:solidFill>
+          <a:ln>
+            <a:solidFill>
+              <a:schemeClr val="accent3"/>
+            </a:solidFill>
+          </a:ln>
+          <a:scene3d>
+            <a:camera prst="orthographicFront">
+              <a:rot lat="0" lon="10800000" rev="5400000"/>
+            </a:camera>
+            <a:lightRig rig="threePt" dir="t"/>
+          </a:scene3d>
+        </p:spPr>
+        <p:style>
+          <a:lnRef idx="2">
+            <a:schemeClr val="accent1">
+              <a:shade val="50000"/>
+            </a:schemeClr>
+          </a:lnRef>
+          <a:fillRef idx="1">
+            <a:schemeClr val="accent1"/>
+          </a:fillRef>
+          <a:effectRef idx="0">
+            <a:schemeClr val="accent1"/>
+          </a:effectRef>
+          <a:fontRef idx="minor">
+            <a:schemeClr val="lt1"/>
+          </a:fontRef>
+        </p:style>
+        <p:txBody>
+          <a:bodyPr lIns="0" rIns="0" rtlCol="0" anchor="ctr"/>
+          <a:lstStyle/>
+          <a:p>
+            <a:pPr algn="ctr"/>
+            <a:endParaRPr lang="en-US" sz="2400"/>
+          </a:p>
+        </p:txBody>
+      </p:sp>
+      <p:sp>
+        <p:nvSpPr>
+          <p:cNvPr id="22" name="Meter Arrow"/>
+          <p:cNvSpPr/>
+          <p:nvPr/>
+        </p:nvSpPr>
+        <p:spPr>
+          <a:xfrm>
+            <a:off x="3139440" y="-1415837"/>
+            <a:ext cx="366713" cy="3372369"/>
+          </a:xfrm>
+          <a:prstGeom prst="downArrow">
+            <a:avLst>
+              <a:gd name="adj1" fmla="val 100000"/>
+              <a:gd name="adj2" fmla="val 45681"/>
+            </a:avLst>
+          </a:prstGeom>
+          <a:solidFill>
+            <a:srgbClr val="FFC000"/>
+          </a:solidFill>
+          <a:ln>
+            <a:solidFill>
+              <a:schemeClr val="accent3"/>
+            </a:solidFill>
+          </a:ln>
+          <a:scene3d>
+            <a:camera prst="orthographicFront">
+              <a:rot lat="0" lon="10800000" rev="5400000"/>
+            </a:camera>
+            <a:lightRig rig="threePt" dir="t"/>
+          </a:scene3d>
+        </p:spPr>
+        <p:style>
+          <a:lnRef idx="2">
+            <a:schemeClr val="accent1">
+              <a:shade val="50000"/>
+            </a:schemeClr>
+          </a:lnRef>
+          <a:fillRef idx="1">
+            <a:schemeClr val="accent1"/>
+          </a:fillRef>
+          <a:effectRef idx="0">
+            <a:schemeClr val="accent1"/>
+          </a:effectRef>
+          <a:fontRef idx="minor">
+            <a:schemeClr val="lt1"/>
+          </a:fontRef>
+        </p:style>
+        <p:txBody>
+          <a:bodyPr lIns="0" rIns="0" rtlCol="0" anchor="ctr"/>
+          <a:lstStyle/>
+          <a:p>
+            <a:pPr algn="ctr"/>
+            <a:endParaRPr lang="en-US" sz="2400" dirty="0"/>
+          </a:p>
+        </p:txBody>
+      </p:sp>
+      <p:sp>
+        <p:nvSpPr>
+          <p:cNvPr id="24" name="TDC Arrow"/>
+          <p:cNvSpPr/>
+          <p:nvPr/>
+        </p:nvSpPr>
+        <p:spPr>
+          <a:xfrm>
+            <a:off x="3139440" y="-1873622"/>
+            <a:ext cx="366713" cy="3374062"/>
+          </a:xfrm>
+          <a:prstGeom prst="downArrow">
+            <a:avLst>
+              <a:gd name="adj1" fmla="val 100000"/>
+              <a:gd name="adj2" fmla="val 45681"/>
+            </a:avLst>
+          </a:prstGeom>
+          <a:solidFill>
+            <a:srgbClr val="FFC000"/>
+          </a:solidFill>
+          <a:ln>
+            <a:solidFill>
+              <a:schemeClr val="accent3"/>
+            </a:solidFill>
+          </a:ln>
+          <a:scene3d>
+            <a:camera prst="orthographicFront">
+              <a:rot lat="0" lon="10800000" rev="5400000"/>
+            </a:camera>
+            <a:lightRig rig="threePt" dir="t"/>
+          </a:scene3d>
+        </p:spPr>
+        <p:style>
+          <a:lnRef idx="2">
+            <a:schemeClr val="accent1">
+              <a:shade val="50000"/>
+            </a:schemeClr>
+          </a:lnRef>
+          <a:fillRef idx="1">
+            <a:schemeClr val="accent1"/>
+          </a:fillRef>
+          <a:effectRef idx="0">
+            <a:schemeClr val="accent1"/>
+          </a:effectRef>
+          <a:fontRef idx="minor">
+            <a:schemeClr val="lt1"/>
+          </a:fontRef>
+        </p:style>
+        <p:txBody>
+          <a:bodyPr lIns="0" rIns="0" rtlCol="0" anchor="ctr"/>
+          <a:lstStyle/>
+          <a:p>
+            <a:pPr algn="ctr"/>
+            <a:endParaRPr lang="en-US" sz="2400"/>
+          </a:p>
+        </p:txBody>
+      </p:sp>
+      <p:sp>
+        <p:nvSpPr>
+          <p:cNvPr id="26" name="FDC Arrow"/>
+          <p:cNvSpPr/>
+          <p:nvPr/>
+        </p:nvSpPr>
+        <p:spPr>
+          <a:xfrm>
+            <a:off x="3139440" y="-2331761"/>
+            <a:ext cx="366713" cy="3372369"/>
+          </a:xfrm>
+          <a:prstGeom prst="downArrow">
+            <a:avLst>
+              <a:gd name="adj1" fmla="val 100000"/>
+              <a:gd name="adj2" fmla="val 45681"/>
+            </a:avLst>
+          </a:prstGeom>
+          <a:solidFill>
+            <a:srgbClr val="FFC000"/>
+          </a:solidFill>
+          <a:ln>
+            <a:solidFill>
+              <a:schemeClr val="accent3"/>
+            </a:solidFill>
+          </a:ln>
+          <a:scene3d>
+            <a:camera prst="orthographicFront">
+              <a:rot lat="0" lon="10800000" rev="5400000"/>
+            </a:camera>
+            <a:lightRig rig="threePt" dir="t"/>
+          </a:scene3d>
+        </p:spPr>
+        <p:style>
+          <a:lnRef idx="2">
+            <a:schemeClr val="accent1">
+              <a:shade val="50000"/>
+            </a:schemeClr>
+          </a:lnRef>
+          <a:fillRef idx="1">
+            <a:schemeClr val="accent1"/>
+          </a:fillRef>
+          <a:effectRef idx="0">
+            <a:schemeClr val="accent1"/>
+          </a:effectRef>
+          <a:fontRef idx="minor">
+            <a:schemeClr val="lt1"/>
+          </a:fontRef>
+        </p:style>
+        <p:txBody>
+          <a:bodyPr lIns="0" rIns="0" rtlCol="0" anchor="ctr"/>
+          <a:lstStyle/>
+          <a:p>
+            <a:pPr algn="ctr"/>
+            <a:endParaRPr lang="en-US" sz="2400"/>
+          </a:p>
+        </p:txBody>
+      </p:sp>
+      <p:sp>
+        <p:nvSpPr>
+          <p:cNvPr id="28" name="Energy Arrow"/>
+          <p:cNvSpPr/>
+          <p:nvPr/>
+        </p:nvSpPr>
+        <p:spPr>
+          <a:xfrm>
+            <a:off x="3139440" y="-2788961"/>
+            <a:ext cx="366713" cy="3372369"/>
+          </a:xfrm>
+          <a:prstGeom prst="downArrow">
+            <a:avLst>
+              <a:gd name="adj1" fmla="val 100000"/>
+              <a:gd name="adj2" fmla="val 45681"/>
+            </a:avLst>
+          </a:prstGeom>
+          <a:solidFill>
+            <a:srgbClr val="FFC000"/>
+          </a:solidFill>
+          <a:ln>
+            <a:solidFill>
+              <a:schemeClr val="accent3"/>
+            </a:solidFill>
+          </a:ln>
+          <a:scene3d>
+            <a:camera prst="orthographicFront">
+              <a:rot lat="0" lon="10800000" rev="5400000"/>
+            </a:camera>
+            <a:lightRig rig="threePt" dir="t"/>
+          </a:scene3d>
+        </p:spPr>
+        <p:style>
+          <a:lnRef idx="2">
+            <a:schemeClr val="accent1">
+              <a:shade val="50000"/>
+            </a:schemeClr>
+          </a:lnRef>
+          <a:fillRef idx="1">
+            <a:schemeClr val="accent1"/>
+          </a:fillRef>
+          <a:effectRef idx="0">
+            <a:schemeClr val="accent1"/>
+          </a:effectRef>
+          <a:fontRef idx="minor">
+            <a:schemeClr val="lt1"/>
+          </a:fontRef>
+        </p:style>
+        <p:txBody>
+          <a:bodyPr lIns="0" rIns="0" rtlCol="0" anchor="ctr"/>
+          <a:lstStyle/>
+          <a:p>
+            <a:pPr algn="ctr"/>
+            <a:endParaRPr lang="en-US" sz="2400"/>
+          </a:p>
+        </p:txBody>
+      </p:sp>
+      <p:sp>
+        <p:nvSpPr>
+          <p:cNvPr id="32" name="Renewable Power Arrow"/>
+          <p:cNvSpPr/>
+          <p:nvPr/>
+        </p:nvSpPr>
+        <p:spPr>
+          <a:xfrm>
+            <a:off x="3139440" y="762000"/>
+            <a:ext cx="366713" cy="3372369"/>
+          </a:xfrm>
+          <a:prstGeom prst="downArrow">
+            <a:avLst>
+              <a:gd name="adj1" fmla="val 100000"/>
+              <a:gd name="adj2" fmla="val 45681"/>
+            </a:avLst>
+          </a:prstGeom>
+          <a:solidFill>
+            <a:srgbClr val="FFC000"/>
+          </a:solidFill>
+          <a:ln>
+            <a:solidFill>
+              <a:schemeClr val="accent3"/>
+            </a:solidFill>
+          </a:ln>
+          <a:scene3d>
+            <a:camera prst="orthographicFront">
+              <a:rot lat="0" lon="10800000" rev="5400000"/>
+            </a:camera>
+            <a:lightRig rig="threePt" dir="t"/>
+          </a:scene3d>
+        </p:spPr>
+        <p:style>
+          <a:lnRef idx="2">
+            <a:schemeClr val="accent1">
+              <a:shade val="50000"/>
+            </a:schemeClr>
+          </a:lnRef>
+          <a:fillRef idx="1">
+            <a:schemeClr val="accent1"/>
+          </a:fillRef>
+          <a:effectRef idx="0">
+            <a:schemeClr val="accent1"/>
+          </a:effectRef>
+          <a:fontRef idx="minor">
+            <a:schemeClr val="lt1"/>
+          </a:fontRef>
+        </p:style>
+        <p:txBody>
+          <a:bodyPr lIns="0" rIns="0" rtlCol="0" anchor="ctr"/>
+          <a:lstStyle/>
+          <a:p>
+            <a:pPr algn="ctr"/>
+            <a:endParaRPr lang="en-US" sz="2400"/>
+          </a:p>
+        </p:txBody>
+      </p:sp>
+      <p:sp>
+        <p:nvSpPr>
+          <p:cNvPr id="34" name="Op Param Arrow"/>
+          <p:cNvSpPr/>
+          <p:nvPr/>
+        </p:nvSpPr>
+        <p:spPr>
+          <a:xfrm>
+            <a:off x="3139440" y="1215672"/>
+            <a:ext cx="366713" cy="3372369"/>
+          </a:xfrm>
+          <a:prstGeom prst="downArrow">
+            <a:avLst>
+              <a:gd name="adj1" fmla="val 100000"/>
+              <a:gd name="adj2" fmla="val 45681"/>
+            </a:avLst>
+          </a:prstGeom>
+          <a:solidFill>
+            <a:srgbClr val="FFC000"/>
+          </a:solidFill>
+          <a:ln>
+            <a:solidFill>
+              <a:schemeClr val="accent3"/>
+            </a:solidFill>
+          </a:ln>
+          <a:scene3d>
+            <a:camera prst="orthographicFront">
+              <a:rot lat="0" lon="10800000" rev="5400000"/>
+            </a:camera>
+            <a:lightRig rig="threePt" dir="t"/>
+          </a:scene3d>
+        </p:spPr>
+        <p:style>
+          <a:lnRef idx="2">
+            <a:schemeClr val="accent1">
+              <a:shade val="50000"/>
+            </a:schemeClr>
+          </a:lnRef>
+          <a:fillRef idx="1">
+            <a:schemeClr val="accent1"/>
+          </a:fillRef>
+          <a:effectRef idx="0">
+            <a:schemeClr val="accent1"/>
+          </a:effectRef>
+          <a:fontRef idx="minor">
+            <a:schemeClr val="lt1"/>
+          </a:fontRef>
+        </p:style>
+        <p:txBody>
+          <a:bodyPr lIns="0" rIns="0" rtlCol="0" anchor="ctr"/>
+          <a:lstStyle/>
+          <a:p>
+            <a:pPr algn="ctr"/>
+            <a:endParaRPr lang="en-US" sz="2400"/>
+          </a:p>
+        </p:txBody>
+      </p:sp>
+      <p:sp>
+        <p:nvSpPr>
+          <p:cNvPr id="5" name="Life"/>
+          <p:cNvSpPr txBox="1"/>
+          <p:nvPr/>
+        </p:nvSpPr>
+        <p:spPr>
+          <a:xfrm>
+            <a:off x="2892644" y="6200095"/>
+            <a:ext cx="1011752" cy="461665"/>
+          </a:xfrm>
+          <a:prstGeom prst="rect">
+            <a:avLst/>
+          </a:prstGeom>
+          <a:noFill/>
+        </p:spPr>
+        <p:txBody>
+          <a:bodyPr wrap="none" lIns="0" rIns="0" rtlCol="0">
+            <a:spAutoFit/>
+          </a:bodyPr>
+          <a:lstStyle/>
+          <a:p>
+            <a:pPr algn="ctr"/>
+            <a:r>
+              <a:rPr lang="en-US" sz="2400" dirty="0">
+                <a:solidFill>
+                  <a:schemeClr val="bg2"/>
+                </a:solidFill>
+              </a:rPr>
+              <a:t>Lifetime</a:t>
+            </a:r>
+          </a:p>
+        </p:txBody>
+      </p:sp>
+      <p:sp>
+        <p:nvSpPr>
+          <p:cNvPr id="7" name="Interest"/>
+          <p:cNvSpPr txBox="1"/>
+          <p:nvPr/>
+        </p:nvSpPr>
+        <p:spPr>
+          <a:xfrm>
+            <a:off x="1569720" y="5741113"/>
+            <a:ext cx="3657600" cy="461665"/>
+          </a:xfrm>
+          <a:prstGeom prst="rect">
+            <a:avLst/>
+          </a:prstGeom>
+          <a:noFill/>
+        </p:spPr>
+        <p:txBody>
+          <a:bodyPr wrap="square" lIns="0" rIns="0" rtlCol="0">
+            <a:spAutoFit/>
+          </a:bodyPr>
+          <a:lstStyle/>
+          <a:p>
+            <a:pPr algn="ctr"/>
+            <a:r>
+              <a:rPr lang="en-US" sz="2400" dirty="0">
+                <a:solidFill>
+                  <a:schemeClr val="bg2"/>
+                </a:solidFill>
+              </a:rPr>
+              <a:t>Interest Rate on debt</a:t>
+            </a:r>
+          </a:p>
+        </p:txBody>
+      </p:sp>
+      <p:sp>
+        <p:nvSpPr>
+          <p:cNvPr id="9" name="FOM"/>
+          <p:cNvSpPr txBox="1"/>
+          <p:nvPr/>
+        </p:nvSpPr>
+        <p:spPr>
+          <a:xfrm>
+            <a:off x="1569720" y="5313074"/>
+            <a:ext cx="3657600" cy="461665"/>
+          </a:xfrm>
+          <a:prstGeom prst="rect">
+            <a:avLst/>
+          </a:prstGeom>
+          <a:noFill/>
+        </p:spPr>
+        <p:txBody>
+          <a:bodyPr wrap="square" lIns="0" rIns="0" rtlCol="0">
+            <a:spAutoFit/>
+          </a:bodyPr>
+          <a:lstStyle/>
+          <a:p>
+            <a:pPr algn="ctr"/>
+            <a:r>
+              <a:rPr lang="en-US" sz="2400" dirty="0">
+                <a:solidFill>
+                  <a:schemeClr val="bg2"/>
+                </a:solidFill>
+              </a:rPr>
+              <a:t>Fixed O&amp;M Cost</a:t>
+            </a:r>
+          </a:p>
+        </p:txBody>
+      </p:sp>
+      <p:sp>
+        <p:nvSpPr>
+          <p:cNvPr id="10" name="Cap"/>
+          <p:cNvSpPr txBox="1"/>
+          <p:nvPr/>
+        </p:nvSpPr>
+        <p:spPr>
+          <a:xfrm>
+            <a:off x="1985505" y="4871162"/>
+            <a:ext cx="2826030" cy="461665"/>
+          </a:xfrm>
+          <a:prstGeom prst="rect">
+            <a:avLst/>
+          </a:prstGeom>
+          <a:noFill/>
+        </p:spPr>
+        <p:txBody>
+          <a:bodyPr wrap="none" lIns="0" rIns="0" rtlCol="0">
+            <a:spAutoFit/>
+          </a:bodyPr>
+          <a:lstStyle/>
+          <a:p>
+            <a:pPr algn="ctr"/>
+            <a:r>
+              <a:rPr lang="en-US" sz="2400" dirty="0">
+                <a:solidFill>
+                  <a:schemeClr val="bg2"/>
+                </a:solidFill>
+              </a:rPr>
+              <a:t>Capital and Install Cost</a:t>
+            </a:r>
+          </a:p>
+        </p:txBody>
+      </p:sp>
+      <p:sp>
+        <p:nvSpPr>
+          <p:cNvPr id="19" name="Energy"/>
+          <p:cNvSpPr txBox="1"/>
+          <p:nvPr/>
+        </p:nvSpPr>
+        <p:spPr>
+          <a:xfrm>
+            <a:off x="2627187" y="933936"/>
+            <a:ext cx="1542666" cy="461665"/>
+          </a:xfrm>
+          <a:prstGeom prst="rect">
+            <a:avLst/>
+          </a:prstGeom>
+          <a:noFill/>
+        </p:spPr>
+        <p:txBody>
+          <a:bodyPr wrap="none" lIns="0" rIns="0" rtlCol="0">
+            <a:spAutoFit/>
+          </a:bodyPr>
+          <a:lstStyle/>
+          <a:p>
+            <a:pPr algn="ctr"/>
+            <a:r>
+              <a:rPr lang="en-US" sz="2400" dirty="0">
+                <a:solidFill>
+                  <a:schemeClr val="bg2"/>
+                </a:solidFill>
+              </a:rPr>
+              <a:t>Energy Price</a:t>
+            </a:r>
+          </a:p>
+        </p:txBody>
+      </p:sp>
+      <p:sp>
+        <p:nvSpPr>
+          <p:cNvPr id="21" name="Reserve"/>
+          <p:cNvSpPr txBox="1"/>
+          <p:nvPr/>
+        </p:nvSpPr>
+        <p:spPr>
+          <a:xfrm>
+            <a:off x="1971273" y="1372387"/>
+            <a:ext cx="2854499" cy="461665"/>
+          </a:xfrm>
+          <a:prstGeom prst="rect">
+            <a:avLst/>
+          </a:prstGeom>
+          <a:noFill/>
+        </p:spPr>
+        <p:txBody>
+          <a:bodyPr wrap="none" lIns="0" rIns="0" rtlCol="0">
+            <a:spAutoFit/>
+          </a:bodyPr>
+          <a:lstStyle/>
+          <a:p>
+            <a:pPr algn="ctr"/>
+            <a:r>
+              <a:rPr lang="en-US" sz="2400" dirty="0">
+                <a:solidFill>
+                  <a:schemeClr val="bg2"/>
+                </a:solidFill>
+              </a:rPr>
+              <a:t>Ancillary Service Prices</a:t>
+            </a:r>
+          </a:p>
+        </p:txBody>
+      </p:sp>
+      <p:sp>
+        <p:nvSpPr>
+          <p:cNvPr id="23" name="Meter"/>
+          <p:cNvSpPr txBox="1"/>
+          <p:nvPr/>
+        </p:nvSpPr>
+        <p:spPr>
+          <a:xfrm>
+            <a:off x="2703843" y="15925"/>
+            <a:ext cx="1389355" cy="461665"/>
+          </a:xfrm>
+          <a:prstGeom prst="rect">
+            <a:avLst/>
+          </a:prstGeom>
+          <a:noFill/>
+        </p:spPr>
+        <p:txBody>
+          <a:bodyPr wrap="none" lIns="0" rIns="0" rtlCol="0">
+            <a:spAutoFit/>
+          </a:bodyPr>
+          <a:lstStyle/>
+          <a:p>
+            <a:pPr algn="ctr"/>
+            <a:r>
+              <a:rPr lang="en-US" sz="2400" dirty="0">
+                <a:solidFill>
+                  <a:schemeClr val="bg2"/>
+                </a:solidFill>
+              </a:rPr>
+              <a:t>Meter Cost</a:t>
+            </a:r>
+          </a:p>
+        </p:txBody>
+      </p:sp>
+      <p:sp>
+        <p:nvSpPr>
+          <p:cNvPr id="25" name="TDC"/>
+          <p:cNvSpPr txBox="1"/>
+          <p:nvPr/>
+        </p:nvSpPr>
+        <p:spPr>
+          <a:xfrm>
+            <a:off x="1569720" y="-443057"/>
+            <a:ext cx="3657600" cy="461665"/>
+          </a:xfrm>
+          <a:prstGeom prst="rect">
+            <a:avLst/>
+          </a:prstGeom>
+          <a:noFill/>
+        </p:spPr>
+        <p:txBody>
+          <a:bodyPr wrap="square" lIns="0" rIns="0" rtlCol="0">
+            <a:spAutoFit/>
+          </a:bodyPr>
+          <a:lstStyle/>
+          <a:p>
+            <a:pPr algn="ctr"/>
+            <a:r>
+              <a:rPr lang="en-US" sz="2400" dirty="0">
+                <a:solidFill>
+                  <a:schemeClr val="bg2"/>
+                </a:solidFill>
+              </a:rPr>
+              <a:t>Timed Demand Charge</a:t>
+            </a:r>
+          </a:p>
+        </p:txBody>
+      </p:sp>
+      <p:sp>
+        <p:nvSpPr>
+          <p:cNvPr id="27" name="FDC"/>
+          <p:cNvSpPr txBox="1"/>
+          <p:nvPr/>
+        </p:nvSpPr>
+        <p:spPr>
+          <a:xfrm>
+            <a:off x="1569720" y="-919143"/>
+            <a:ext cx="3657600" cy="461665"/>
+          </a:xfrm>
+          <a:prstGeom prst="rect">
+            <a:avLst/>
+          </a:prstGeom>
+          <a:noFill/>
+        </p:spPr>
+        <p:txBody>
+          <a:bodyPr wrap="square" lIns="0" rIns="0" rtlCol="0">
+            <a:spAutoFit/>
+          </a:bodyPr>
+          <a:lstStyle/>
+          <a:p>
+            <a:pPr algn="ctr"/>
+            <a:r>
+              <a:rPr lang="en-US" sz="2400" dirty="0">
+                <a:solidFill>
+                  <a:schemeClr val="bg2"/>
+                </a:solidFill>
+              </a:rPr>
+              <a:t>Fixed Demand Charge</a:t>
+            </a:r>
+          </a:p>
+        </p:txBody>
+      </p:sp>
+      <p:sp>
+        <p:nvSpPr>
+          <p:cNvPr id="29" name="Energy"/>
+          <p:cNvSpPr txBox="1"/>
+          <p:nvPr/>
+        </p:nvSpPr>
+        <p:spPr>
+          <a:xfrm>
+            <a:off x="2627187" y="-1333013"/>
+            <a:ext cx="1542666" cy="461665"/>
+          </a:xfrm>
+          <a:prstGeom prst="rect">
+            <a:avLst/>
+          </a:prstGeom>
+          <a:noFill/>
+        </p:spPr>
+        <p:txBody>
+          <a:bodyPr wrap="none" lIns="0" rIns="0" rtlCol="0">
+            <a:spAutoFit/>
+          </a:bodyPr>
+          <a:lstStyle/>
+          <a:p>
+            <a:pPr algn="ctr"/>
+            <a:r>
+              <a:rPr lang="en-US" sz="2400" dirty="0">
+                <a:solidFill>
+                  <a:schemeClr val="bg2"/>
+                </a:solidFill>
+              </a:rPr>
+              <a:t>Energy Price</a:t>
+            </a:r>
+          </a:p>
+        </p:txBody>
+      </p:sp>
+      <p:sp>
+        <p:nvSpPr>
+          <p:cNvPr id="33" name="Renewable Power"/>
+          <p:cNvSpPr txBox="1"/>
+          <p:nvPr/>
+        </p:nvSpPr>
+        <p:spPr>
+          <a:xfrm>
+            <a:off x="2278601" y="2229377"/>
+            <a:ext cx="2239844" cy="461665"/>
+          </a:xfrm>
+          <a:prstGeom prst="rect">
+            <a:avLst/>
+          </a:prstGeom>
+          <a:noFill/>
+        </p:spPr>
+        <p:txBody>
+          <a:bodyPr wrap="none" lIns="0" rIns="0" rtlCol="0">
+            <a:spAutoFit/>
+          </a:bodyPr>
+          <a:lstStyle/>
+          <a:p>
+            <a:pPr algn="ctr"/>
+            <a:r>
+              <a:rPr lang="en-US" sz="2400" dirty="0">
+                <a:solidFill>
+                  <a:schemeClr val="bg2"/>
+                </a:solidFill>
+              </a:rPr>
+              <a:t>Renewable Power</a:t>
+            </a:r>
+          </a:p>
+        </p:txBody>
+      </p:sp>
+      <p:sp>
+        <p:nvSpPr>
+          <p:cNvPr id="49" name="Op Param Arrow"/>
+          <p:cNvSpPr/>
+          <p:nvPr/>
+        </p:nvSpPr>
+        <p:spPr>
+          <a:xfrm>
+            <a:off x="3119751" y="1678109"/>
+            <a:ext cx="366713" cy="3372369"/>
+          </a:xfrm>
+          <a:prstGeom prst="downArrow">
+            <a:avLst>
+              <a:gd name="adj1" fmla="val 100000"/>
+              <a:gd name="adj2" fmla="val 45681"/>
+            </a:avLst>
+          </a:prstGeom>
+          <a:solidFill>
+            <a:srgbClr val="FFC000"/>
+          </a:solidFill>
+          <a:ln>
+            <a:solidFill>
+              <a:schemeClr val="accent3"/>
+            </a:solidFill>
+          </a:ln>
+          <a:scene3d>
+            <a:camera prst="orthographicFront">
+              <a:rot lat="0" lon="10800000" rev="5400000"/>
+            </a:camera>
+            <a:lightRig rig="threePt" dir="t"/>
+          </a:scene3d>
+        </p:spPr>
+        <p:style>
+          <a:lnRef idx="2">
+            <a:schemeClr val="accent1">
+              <a:shade val="50000"/>
+            </a:schemeClr>
+          </a:lnRef>
+          <a:fillRef idx="1">
+            <a:schemeClr val="accent1"/>
+          </a:fillRef>
+          <a:effectRef idx="0">
+            <a:schemeClr val="accent1"/>
+          </a:effectRef>
+          <a:fontRef idx="minor">
+            <a:schemeClr val="lt1"/>
+          </a:fontRef>
+        </p:style>
+        <p:txBody>
+          <a:bodyPr lIns="0" rIns="0" rtlCol="0" anchor="ctr"/>
+          <a:lstStyle/>
+          <a:p>
+            <a:pPr algn="ctr"/>
+            <a:endParaRPr lang="en-US" sz="2400"/>
+          </a:p>
+        </p:txBody>
+      </p:sp>
+      <p:sp>
+        <p:nvSpPr>
+          <p:cNvPr id="60" name="Inverter Arrow">
+            <a:extLst>
+              <a:ext uri="{FF2B5EF4-FFF2-40B4-BE49-F238E27FC236}">
+                <a16:creationId xmlns:a16="http://schemas.microsoft.com/office/drawing/2014/main" id="{1A740B48-6B84-4519-9B5D-9A1BC9757220}"/>
+              </a:ext>
+            </a:extLst>
+          </p:cNvPr>
+          <p:cNvSpPr/>
+          <p:nvPr/>
+        </p:nvSpPr>
+        <p:spPr>
+          <a:xfrm>
+            <a:off x="3139440" y="2578100"/>
+            <a:ext cx="366713" cy="3372369"/>
+          </a:xfrm>
+          <a:prstGeom prst="downArrow">
+            <a:avLst>
+              <a:gd name="adj1" fmla="val 100000"/>
+              <a:gd name="adj2" fmla="val 45681"/>
+            </a:avLst>
+          </a:prstGeom>
+          <a:solidFill>
+            <a:srgbClr val="FFC000"/>
+          </a:solidFill>
+          <a:ln>
+            <a:solidFill>
+              <a:schemeClr val="accent3"/>
+            </a:solidFill>
+          </a:ln>
+          <a:scene3d>
+            <a:camera prst="orthographicFront">
+              <a:rot lat="0" lon="10800000" rev="5400000"/>
+            </a:camera>
+            <a:lightRig rig="threePt" dir="t"/>
+          </a:scene3d>
+        </p:spPr>
+        <p:style>
+          <a:lnRef idx="2">
+            <a:schemeClr val="accent1">
+              <a:shade val="50000"/>
+            </a:schemeClr>
+          </a:lnRef>
+          <a:fillRef idx="1">
+            <a:schemeClr val="accent1"/>
+          </a:fillRef>
+          <a:effectRef idx="0">
+            <a:schemeClr val="accent1"/>
+          </a:effectRef>
+          <a:fontRef idx="minor">
+            <a:schemeClr val="lt1"/>
+          </a:fontRef>
+        </p:style>
+        <p:txBody>
+          <a:bodyPr lIns="0" rIns="0" rtlCol="0" anchor="ctr"/>
+          <a:lstStyle/>
+          <a:p>
+            <a:pPr algn="ctr"/>
+            <a:endParaRPr lang="en-US" sz="2400" dirty="0"/>
+          </a:p>
+        </p:txBody>
+      </p:sp>
+      <p:sp>
+        <p:nvSpPr>
+          <p:cNvPr id="61" name="Inverter">
+            <a:extLst>
+              <a:ext uri="{FF2B5EF4-FFF2-40B4-BE49-F238E27FC236}">
+                <a16:creationId xmlns:a16="http://schemas.microsoft.com/office/drawing/2014/main" id="{28DF6332-03B9-4CDB-859B-4507B6C0D92A}"/>
+              </a:ext>
+            </a:extLst>
+          </p:cNvPr>
+          <p:cNvSpPr txBox="1"/>
+          <p:nvPr/>
+        </p:nvSpPr>
+        <p:spPr>
+          <a:xfrm>
+            <a:off x="1979256" y="4009864"/>
+            <a:ext cx="2838534" cy="461665"/>
+          </a:xfrm>
+          <a:prstGeom prst="rect">
+            <a:avLst/>
+          </a:prstGeom>
+          <a:noFill/>
+        </p:spPr>
+        <p:txBody>
+          <a:bodyPr wrap="none" lIns="0" rIns="0" rtlCol="0">
+            <a:spAutoFit/>
+          </a:bodyPr>
+          <a:lstStyle/>
+          <a:p>
+            <a:pPr algn="ctr"/>
+            <a:r>
+              <a:rPr lang="en-US" sz="2400" dirty="0">
+                <a:solidFill>
+                  <a:schemeClr val="bg2"/>
+                </a:solidFill>
+              </a:rPr>
+              <a:t>Inverter size &amp; settings</a:t>
+            </a:r>
+          </a:p>
+        </p:txBody>
+      </p:sp>
+      <p:sp>
+        <p:nvSpPr>
+          <p:cNvPr id="57" name="H2 Arrow"/>
+          <p:cNvSpPr/>
+          <p:nvPr/>
+        </p:nvSpPr>
+        <p:spPr>
+          <a:xfrm>
+            <a:off x="3124200" y="2129271"/>
+            <a:ext cx="366713" cy="3372369"/>
+          </a:xfrm>
+          <a:prstGeom prst="downArrow">
+            <a:avLst>
+              <a:gd name="adj1" fmla="val 100000"/>
+              <a:gd name="adj2" fmla="val 45681"/>
+            </a:avLst>
+          </a:prstGeom>
+          <a:solidFill>
+            <a:srgbClr val="FFC000"/>
+          </a:solidFill>
+          <a:ln>
+            <a:solidFill>
+              <a:schemeClr val="accent3"/>
+            </a:solidFill>
+          </a:ln>
+          <a:scene3d>
+            <a:camera prst="orthographicFront">
+              <a:rot lat="0" lon="10800000" rev="5400000"/>
+            </a:camera>
+            <a:lightRig rig="threePt" dir="t"/>
+          </a:scene3d>
+        </p:spPr>
+        <p:style>
+          <a:lnRef idx="2">
+            <a:schemeClr val="accent1">
+              <a:shade val="50000"/>
+            </a:schemeClr>
+          </a:lnRef>
+          <a:fillRef idx="1">
+            <a:schemeClr val="accent1"/>
+          </a:fillRef>
+          <a:effectRef idx="0">
+            <a:schemeClr val="accent1"/>
+          </a:effectRef>
+          <a:fontRef idx="minor">
+            <a:schemeClr val="lt1"/>
+          </a:fontRef>
+        </p:style>
+        <p:txBody>
+          <a:bodyPr lIns="0" rIns="0" rtlCol="0" anchor="ctr"/>
+          <a:lstStyle/>
+          <a:p>
+            <a:pPr algn="ctr"/>
+            <a:endParaRPr lang="en-US" sz="2400"/>
+          </a:p>
+        </p:txBody>
+      </p:sp>
+      <p:sp>
+        <p:nvSpPr>
+          <p:cNvPr id="58" name="H2"/>
+          <p:cNvSpPr txBox="1"/>
+          <p:nvPr/>
+        </p:nvSpPr>
+        <p:spPr>
+          <a:xfrm>
+            <a:off x="2213024" y="3596648"/>
+            <a:ext cx="2340514" cy="461665"/>
+          </a:xfrm>
+          <a:prstGeom prst="rect">
+            <a:avLst/>
+          </a:prstGeom>
+          <a:noFill/>
+        </p:spPr>
+        <p:txBody>
+          <a:bodyPr wrap="none" lIns="0" rIns="0" rtlCol="0">
+            <a:spAutoFit/>
+          </a:bodyPr>
+          <a:lstStyle/>
+          <a:p>
+            <a:pPr algn="ctr"/>
+            <a:r>
+              <a:rPr lang="en-US" sz="2400" dirty="0">
+                <a:solidFill>
+                  <a:schemeClr val="bg2"/>
+                </a:solidFill>
+              </a:rPr>
+              <a:t>Hydrogen Demand</a:t>
+            </a:r>
+          </a:p>
+        </p:txBody>
+      </p:sp>
+      <p:sp>
+        <p:nvSpPr>
+          <p:cNvPr id="56" name="Building Load"/>
+          <p:cNvSpPr txBox="1"/>
+          <p:nvPr/>
+        </p:nvSpPr>
+        <p:spPr>
+          <a:xfrm>
+            <a:off x="2539666" y="3155011"/>
+            <a:ext cx="1678345" cy="461665"/>
+          </a:xfrm>
+          <a:prstGeom prst="rect">
+            <a:avLst/>
+          </a:prstGeom>
+          <a:noFill/>
+        </p:spPr>
+        <p:txBody>
+          <a:bodyPr wrap="none" lIns="0" rIns="0" rtlCol="0">
+            <a:spAutoFit/>
+          </a:bodyPr>
+          <a:lstStyle/>
+          <a:p>
+            <a:pPr algn="ctr"/>
+            <a:r>
+              <a:rPr lang="en-US" sz="2400" dirty="0">
+                <a:solidFill>
+                  <a:schemeClr val="bg2"/>
+                </a:solidFill>
+              </a:rPr>
+              <a:t>Building Load</a:t>
+            </a:r>
+          </a:p>
+        </p:txBody>
+      </p:sp>
+      <p:sp>
+        <p:nvSpPr>
+          <p:cNvPr id="35" name="Op Param"/>
+          <p:cNvSpPr txBox="1"/>
+          <p:nvPr/>
+        </p:nvSpPr>
+        <p:spPr>
+          <a:xfrm>
+            <a:off x="2022470" y="2692574"/>
+            <a:ext cx="2752099" cy="461665"/>
+          </a:xfrm>
+          <a:prstGeom prst="rect">
+            <a:avLst/>
+          </a:prstGeom>
+          <a:noFill/>
+        </p:spPr>
+        <p:txBody>
+          <a:bodyPr wrap="none" lIns="0" rIns="0" rtlCol="0">
+            <a:spAutoFit/>
+          </a:bodyPr>
+          <a:lstStyle/>
+          <a:p>
+            <a:pPr algn="ctr"/>
+            <a:r>
+              <a:rPr lang="en-US" sz="2400" dirty="0">
+                <a:solidFill>
+                  <a:schemeClr val="bg2"/>
+                </a:solidFill>
+              </a:rPr>
+              <a:t>Operation Parameters</a:t>
+            </a:r>
+          </a:p>
+        </p:txBody>
+      </p:sp>
+      <p:sp>
+        <p:nvSpPr>
+          <p:cNvPr id="30" name="Utility BOX"/>
+          <p:cNvSpPr/>
+          <p:nvPr/>
+        </p:nvSpPr>
+        <p:spPr>
+          <a:xfrm>
+            <a:off x="134385" y="-1461589"/>
+            <a:ext cx="1737360" cy="2086255"/>
+          </a:xfrm>
+          <a:prstGeom prst="roundRect">
+            <a:avLst>
+              <a:gd name="adj" fmla="val 9258"/>
+            </a:avLst>
+          </a:prstGeom>
+        </p:spPr>
+        <p:style>
+          <a:lnRef idx="2">
+            <a:schemeClr val="accent1">
+              <a:shade val="50000"/>
+            </a:schemeClr>
+          </a:lnRef>
+          <a:fillRef idx="1">
+            <a:schemeClr val="accent1"/>
+          </a:fillRef>
+          <a:effectRef idx="0">
+            <a:schemeClr val="accent1"/>
+          </a:effectRef>
+          <a:fontRef idx="minor">
+            <a:schemeClr val="lt1"/>
+          </a:fontRef>
+        </p:style>
+        <p:txBody>
+          <a:bodyPr rtlCol="0" anchor="ctr"/>
+          <a:lstStyle/>
+          <a:p>
+            <a:pPr algn="ctr"/>
+            <a:r>
+              <a:rPr lang="en-US" sz="2800" dirty="0"/>
+              <a:t>Utility Service</a:t>
+            </a:r>
+          </a:p>
+        </p:txBody>
+      </p:sp>
+      <p:sp>
+        <p:nvSpPr>
+          <p:cNvPr id="31" name="ISO BOX"/>
+          <p:cNvSpPr/>
+          <p:nvPr/>
+        </p:nvSpPr>
+        <p:spPr>
+          <a:xfrm>
+            <a:off x="134385" y="763981"/>
+            <a:ext cx="1737360" cy="1287963"/>
+          </a:xfrm>
+          <a:prstGeom prst="roundRect">
+            <a:avLst>
+              <a:gd name="adj" fmla="val 9258"/>
+            </a:avLst>
+          </a:prstGeom>
+        </p:spPr>
+        <p:style>
+          <a:lnRef idx="2">
+            <a:schemeClr val="accent1">
+              <a:shade val="50000"/>
+            </a:schemeClr>
+          </a:lnRef>
+          <a:fillRef idx="1">
+            <a:schemeClr val="accent1"/>
+          </a:fillRef>
+          <a:effectRef idx="0">
+            <a:schemeClr val="accent1"/>
+          </a:effectRef>
+          <a:fontRef idx="minor">
+            <a:schemeClr val="lt1"/>
+          </a:fontRef>
+        </p:style>
+        <p:txBody>
+          <a:bodyPr rtlCol="0" anchor="ctr"/>
+          <a:lstStyle/>
+          <a:p>
+            <a:pPr algn="ctr"/>
+            <a:r>
+              <a:rPr lang="en-US" sz="2800" dirty="0"/>
+              <a:t>ISO/RTO electricity markets</a:t>
+            </a:r>
+          </a:p>
+        </p:txBody>
+      </p:sp>
+      <p:sp>
+        <p:nvSpPr>
+          <p:cNvPr id="36" name="Other inputs BOX"/>
+          <p:cNvSpPr/>
+          <p:nvPr/>
+        </p:nvSpPr>
+        <p:spPr>
+          <a:xfrm>
+            <a:off x="134385" y="2191730"/>
+            <a:ext cx="1737360" cy="2396311"/>
+          </a:xfrm>
+          <a:prstGeom prst="roundRect">
+            <a:avLst>
+              <a:gd name="adj" fmla="val 9258"/>
+            </a:avLst>
+          </a:prstGeom>
+        </p:spPr>
+        <p:style>
+          <a:lnRef idx="2">
+            <a:schemeClr val="accent1">
+              <a:shade val="50000"/>
+            </a:schemeClr>
+          </a:lnRef>
+          <a:fillRef idx="1">
+            <a:schemeClr val="accent1"/>
+          </a:fillRef>
+          <a:effectRef idx="0">
+            <a:schemeClr val="accent1"/>
+          </a:effectRef>
+          <a:fontRef idx="minor">
+            <a:schemeClr val="lt1"/>
+          </a:fontRef>
+        </p:style>
+        <p:txBody>
+          <a:bodyPr rtlCol="0" anchor="ctr"/>
+          <a:lstStyle/>
+          <a:p>
+            <a:pPr algn="ctr"/>
+            <a:r>
+              <a:rPr lang="en-US" sz="2800" dirty="0"/>
+              <a:t>Other Inputs</a:t>
+            </a:r>
+          </a:p>
+        </p:txBody>
+      </p:sp>
+      <p:sp>
+        <p:nvSpPr>
+          <p:cNvPr id="37" name="Input Categories"/>
+          <p:cNvSpPr txBox="1"/>
+          <p:nvPr/>
+        </p:nvSpPr>
+        <p:spPr>
+          <a:xfrm>
+            <a:off x="531421" y="-1930640"/>
+            <a:ext cx="992579" cy="461665"/>
+          </a:xfrm>
+          <a:prstGeom prst="rect">
+            <a:avLst/>
+          </a:prstGeom>
+          <a:noFill/>
+        </p:spPr>
+        <p:txBody>
+          <a:bodyPr wrap="none" rtlCol="0">
+            <a:spAutoFit/>
+          </a:bodyPr>
+          <a:lstStyle/>
+          <a:p>
+            <a:r>
+              <a:rPr lang="en-US" sz="2400" b="1" dirty="0">
+                <a:solidFill>
+                  <a:schemeClr val="bg2"/>
+                </a:solidFill>
+              </a:rPr>
+              <a:t>Inputs</a:t>
+            </a:r>
+          </a:p>
+        </p:txBody>
+      </p:sp>
+      <p:sp>
+        <p:nvSpPr>
+          <p:cNvPr id="38" name="Input Val"/>
+          <p:cNvSpPr txBox="1"/>
+          <p:nvPr/>
+        </p:nvSpPr>
+        <p:spPr>
+          <a:xfrm>
+            <a:off x="2453640" y="-1930640"/>
+            <a:ext cx="1775486" cy="461665"/>
+          </a:xfrm>
+          <a:prstGeom prst="rect">
+            <a:avLst/>
+          </a:prstGeom>
+          <a:noFill/>
+        </p:spPr>
+        <p:txBody>
+          <a:bodyPr wrap="none" rtlCol="0">
+            <a:spAutoFit/>
+          </a:bodyPr>
+          <a:lstStyle/>
+          <a:p>
+            <a:r>
+              <a:rPr lang="en-US" sz="2400" b="1" dirty="0">
+                <a:solidFill>
+                  <a:schemeClr val="bg2"/>
+                </a:solidFill>
+              </a:rPr>
+              <a:t>Input Values</a:t>
+            </a:r>
+          </a:p>
+        </p:txBody>
+      </p:sp>
+      <p:sp>
+        <p:nvSpPr>
+          <p:cNvPr id="39" name="Model"/>
+          <p:cNvSpPr txBox="1"/>
+          <p:nvPr/>
+        </p:nvSpPr>
+        <p:spPr>
+          <a:xfrm>
+            <a:off x="5596858" y="-1930640"/>
+            <a:ext cx="1015021" cy="461665"/>
+          </a:xfrm>
+          <a:prstGeom prst="rect">
+            <a:avLst/>
+          </a:prstGeom>
+          <a:noFill/>
+        </p:spPr>
+        <p:txBody>
+          <a:bodyPr wrap="none" rtlCol="0">
+            <a:spAutoFit/>
+          </a:bodyPr>
+          <a:lstStyle/>
+          <a:p>
+            <a:pPr algn="ctr"/>
+            <a:r>
+              <a:rPr lang="en-US" sz="2400" b="1" dirty="0">
+                <a:solidFill>
+                  <a:schemeClr val="bg2"/>
+                </a:solidFill>
+              </a:rPr>
+              <a:t>Model</a:t>
+            </a:r>
+          </a:p>
+        </p:txBody>
+      </p:sp>
+      <p:sp>
+        <p:nvSpPr>
+          <p:cNvPr id="40" name="Output Arrow" hidden="1"/>
+          <p:cNvSpPr/>
+          <p:nvPr/>
+        </p:nvSpPr>
+        <p:spPr>
+          <a:xfrm>
+            <a:off x="7147560" y="600714"/>
+            <a:ext cx="2083123" cy="4080567"/>
+          </a:xfrm>
+          <a:prstGeom prst="downArrow">
+            <a:avLst>
+              <a:gd name="adj1" fmla="val 100000"/>
+              <a:gd name="adj2" fmla="val 23110"/>
+            </a:avLst>
+          </a:prstGeom>
+          <a:solidFill>
+            <a:srgbClr val="FFC000"/>
+          </a:solidFill>
+          <a:ln>
+            <a:solidFill>
+              <a:schemeClr val="accent3"/>
+            </a:solidFill>
+          </a:ln>
+          <a:scene3d>
+            <a:camera prst="orthographicFront">
+              <a:rot lat="0" lon="10800000" rev="5400000"/>
+            </a:camera>
+            <a:lightRig rig="threePt" dir="t"/>
+          </a:scene3d>
+        </p:spPr>
+        <p:style>
+          <a:lnRef idx="2">
+            <a:schemeClr val="accent1">
+              <a:shade val="50000"/>
+            </a:schemeClr>
+          </a:lnRef>
+          <a:fillRef idx="1">
+            <a:schemeClr val="accent1"/>
+          </a:fillRef>
+          <a:effectRef idx="0">
+            <a:schemeClr val="accent1"/>
+          </a:effectRef>
+          <a:fontRef idx="minor">
+            <a:schemeClr val="lt1"/>
+          </a:fontRef>
+        </p:style>
+        <p:txBody>
+          <a:bodyPr rtlCol="0" anchor="ctr"/>
+          <a:lstStyle/>
+          <a:p>
+            <a:pPr algn="ctr"/>
+            <a:endParaRPr lang="en-US"/>
+          </a:p>
+        </p:txBody>
+      </p:sp>
+      <p:sp>
+        <p:nvSpPr>
+          <p:cNvPr id="41" name="Output" hidden="1"/>
+          <p:cNvSpPr txBox="1"/>
+          <p:nvPr/>
+        </p:nvSpPr>
+        <p:spPr>
+          <a:xfrm>
+            <a:off x="7262730" y="1645467"/>
+            <a:ext cx="2598853" cy="2062103"/>
+          </a:xfrm>
+          <a:prstGeom prst="rect">
+            <a:avLst/>
+          </a:prstGeom>
+          <a:noFill/>
+        </p:spPr>
+        <p:txBody>
+          <a:bodyPr wrap="none" rtlCol="0">
+            <a:spAutoFit/>
+          </a:bodyPr>
+          <a:lstStyle/>
+          <a:p>
+            <a:r>
+              <a:rPr lang="en-US" sz="2400" dirty="0">
+                <a:solidFill>
+                  <a:schemeClr val="bg2"/>
+                </a:solidFill>
+              </a:rPr>
+              <a:t>Maximum Revenue</a:t>
+            </a:r>
+          </a:p>
+          <a:p>
+            <a:r>
+              <a:rPr lang="en-US" sz="2400" dirty="0">
+                <a:solidFill>
+                  <a:schemeClr val="bg2"/>
+                </a:solidFill>
+              </a:rPr>
+              <a:t>     (by component)</a:t>
+            </a:r>
+          </a:p>
+          <a:p>
+            <a:endParaRPr lang="en-US" sz="400" dirty="0">
+              <a:solidFill>
+                <a:schemeClr val="bg2"/>
+              </a:solidFill>
+            </a:endParaRPr>
+          </a:p>
+          <a:p>
+            <a:r>
+              <a:rPr lang="en-US" sz="2400" dirty="0">
+                <a:solidFill>
+                  <a:schemeClr val="bg2"/>
+                </a:solidFill>
+              </a:rPr>
+              <a:t>Annualized Cost</a:t>
+            </a:r>
+          </a:p>
+          <a:p>
+            <a:r>
+              <a:rPr lang="en-US" sz="2400" dirty="0">
+                <a:solidFill>
+                  <a:schemeClr val="bg2"/>
+                </a:solidFill>
+              </a:rPr>
+              <a:t>  (by component)</a:t>
+            </a:r>
+          </a:p>
+          <a:p>
+            <a:endParaRPr lang="en-US" sz="400" dirty="0">
+              <a:solidFill>
+                <a:schemeClr val="bg2"/>
+              </a:solidFill>
+            </a:endParaRPr>
+          </a:p>
+          <a:p>
+            <a:r>
+              <a:rPr lang="en-US" sz="2400" dirty="0">
+                <a:solidFill>
+                  <a:schemeClr val="bg2"/>
+                </a:solidFill>
+              </a:rPr>
+              <a:t>Operating Profiles</a:t>
+            </a:r>
+          </a:p>
+        </p:txBody>
+      </p:sp>
+      <p:sp>
+        <p:nvSpPr>
+          <p:cNvPr id="42" name="Output"/>
+          <p:cNvSpPr txBox="1"/>
+          <p:nvPr/>
+        </p:nvSpPr>
+        <p:spPr>
+          <a:xfrm>
+            <a:off x="7572077" y="-1933302"/>
+            <a:ext cx="1226618" cy="461665"/>
+          </a:xfrm>
+          <a:prstGeom prst="rect">
+            <a:avLst/>
+          </a:prstGeom>
+          <a:noFill/>
+        </p:spPr>
+        <p:txBody>
+          <a:bodyPr wrap="none" rtlCol="0">
+            <a:spAutoFit/>
+          </a:bodyPr>
+          <a:lstStyle/>
+          <a:p>
+            <a:pPr algn="ctr"/>
+            <a:r>
+              <a:rPr lang="en-US" sz="2400" b="1" dirty="0">
+                <a:solidFill>
+                  <a:schemeClr val="bg2"/>
+                </a:solidFill>
+              </a:rPr>
+              <a:t>Outputs</a:t>
+            </a:r>
+          </a:p>
+        </p:txBody>
+      </p:sp>
+      <p:sp>
+        <p:nvSpPr>
+          <p:cNvPr id="51" name="Output Arrow"/>
+          <p:cNvSpPr/>
+          <p:nvPr/>
+        </p:nvSpPr>
+        <p:spPr>
+          <a:xfrm>
+            <a:off x="7383755" y="1756353"/>
+            <a:ext cx="971792" cy="4080567"/>
+          </a:xfrm>
+          <a:prstGeom prst="downArrow">
+            <a:avLst>
+              <a:gd name="adj1" fmla="val 100000"/>
+              <a:gd name="adj2" fmla="val 37001"/>
+            </a:avLst>
+          </a:prstGeom>
+          <a:solidFill>
+            <a:srgbClr val="FFC000"/>
+          </a:solidFill>
+          <a:ln>
+            <a:solidFill>
+              <a:schemeClr val="accent3"/>
+            </a:solidFill>
+          </a:ln>
+          <a:scene3d>
+            <a:camera prst="orthographicFront">
+              <a:rot lat="0" lon="10800000" rev="5400000"/>
+            </a:camera>
+            <a:lightRig rig="threePt" dir="t"/>
+          </a:scene3d>
+        </p:spPr>
+        <p:style>
+          <a:lnRef idx="2">
+            <a:schemeClr val="accent1">
+              <a:shade val="50000"/>
+            </a:schemeClr>
+          </a:lnRef>
+          <a:fillRef idx="1">
+            <a:schemeClr val="accent1"/>
+          </a:fillRef>
+          <a:effectRef idx="0">
+            <a:schemeClr val="accent1"/>
+          </a:effectRef>
+          <a:fontRef idx="minor">
+            <a:schemeClr val="lt1"/>
+          </a:fontRef>
+        </p:style>
+        <p:txBody>
+          <a:bodyPr rtlCol="0" anchor="ctr"/>
+          <a:lstStyle/>
+          <a:p>
+            <a:pPr algn="ctr"/>
+            <a:endParaRPr lang="en-US"/>
+          </a:p>
+        </p:txBody>
+      </p:sp>
+      <p:sp>
+        <p:nvSpPr>
+          <p:cNvPr id="53" name="Output Arrow"/>
+          <p:cNvSpPr/>
+          <p:nvPr/>
+        </p:nvSpPr>
+        <p:spPr>
+          <a:xfrm>
+            <a:off x="7383755" y="568770"/>
+            <a:ext cx="971792" cy="4080567"/>
+          </a:xfrm>
+          <a:prstGeom prst="downArrow">
+            <a:avLst>
+              <a:gd name="adj1" fmla="val 100000"/>
+              <a:gd name="adj2" fmla="val 37001"/>
+            </a:avLst>
+          </a:prstGeom>
+          <a:solidFill>
+            <a:srgbClr val="FFC000"/>
+          </a:solidFill>
+          <a:ln>
+            <a:solidFill>
+              <a:schemeClr val="accent3"/>
+            </a:solidFill>
+          </a:ln>
+          <a:scene3d>
+            <a:camera prst="orthographicFront">
+              <a:rot lat="0" lon="10800000" rev="5400000"/>
+            </a:camera>
+            <a:lightRig rig="threePt" dir="t"/>
+          </a:scene3d>
+        </p:spPr>
+        <p:style>
+          <a:lnRef idx="2">
+            <a:schemeClr val="accent1">
+              <a:shade val="50000"/>
+            </a:schemeClr>
+          </a:lnRef>
+          <a:fillRef idx="1">
+            <a:schemeClr val="accent1"/>
+          </a:fillRef>
+          <a:effectRef idx="0">
+            <a:schemeClr val="accent1"/>
+          </a:effectRef>
+          <a:fontRef idx="minor">
+            <a:schemeClr val="lt1"/>
+          </a:fontRef>
+        </p:style>
+        <p:txBody>
+          <a:bodyPr rtlCol="0" anchor="ctr"/>
+          <a:lstStyle/>
+          <a:p>
+            <a:pPr algn="ctr"/>
+            <a:endParaRPr lang="en-US"/>
+          </a:p>
+        </p:txBody>
+      </p:sp>
+      <p:sp>
+        <p:nvSpPr>
+          <p:cNvPr id="54" name="Output Arrow"/>
+          <p:cNvSpPr/>
+          <p:nvPr/>
+        </p:nvSpPr>
+        <p:spPr>
+          <a:xfrm>
+            <a:off x="7383755" y="-608463"/>
+            <a:ext cx="971792" cy="4080567"/>
+          </a:xfrm>
+          <a:prstGeom prst="downArrow">
+            <a:avLst>
+              <a:gd name="adj1" fmla="val 100000"/>
+              <a:gd name="adj2" fmla="val 37001"/>
+            </a:avLst>
+          </a:prstGeom>
+          <a:solidFill>
+            <a:srgbClr val="FFC000"/>
+          </a:solidFill>
+          <a:ln>
+            <a:solidFill>
+              <a:schemeClr val="accent3"/>
+            </a:solidFill>
+          </a:ln>
+          <a:scene3d>
+            <a:camera prst="orthographicFront">
+              <a:rot lat="0" lon="10800000" rev="5400000"/>
+            </a:camera>
+            <a:lightRig rig="threePt" dir="t"/>
+          </a:scene3d>
+        </p:spPr>
+        <p:style>
+          <a:lnRef idx="2">
+            <a:schemeClr val="accent1">
+              <a:shade val="50000"/>
+            </a:schemeClr>
+          </a:lnRef>
+          <a:fillRef idx="1">
+            <a:schemeClr val="accent1"/>
+          </a:fillRef>
+          <a:effectRef idx="0">
+            <a:schemeClr val="accent1"/>
+          </a:effectRef>
+          <a:fontRef idx="minor">
+            <a:schemeClr val="lt1"/>
+          </a:fontRef>
+        </p:style>
+        <p:txBody>
+          <a:bodyPr rtlCol="0" anchor="ctr"/>
+          <a:lstStyle/>
+          <a:p>
+            <a:pPr algn="ctr"/>
+            <a:endParaRPr lang="en-US"/>
+          </a:p>
+        </p:txBody>
+      </p:sp>
+      <p:sp>
+        <p:nvSpPr>
+          <p:cNvPr id="43" name="Opt Model BOX"/>
+          <p:cNvSpPr/>
+          <p:nvPr/>
+        </p:nvSpPr>
+        <p:spPr>
+          <a:xfrm>
+            <a:off x="5029200" y="-1461589"/>
+            <a:ext cx="2169531" cy="8270425"/>
+          </a:xfrm>
+          <a:prstGeom prst="roundRect">
+            <a:avLst>
+              <a:gd name="adj" fmla="val 9258"/>
+            </a:avLst>
+          </a:prstGeom>
+        </p:spPr>
+        <p:style>
+          <a:lnRef idx="2">
+            <a:schemeClr val="accent1">
+              <a:shade val="50000"/>
+            </a:schemeClr>
+          </a:lnRef>
+          <a:fillRef idx="1">
+            <a:schemeClr val="accent1"/>
+          </a:fillRef>
+          <a:effectRef idx="0">
+            <a:schemeClr val="accent1"/>
+          </a:effectRef>
+          <a:fontRef idx="minor">
+            <a:schemeClr val="lt1"/>
+          </a:fontRef>
+        </p:style>
+        <p:txBody>
+          <a:bodyPr rtlCol="0" anchor="ctr"/>
+          <a:lstStyle/>
+          <a:p>
+            <a:pPr algn="ctr"/>
+            <a:r>
+              <a:rPr lang="en-US" sz="2800" dirty="0"/>
+              <a:t>Revenue Operation and Device Optimization Model</a:t>
+            </a:r>
+          </a:p>
+          <a:p>
+            <a:pPr algn="ctr"/>
+            <a:r>
+              <a:rPr lang="en-US" sz="2800" dirty="0"/>
+              <a:t>(</a:t>
+            </a:r>
+            <a:r>
+              <a:rPr lang="en-US" sz="2800" dirty="0" err="1"/>
+              <a:t>RODeO</a:t>
+            </a:r>
+            <a:r>
+              <a:rPr lang="en-US" sz="2800" dirty="0"/>
+              <a:t>)</a:t>
+            </a:r>
+          </a:p>
+        </p:txBody>
+      </p:sp>
+      <p:sp>
+        <p:nvSpPr>
+          <p:cNvPr id="50" name="Output"/>
+          <p:cNvSpPr txBox="1"/>
+          <p:nvPr/>
+        </p:nvSpPr>
+        <p:spPr>
+          <a:xfrm>
+            <a:off x="7178259" y="2188022"/>
+            <a:ext cx="2598853" cy="830997"/>
+          </a:xfrm>
+          <a:prstGeom prst="rect">
+            <a:avLst/>
+          </a:prstGeom>
+          <a:noFill/>
+        </p:spPr>
+        <p:txBody>
+          <a:bodyPr wrap="none" rtlCol="0">
+            <a:spAutoFit/>
+          </a:bodyPr>
+          <a:lstStyle/>
+          <a:p>
+            <a:r>
+              <a:rPr lang="en-US" sz="2400" dirty="0">
+                <a:solidFill>
+                  <a:schemeClr val="bg2"/>
+                </a:solidFill>
+              </a:rPr>
+              <a:t>Maximum Revenue</a:t>
+            </a:r>
+          </a:p>
+          <a:p>
+            <a:r>
+              <a:rPr lang="en-US" sz="2400" dirty="0">
+                <a:solidFill>
+                  <a:schemeClr val="bg2"/>
+                </a:solidFill>
+              </a:rPr>
+              <a:t>     (by component)</a:t>
+            </a:r>
+          </a:p>
+        </p:txBody>
+      </p:sp>
+      <p:sp>
+        <p:nvSpPr>
+          <p:cNvPr id="55" name="Output"/>
+          <p:cNvSpPr txBox="1"/>
+          <p:nvPr/>
+        </p:nvSpPr>
+        <p:spPr>
+          <a:xfrm>
+            <a:off x="7321215" y="3294410"/>
+            <a:ext cx="2312941" cy="892552"/>
+          </a:xfrm>
+          <a:prstGeom prst="rect">
+            <a:avLst/>
+          </a:prstGeom>
+          <a:noFill/>
+        </p:spPr>
+        <p:txBody>
+          <a:bodyPr wrap="none" rtlCol="0">
+            <a:spAutoFit/>
+          </a:bodyPr>
+          <a:lstStyle/>
+          <a:p>
+            <a:endParaRPr lang="en-US" sz="400" dirty="0">
+              <a:solidFill>
+                <a:schemeClr val="bg2"/>
+              </a:solidFill>
+            </a:endParaRPr>
+          </a:p>
+          <a:p>
+            <a:r>
+              <a:rPr lang="en-US" sz="2400" dirty="0">
+                <a:solidFill>
+                  <a:schemeClr val="bg2"/>
+                </a:solidFill>
+              </a:rPr>
+              <a:t>Annualized Cost</a:t>
+            </a:r>
+          </a:p>
+          <a:p>
+            <a:r>
+              <a:rPr lang="en-US" sz="2400" dirty="0">
+                <a:solidFill>
+                  <a:schemeClr val="bg2"/>
+                </a:solidFill>
+              </a:rPr>
+              <a:t>  (by component)</a:t>
+            </a:r>
+          </a:p>
+        </p:txBody>
+      </p:sp>
+      <p:sp>
+        <p:nvSpPr>
+          <p:cNvPr id="52" name="Output"/>
+          <p:cNvSpPr txBox="1"/>
+          <p:nvPr/>
+        </p:nvSpPr>
+        <p:spPr>
+          <a:xfrm>
+            <a:off x="7262288" y="1149142"/>
+            <a:ext cx="2430794" cy="523220"/>
+          </a:xfrm>
+          <a:prstGeom prst="rect">
+            <a:avLst/>
+          </a:prstGeom>
+          <a:noFill/>
+        </p:spPr>
+        <p:txBody>
+          <a:bodyPr wrap="none" rtlCol="0">
+            <a:spAutoFit/>
+          </a:bodyPr>
+          <a:lstStyle/>
+          <a:p>
+            <a:endParaRPr lang="en-US" sz="400" dirty="0">
+              <a:solidFill>
+                <a:schemeClr val="bg2"/>
+              </a:solidFill>
+            </a:endParaRPr>
+          </a:p>
+          <a:p>
+            <a:r>
+              <a:rPr lang="en-US" sz="2400" dirty="0">
+                <a:solidFill>
+                  <a:schemeClr val="bg2"/>
+                </a:solidFill>
+              </a:rPr>
+              <a:t>Operating Profiles</a:t>
+            </a:r>
+          </a:p>
+        </p:txBody>
+      </p:sp>
+      <p:sp>
+        <p:nvSpPr>
+          <p:cNvPr id="11" name="Cost BOX"/>
+          <p:cNvSpPr/>
+          <p:nvPr/>
+        </p:nvSpPr>
+        <p:spPr>
+          <a:xfrm>
+            <a:off x="126220" y="4722581"/>
+            <a:ext cx="1737360" cy="2086255"/>
+          </a:xfrm>
+          <a:prstGeom prst="roundRect">
+            <a:avLst>
+              <a:gd name="adj" fmla="val 9258"/>
+            </a:avLst>
+          </a:prstGeom>
+        </p:spPr>
+        <p:style>
+          <a:lnRef idx="2">
+            <a:schemeClr val="accent1">
+              <a:shade val="50000"/>
+            </a:schemeClr>
+          </a:lnRef>
+          <a:fillRef idx="1">
+            <a:schemeClr val="accent1"/>
+          </a:fillRef>
+          <a:effectRef idx="0">
+            <a:schemeClr val="accent1"/>
+          </a:effectRef>
+          <a:fontRef idx="minor">
+            <a:schemeClr val="lt1"/>
+          </a:fontRef>
+        </p:style>
+        <p:txBody>
+          <a:bodyPr rtlCol="0" anchor="ctr"/>
+          <a:lstStyle/>
+          <a:p>
+            <a:pPr algn="ctr"/>
+            <a:r>
+              <a:rPr lang="en-US" sz="2800" dirty="0"/>
+              <a:t>Cost Inputs</a:t>
+            </a:r>
+          </a:p>
+        </p:txBody>
+      </p:sp>
+    </p:spTree>
+    <p:extLst>
+      <p:ext uri="{BB962C8B-B14F-4D97-AF65-F5344CB8AC3E}">
+        <p14:creationId xmlns:p14="http://schemas.microsoft.com/office/powerpoint/2010/main" val="1807337004"/>
+      </p:ext>
+    </p:extLst>
+  </p:cSld>
+  <p:clrMapOvr>
+    <a:masterClrMapping/>
+  </p:clrMapOvr>
+</p:sld>
+</file>
+
+<file path=ppt/slides/slide7.xml><?xml version="1.0" encoding="utf-8"?>
+<p:sld xmlns:a="http://schemas.openxmlformats.org/drawingml/2006/main" xmlns:r="http://schemas.openxmlformats.org/officeDocument/2006/relationships" xmlns:p="http://schemas.openxmlformats.org/presentationml/2006/main">
+  <p:cSld>
+    <p:spTree>
+      <p:nvGrpSpPr>
+        <p:cNvPr id="1" name=""/>
+        <p:cNvGrpSpPr/>
+        <p:nvPr/>
+      </p:nvGrpSpPr>
+      <p:grpSpPr>
+        <a:xfrm>
+          <a:off x="0" y="0"/>
+          <a:ext cx="0" cy="0"/>
+          <a:chOff x="0" y="0"/>
+          <a:chExt cx="0" cy="0"/>
+        </a:xfrm>
+      </p:grpSpPr>
+      <p:sp>
+        <p:nvSpPr>
           <p:cNvPr id="2" name="Title 1"/>
           <p:cNvSpPr>
             <a:spLocks noGrp="1"/>

</xml_diff>

<commit_message>
Update with LCFS, RPS RECs renewable costs and H2 storage costs
</commit_message>
<xml_diff>
--- a/Optimization model diagram.pptx
+++ b/Optimization model diagram.pptx
@@ -5,7 +5,7 @@
     <p:sldMasterId id="2147483648" r:id="rId1"/>
   </p:sldMasterIdLst>
   <p:notesMasterIdLst>
-    <p:notesMasterId r:id="rId8"/>
+    <p:notesMasterId r:id="rId9"/>
   </p:notesMasterIdLst>
   <p:sldIdLst>
     <p:sldId id="580" r:id="rId2"/>
@@ -13,7 +13,8 @@
     <p:sldId id="583" r:id="rId4"/>
     <p:sldId id="584" r:id="rId5"/>
     <p:sldId id="585" r:id="rId6"/>
-    <p:sldId id="581" r:id="rId7"/>
+    <p:sldId id="586" r:id="rId7"/>
+    <p:sldId id="581" r:id="rId8"/>
   </p:sldIdLst>
   <p:sldSz cx="9144000" cy="6858000" type="screen4x3"/>
   <p:notesSz cx="6858000" cy="9144000"/>
@@ -235,7 +236,7 @@
             <a:fld id="{62430CC7-8C13-4D51-BC46-B95A4AC4A04B}" type="datetimeFigureOut">
               <a:rPr lang="en-US" smtClean="0"/>
               <a:pPr/>
-              <a:t>3/21/2018</a:t>
+              <a:t>6/29/2018</a:t>
             </a:fld>
             <a:endParaRPr lang="en-US"/>
           </a:p>
@@ -1190,7 +1191,7 @@
             <a:fld id="{7CD645B7-0B3A-4239-8069-075A43B72B67}" type="slidenum">
               <a:rPr lang="en-US" smtClean="0"/>
               <a:pPr/>
-              <a:t>6</a:t>
+              <a:t>7</a:t>
             </a:fld>
             <a:endParaRPr lang="en-US"/>
           </a:p>
@@ -11065,6 +11066,2235 @@
       </p:grpSpPr>
       <p:sp>
         <p:nvSpPr>
+          <p:cNvPr id="4" name="Life Arrow"/>
+          <p:cNvSpPr/>
+          <p:nvPr/>
+        </p:nvSpPr>
+        <p:spPr>
+          <a:xfrm>
+            <a:off x="3139440" y="4768331"/>
+            <a:ext cx="366713" cy="3372369"/>
+          </a:xfrm>
+          <a:prstGeom prst="downArrow">
+            <a:avLst>
+              <a:gd name="adj1" fmla="val 100000"/>
+              <a:gd name="adj2" fmla="val 45681"/>
+            </a:avLst>
+          </a:prstGeom>
+          <a:solidFill>
+            <a:srgbClr val="FFC000"/>
+          </a:solidFill>
+          <a:ln>
+            <a:solidFill>
+              <a:schemeClr val="accent3"/>
+            </a:solidFill>
+          </a:ln>
+          <a:scene3d>
+            <a:camera prst="orthographicFront">
+              <a:rot lat="0" lon="10800000" rev="5400000"/>
+            </a:camera>
+            <a:lightRig rig="threePt" dir="t"/>
+          </a:scene3d>
+        </p:spPr>
+        <p:style>
+          <a:lnRef idx="2">
+            <a:schemeClr val="accent1">
+              <a:shade val="50000"/>
+            </a:schemeClr>
+          </a:lnRef>
+          <a:fillRef idx="1">
+            <a:schemeClr val="accent1"/>
+          </a:fillRef>
+          <a:effectRef idx="0">
+            <a:schemeClr val="accent1"/>
+          </a:effectRef>
+          <a:fontRef idx="minor">
+            <a:schemeClr val="lt1"/>
+          </a:fontRef>
+        </p:style>
+        <p:txBody>
+          <a:bodyPr lIns="0" rIns="0" rtlCol="0" anchor="ctr"/>
+          <a:lstStyle/>
+          <a:p>
+            <a:pPr algn="ctr"/>
+            <a:endParaRPr lang="en-US" sz="2400" dirty="0"/>
+          </a:p>
+        </p:txBody>
+      </p:sp>
+      <p:sp>
+        <p:nvSpPr>
+          <p:cNvPr id="6" name="Interest Arrow"/>
+          <p:cNvSpPr/>
+          <p:nvPr/>
+        </p:nvSpPr>
+        <p:spPr>
+          <a:xfrm>
+            <a:off x="3139440" y="4314759"/>
+            <a:ext cx="366713" cy="3372369"/>
+          </a:xfrm>
+          <a:prstGeom prst="downArrow">
+            <a:avLst>
+              <a:gd name="adj1" fmla="val 100000"/>
+              <a:gd name="adj2" fmla="val 45681"/>
+            </a:avLst>
+          </a:prstGeom>
+          <a:solidFill>
+            <a:srgbClr val="FFC000"/>
+          </a:solidFill>
+          <a:ln>
+            <a:solidFill>
+              <a:schemeClr val="accent3"/>
+            </a:solidFill>
+          </a:ln>
+          <a:scene3d>
+            <a:camera prst="orthographicFront">
+              <a:rot lat="0" lon="10800000" rev="5400000"/>
+            </a:camera>
+            <a:lightRig rig="threePt" dir="t"/>
+          </a:scene3d>
+        </p:spPr>
+        <p:style>
+          <a:lnRef idx="2">
+            <a:schemeClr val="accent1">
+              <a:shade val="50000"/>
+            </a:schemeClr>
+          </a:lnRef>
+          <a:fillRef idx="1">
+            <a:schemeClr val="accent1"/>
+          </a:fillRef>
+          <a:effectRef idx="0">
+            <a:schemeClr val="accent1"/>
+          </a:effectRef>
+          <a:fontRef idx="minor">
+            <a:schemeClr val="lt1"/>
+          </a:fontRef>
+        </p:style>
+        <p:txBody>
+          <a:bodyPr lIns="0" rIns="0" rtlCol="0" anchor="ctr"/>
+          <a:lstStyle/>
+          <a:p>
+            <a:pPr algn="ctr"/>
+            <a:endParaRPr lang="en-US" sz="2400" dirty="0"/>
+          </a:p>
+        </p:txBody>
+      </p:sp>
+      <p:sp>
+        <p:nvSpPr>
+          <p:cNvPr id="8" name="FOM Arrow"/>
+          <p:cNvSpPr/>
+          <p:nvPr/>
+        </p:nvSpPr>
+        <p:spPr>
+          <a:xfrm>
+            <a:off x="3139440" y="3861188"/>
+            <a:ext cx="366713" cy="3372369"/>
+          </a:xfrm>
+          <a:prstGeom prst="downArrow">
+            <a:avLst>
+              <a:gd name="adj1" fmla="val 100000"/>
+              <a:gd name="adj2" fmla="val 45681"/>
+            </a:avLst>
+          </a:prstGeom>
+          <a:solidFill>
+            <a:srgbClr val="FFC000"/>
+          </a:solidFill>
+          <a:ln>
+            <a:solidFill>
+              <a:schemeClr val="accent3"/>
+            </a:solidFill>
+          </a:ln>
+          <a:scene3d>
+            <a:camera prst="orthographicFront">
+              <a:rot lat="0" lon="10800000" rev="5400000"/>
+            </a:camera>
+            <a:lightRig rig="threePt" dir="t"/>
+          </a:scene3d>
+        </p:spPr>
+        <p:style>
+          <a:lnRef idx="2">
+            <a:schemeClr val="accent1">
+              <a:shade val="50000"/>
+            </a:schemeClr>
+          </a:lnRef>
+          <a:fillRef idx="1">
+            <a:schemeClr val="accent1"/>
+          </a:fillRef>
+          <a:effectRef idx="0">
+            <a:schemeClr val="accent1"/>
+          </a:effectRef>
+          <a:fontRef idx="minor">
+            <a:schemeClr val="lt1"/>
+          </a:fontRef>
+        </p:style>
+        <p:txBody>
+          <a:bodyPr lIns="0" rIns="0" rtlCol="0" anchor="ctr"/>
+          <a:lstStyle/>
+          <a:p>
+            <a:pPr algn="ctr"/>
+            <a:endParaRPr lang="en-US" sz="2400" dirty="0"/>
+          </a:p>
+        </p:txBody>
+      </p:sp>
+      <p:sp>
+        <p:nvSpPr>
+          <p:cNvPr id="44" name="Cap Arrow"/>
+          <p:cNvSpPr/>
+          <p:nvPr/>
+        </p:nvSpPr>
+        <p:spPr>
+          <a:xfrm>
+            <a:off x="3139440" y="3388748"/>
+            <a:ext cx="366713" cy="3372369"/>
+          </a:xfrm>
+          <a:prstGeom prst="downArrow">
+            <a:avLst>
+              <a:gd name="adj1" fmla="val 100000"/>
+              <a:gd name="adj2" fmla="val 45681"/>
+            </a:avLst>
+          </a:prstGeom>
+          <a:solidFill>
+            <a:srgbClr val="FFC000"/>
+          </a:solidFill>
+          <a:ln>
+            <a:solidFill>
+              <a:schemeClr val="accent3"/>
+            </a:solidFill>
+          </a:ln>
+          <a:scene3d>
+            <a:camera prst="orthographicFront">
+              <a:rot lat="0" lon="10800000" rev="5400000"/>
+            </a:camera>
+            <a:lightRig rig="threePt" dir="t"/>
+          </a:scene3d>
+        </p:spPr>
+        <p:style>
+          <a:lnRef idx="2">
+            <a:schemeClr val="accent1">
+              <a:shade val="50000"/>
+            </a:schemeClr>
+          </a:lnRef>
+          <a:fillRef idx="1">
+            <a:schemeClr val="accent1"/>
+          </a:fillRef>
+          <a:effectRef idx="0">
+            <a:schemeClr val="accent1"/>
+          </a:effectRef>
+          <a:fontRef idx="minor">
+            <a:schemeClr val="lt1"/>
+          </a:fontRef>
+        </p:style>
+        <p:txBody>
+          <a:bodyPr lIns="0" rIns="0" rtlCol="0" anchor="ctr"/>
+          <a:lstStyle/>
+          <a:p>
+            <a:pPr algn="ctr"/>
+            <a:endParaRPr lang="en-US" sz="2400" dirty="0"/>
+          </a:p>
+        </p:txBody>
+      </p:sp>
+      <p:sp>
+        <p:nvSpPr>
+          <p:cNvPr id="18" name="Energy Arrow"/>
+          <p:cNvSpPr/>
+          <p:nvPr/>
+        </p:nvSpPr>
+        <p:spPr>
+          <a:xfrm>
+            <a:off x="3139440" y="-502961"/>
+            <a:ext cx="366713" cy="3372369"/>
+          </a:xfrm>
+          <a:prstGeom prst="downArrow">
+            <a:avLst>
+              <a:gd name="adj1" fmla="val 100000"/>
+              <a:gd name="adj2" fmla="val 45681"/>
+            </a:avLst>
+          </a:prstGeom>
+          <a:solidFill>
+            <a:srgbClr val="FFC000"/>
+          </a:solidFill>
+          <a:ln>
+            <a:solidFill>
+              <a:schemeClr val="accent3"/>
+            </a:solidFill>
+          </a:ln>
+          <a:scene3d>
+            <a:camera prst="orthographicFront">
+              <a:rot lat="0" lon="10800000" rev="5400000"/>
+            </a:camera>
+            <a:lightRig rig="threePt" dir="t"/>
+          </a:scene3d>
+        </p:spPr>
+        <p:style>
+          <a:lnRef idx="2">
+            <a:schemeClr val="accent1">
+              <a:shade val="50000"/>
+            </a:schemeClr>
+          </a:lnRef>
+          <a:fillRef idx="1">
+            <a:schemeClr val="accent1"/>
+          </a:fillRef>
+          <a:effectRef idx="0">
+            <a:schemeClr val="accent1"/>
+          </a:effectRef>
+          <a:fontRef idx="minor">
+            <a:schemeClr val="lt1"/>
+          </a:fontRef>
+        </p:style>
+        <p:txBody>
+          <a:bodyPr lIns="0" rIns="0" rtlCol="0" anchor="ctr"/>
+          <a:lstStyle/>
+          <a:p>
+            <a:pPr algn="ctr"/>
+            <a:endParaRPr lang="en-US" sz="2400"/>
+          </a:p>
+        </p:txBody>
+      </p:sp>
+      <p:sp>
+        <p:nvSpPr>
+          <p:cNvPr id="20" name="Reserve Arrow"/>
+          <p:cNvSpPr/>
+          <p:nvPr/>
+        </p:nvSpPr>
+        <p:spPr>
+          <a:xfrm>
+            <a:off x="3139440" y="-56810"/>
+            <a:ext cx="366713" cy="3372369"/>
+          </a:xfrm>
+          <a:prstGeom prst="downArrow">
+            <a:avLst>
+              <a:gd name="adj1" fmla="val 100000"/>
+              <a:gd name="adj2" fmla="val 45681"/>
+            </a:avLst>
+          </a:prstGeom>
+          <a:solidFill>
+            <a:srgbClr val="FFC000"/>
+          </a:solidFill>
+          <a:ln>
+            <a:solidFill>
+              <a:schemeClr val="accent3"/>
+            </a:solidFill>
+          </a:ln>
+          <a:scene3d>
+            <a:camera prst="orthographicFront">
+              <a:rot lat="0" lon="10800000" rev="5400000"/>
+            </a:camera>
+            <a:lightRig rig="threePt" dir="t"/>
+          </a:scene3d>
+        </p:spPr>
+        <p:style>
+          <a:lnRef idx="2">
+            <a:schemeClr val="accent1">
+              <a:shade val="50000"/>
+            </a:schemeClr>
+          </a:lnRef>
+          <a:fillRef idx="1">
+            <a:schemeClr val="accent1"/>
+          </a:fillRef>
+          <a:effectRef idx="0">
+            <a:schemeClr val="accent1"/>
+          </a:effectRef>
+          <a:fontRef idx="minor">
+            <a:schemeClr val="lt1"/>
+          </a:fontRef>
+        </p:style>
+        <p:txBody>
+          <a:bodyPr lIns="0" rIns="0" rtlCol="0" anchor="ctr"/>
+          <a:lstStyle/>
+          <a:p>
+            <a:pPr algn="ctr"/>
+            <a:endParaRPr lang="en-US" sz="2400"/>
+          </a:p>
+        </p:txBody>
+      </p:sp>
+      <p:sp>
+        <p:nvSpPr>
+          <p:cNvPr id="22" name="Meter Arrow"/>
+          <p:cNvSpPr/>
+          <p:nvPr/>
+        </p:nvSpPr>
+        <p:spPr>
+          <a:xfrm>
+            <a:off x="3139440" y="-1415837"/>
+            <a:ext cx="366713" cy="3372369"/>
+          </a:xfrm>
+          <a:prstGeom prst="downArrow">
+            <a:avLst>
+              <a:gd name="adj1" fmla="val 100000"/>
+              <a:gd name="adj2" fmla="val 45681"/>
+            </a:avLst>
+          </a:prstGeom>
+          <a:solidFill>
+            <a:srgbClr val="FFC000"/>
+          </a:solidFill>
+          <a:ln>
+            <a:solidFill>
+              <a:schemeClr val="accent3"/>
+            </a:solidFill>
+          </a:ln>
+          <a:scene3d>
+            <a:camera prst="orthographicFront">
+              <a:rot lat="0" lon="10800000" rev="5400000"/>
+            </a:camera>
+            <a:lightRig rig="threePt" dir="t"/>
+          </a:scene3d>
+        </p:spPr>
+        <p:style>
+          <a:lnRef idx="2">
+            <a:schemeClr val="accent1">
+              <a:shade val="50000"/>
+            </a:schemeClr>
+          </a:lnRef>
+          <a:fillRef idx="1">
+            <a:schemeClr val="accent1"/>
+          </a:fillRef>
+          <a:effectRef idx="0">
+            <a:schemeClr val="accent1"/>
+          </a:effectRef>
+          <a:fontRef idx="minor">
+            <a:schemeClr val="lt1"/>
+          </a:fontRef>
+        </p:style>
+        <p:txBody>
+          <a:bodyPr lIns="0" rIns="0" rtlCol="0" anchor="ctr"/>
+          <a:lstStyle/>
+          <a:p>
+            <a:pPr algn="ctr"/>
+            <a:endParaRPr lang="en-US" sz="2400" dirty="0"/>
+          </a:p>
+        </p:txBody>
+      </p:sp>
+      <p:sp>
+        <p:nvSpPr>
+          <p:cNvPr id="24" name="TDC Arrow"/>
+          <p:cNvSpPr/>
+          <p:nvPr/>
+        </p:nvSpPr>
+        <p:spPr>
+          <a:xfrm>
+            <a:off x="3139440" y="-1873622"/>
+            <a:ext cx="366713" cy="3374062"/>
+          </a:xfrm>
+          <a:prstGeom prst="downArrow">
+            <a:avLst>
+              <a:gd name="adj1" fmla="val 100000"/>
+              <a:gd name="adj2" fmla="val 45681"/>
+            </a:avLst>
+          </a:prstGeom>
+          <a:solidFill>
+            <a:srgbClr val="FFC000"/>
+          </a:solidFill>
+          <a:ln>
+            <a:solidFill>
+              <a:schemeClr val="accent3"/>
+            </a:solidFill>
+          </a:ln>
+          <a:scene3d>
+            <a:camera prst="orthographicFront">
+              <a:rot lat="0" lon="10800000" rev="5400000"/>
+            </a:camera>
+            <a:lightRig rig="threePt" dir="t"/>
+          </a:scene3d>
+        </p:spPr>
+        <p:style>
+          <a:lnRef idx="2">
+            <a:schemeClr val="accent1">
+              <a:shade val="50000"/>
+            </a:schemeClr>
+          </a:lnRef>
+          <a:fillRef idx="1">
+            <a:schemeClr val="accent1"/>
+          </a:fillRef>
+          <a:effectRef idx="0">
+            <a:schemeClr val="accent1"/>
+          </a:effectRef>
+          <a:fontRef idx="minor">
+            <a:schemeClr val="lt1"/>
+          </a:fontRef>
+        </p:style>
+        <p:txBody>
+          <a:bodyPr lIns="0" rIns="0" rtlCol="0" anchor="ctr"/>
+          <a:lstStyle/>
+          <a:p>
+            <a:pPr algn="ctr"/>
+            <a:endParaRPr lang="en-US" sz="2400"/>
+          </a:p>
+        </p:txBody>
+      </p:sp>
+      <p:sp>
+        <p:nvSpPr>
+          <p:cNvPr id="26" name="FDC Arrow"/>
+          <p:cNvSpPr/>
+          <p:nvPr/>
+        </p:nvSpPr>
+        <p:spPr>
+          <a:xfrm>
+            <a:off x="3139440" y="-2331761"/>
+            <a:ext cx="366713" cy="3372369"/>
+          </a:xfrm>
+          <a:prstGeom prst="downArrow">
+            <a:avLst>
+              <a:gd name="adj1" fmla="val 100000"/>
+              <a:gd name="adj2" fmla="val 45681"/>
+            </a:avLst>
+          </a:prstGeom>
+          <a:solidFill>
+            <a:srgbClr val="FFC000"/>
+          </a:solidFill>
+          <a:ln>
+            <a:solidFill>
+              <a:schemeClr val="accent3"/>
+            </a:solidFill>
+          </a:ln>
+          <a:scene3d>
+            <a:camera prst="orthographicFront">
+              <a:rot lat="0" lon="10800000" rev="5400000"/>
+            </a:camera>
+            <a:lightRig rig="threePt" dir="t"/>
+          </a:scene3d>
+        </p:spPr>
+        <p:style>
+          <a:lnRef idx="2">
+            <a:schemeClr val="accent1">
+              <a:shade val="50000"/>
+            </a:schemeClr>
+          </a:lnRef>
+          <a:fillRef idx="1">
+            <a:schemeClr val="accent1"/>
+          </a:fillRef>
+          <a:effectRef idx="0">
+            <a:schemeClr val="accent1"/>
+          </a:effectRef>
+          <a:fontRef idx="minor">
+            <a:schemeClr val="lt1"/>
+          </a:fontRef>
+        </p:style>
+        <p:txBody>
+          <a:bodyPr lIns="0" rIns="0" rtlCol="0" anchor="ctr"/>
+          <a:lstStyle/>
+          <a:p>
+            <a:pPr algn="ctr"/>
+            <a:endParaRPr lang="en-US" sz="2400"/>
+          </a:p>
+        </p:txBody>
+      </p:sp>
+      <p:sp>
+        <p:nvSpPr>
+          <p:cNvPr id="28" name="Energy Arrow"/>
+          <p:cNvSpPr/>
+          <p:nvPr/>
+        </p:nvSpPr>
+        <p:spPr>
+          <a:xfrm>
+            <a:off x="3139440" y="-2788961"/>
+            <a:ext cx="366713" cy="3372369"/>
+          </a:xfrm>
+          <a:prstGeom prst="downArrow">
+            <a:avLst>
+              <a:gd name="adj1" fmla="val 100000"/>
+              <a:gd name="adj2" fmla="val 45681"/>
+            </a:avLst>
+          </a:prstGeom>
+          <a:solidFill>
+            <a:srgbClr val="FFC000"/>
+          </a:solidFill>
+          <a:ln>
+            <a:solidFill>
+              <a:schemeClr val="accent3"/>
+            </a:solidFill>
+          </a:ln>
+          <a:scene3d>
+            <a:camera prst="orthographicFront">
+              <a:rot lat="0" lon="10800000" rev="5400000"/>
+            </a:camera>
+            <a:lightRig rig="threePt" dir="t"/>
+          </a:scene3d>
+        </p:spPr>
+        <p:style>
+          <a:lnRef idx="2">
+            <a:schemeClr val="accent1">
+              <a:shade val="50000"/>
+            </a:schemeClr>
+          </a:lnRef>
+          <a:fillRef idx="1">
+            <a:schemeClr val="accent1"/>
+          </a:fillRef>
+          <a:effectRef idx="0">
+            <a:schemeClr val="accent1"/>
+          </a:effectRef>
+          <a:fontRef idx="minor">
+            <a:schemeClr val="lt1"/>
+          </a:fontRef>
+        </p:style>
+        <p:txBody>
+          <a:bodyPr lIns="0" rIns="0" rtlCol="0" anchor="ctr"/>
+          <a:lstStyle/>
+          <a:p>
+            <a:pPr algn="ctr"/>
+            <a:endParaRPr lang="en-US" sz="2400"/>
+          </a:p>
+        </p:txBody>
+      </p:sp>
+      <p:sp>
+        <p:nvSpPr>
+          <p:cNvPr id="32" name="Renewable Power Arrow"/>
+          <p:cNvSpPr/>
+          <p:nvPr/>
+        </p:nvSpPr>
+        <p:spPr>
+          <a:xfrm>
+            <a:off x="3139440" y="762000"/>
+            <a:ext cx="366713" cy="3372369"/>
+          </a:xfrm>
+          <a:prstGeom prst="downArrow">
+            <a:avLst>
+              <a:gd name="adj1" fmla="val 100000"/>
+              <a:gd name="adj2" fmla="val 45681"/>
+            </a:avLst>
+          </a:prstGeom>
+          <a:solidFill>
+            <a:srgbClr val="FFC000"/>
+          </a:solidFill>
+          <a:ln>
+            <a:solidFill>
+              <a:schemeClr val="accent3"/>
+            </a:solidFill>
+          </a:ln>
+          <a:scene3d>
+            <a:camera prst="orthographicFront">
+              <a:rot lat="0" lon="10800000" rev="5400000"/>
+            </a:camera>
+            <a:lightRig rig="threePt" dir="t"/>
+          </a:scene3d>
+        </p:spPr>
+        <p:style>
+          <a:lnRef idx="2">
+            <a:schemeClr val="accent1">
+              <a:shade val="50000"/>
+            </a:schemeClr>
+          </a:lnRef>
+          <a:fillRef idx="1">
+            <a:schemeClr val="accent1"/>
+          </a:fillRef>
+          <a:effectRef idx="0">
+            <a:schemeClr val="accent1"/>
+          </a:effectRef>
+          <a:fontRef idx="minor">
+            <a:schemeClr val="lt1"/>
+          </a:fontRef>
+        </p:style>
+        <p:txBody>
+          <a:bodyPr lIns="0" rIns="0" rtlCol="0" anchor="ctr"/>
+          <a:lstStyle/>
+          <a:p>
+            <a:pPr algn="ctr"/>
+            <a:endParaRPr lang="en-US" sz="2400"/>
+          </a:p>
+        </p:txBody>
+      </p:sp>
+      <p:sp>
+        <p:nvSpPr>
+          <p:cNvPr id="34" name="Op Param Arrow"/>
+          <p:cNvSpPr/>
+          <p:nvPr/>
+        </p:nvSpPr>
+        <p:spPr>
+          <a:xfrm>
+            <a:off x="3139440" y="1215672"/>
+            <a:ext cx="366713" cy="3372369"/>
+          </a:xfrm>
+          <a:prstGeom prst="downArrow">
+            <a:avLst>
+              <a:gd name="adj1" fmla="val 100000"/>
+              <a:gd name="adj2" fmla="val 45681"/>
+            </a:avLst>
+          </a:prstGeom>
+          <a:solidFill>
+            <a:srgbClr val="FFC000"/>
+          </a:solidFill>
+          <a:ln>
+            <a:solidFill>
+              <a:schemeClr val="accent3"/>
+            </a:solidFill>
+          </a:ln>
+          <a:scene3d>
+            <a:camera prst="orthographicFront">
+              <a:rot lat="0" lon="10800000" rev="5400000"/>
+            </a:camera>
+            <a:lightRig rig="threePt" dir="t"/>
+          </a:scene3d>
+        </p:spPr>
+        <p:style>
+          <a:lnRef idx="2">
+            <a:schemeClr val="accent1">
+              <a:shade val="50000"/>
+            </a:schemeClr>
+          </a:lnRef>
+          <a:fillRef idx="1">
+            <a:schemeClr val="accent1"/>
+          </a:fillRef>
+          <a:effectRef idx="0">
+            <a:schemeClr val="accent1"/>
+          </a:effectRef>
+          <a:fontRef idx="minor">
+            <a:schemeClr val="lt1"/>
+          </a:fontRef>
+        </p:style>
+        <p:txBody>
+          <a:bodyPr lIns="0" rIns="0" rtlCol="0" anchor="ctr"/>
+          <a:lstStyle/>
+          <a:p>
+            <a:pPr algn="ctr"/>
+            <a:endParaRPr lang="en-US" sz="2400"/>
+          </a:p>
+        </p:txBody>
+      </p:sp>
+      <p:sp>
+        <p:nvSpPr>
+          <p:cNvPr id="5" name="Life"/>
+          <p:cNvSpPr txBox="1"/>
+          <p:nvPr/>
+        </p:nvSpPr>
+        <p:spPr>
+          <a:xfrm>
+            <a:off x="2892644" y="6200095"/>
+            <a:ext cx="1011752" cy="461665"/>
+          </a:xfrm>
+          <a:prstGeom prst="rect">
+            <a:avLst/>
+          </a:prstGeom>
+          <a:noFill/>
+        </p:spPr>
+        <p:txBody>
+          <a:bodyPr wrap="none" lIns="0" rIns="0" rtlCol="0">
+            <a:spAutoFit/>
+          </a:bodyPr>
+          <a:lstStyle/>
+          <a:p>
+            <a:pPr algn="ctr"/>
+            <a:r>
+              <a:rPr lang="en-US" sz="2400" dirty="0">
+                <a:solidFill>
+                  <a:schemeClr val="bg2"/>
+                </a:solidFill>
+              </a:rPr>
+              <a:t>Lifetime</a:t>
+            </a:r>
+          </a:p>
+        </p:txBody>
+      </p:sp>
+      <p:sp>
+        <p:nvSpPr>
+          <p:cNvPr id="7" name="Interest"/>
+          <p:cNvSpPr txBox="1"/>
+          <p:nvPr/>
+        </p:nvSpPr>
+        <p:spPr>
+          <a:xfrm>
+            <a:off x="1569720" y="5741113"/>
+            <a:ext cx="3657600" cy="461665"/>
+          </a:xfrm>
+          <a:prstGeom prst="rect">
+            <a:avLst/>
+          </a:prstGeom>
+          <a:noFill/>
+        </p:spPr>
+        <p:txBody>
+          <a:bodyPr wrap="square" lIns="0" rIns="0" rtlCol="0">
+            <a:spAutoFit/>
+          </a:bodyPr>
+          <a:lstStyle/>
+          <a:p>
+            <a:pPr algn="ctr"/>
+            <a:r>
+              <a:rPr lang="en-US" sz="2400" dirty="0">
+                <a:solidFill>
+                  <a:schemeClr val="bg2"/>
+                </a:solidFill>
+              </a:rPr>
+              <a:t>Interest Rate on debt</a:t>
+            </a:r>
+          </a:p>
+        </p:txBody>
+      </p:sp>
+      <p:sp>
+        <p:nvSpPr>
+          <p:cNvPr id="9" name="FOM"/>
+          <p:cNvSpPr txBox="1"/>
+          <p:nvPr/>
+        </p:nvSpPr>
+        <p:spPr>
+          <a:xfrm>
+            <a:off x="1569720" y="5313074"/>
+            <a:ext cx="3657600" cy="461665"/>
+          </a:xfrm>
+          <a:prstGeom prst="rect">
+            <a:avLst/>
+          </a:prstGeom>
+          <a:noFill/>
+        </p:spPr>
+        <p:txBody>
+          <a:bodyPr wrap="square" lIns="0" rIns="0" rtlCol="0">
+            <a:spAutoFit/>
+          </a:bodyPr>
+          <a:lstStyle/>
+          <a:p>
+            <a:pPr algn="ctr"/>
+            <a:r>
+              <a:rPr lang="en-US" sz="2400" dirty="0">
+                <a:solidFill>
+                  <a:schemeClr val="bg2"/>
+                </a:solidFill>
+              </a:rPr>
+              <a:t>Fixed O&amp;M Cost</a:t>
+            </a:r>
+          </a:p>
+        </p:txBody>
+      </p:sp>
+      <p:sp>
+        <p:nvSpPr>
+          <p:cNvPr id="10" name="Cap"/>
+          <p:cNvSpPr txBox="1"/>
+          <p:nvPr/>
+        </p:nvSpPr>
+        <p:spPr>
+          <a:xfrm>
+            <a:off x="1985505" y="4871162"/>
+            <a:ext cx="2826030" cy="461665"/>
+          </a:xfrm>
+          <a:prstGeom prst="rect">
+            <a:avLst/>
+          </a:prstGeom>
+          <a:noFill/>
+        </p:spPr>
+        <p:txBody>
+          <a:bodyPr wrap="none" lIns="0" rIns="0" rtlCol="0">
+            <a:spAutoFit/>
+          </a:bodyPr>
+          <a:lstStyle/>
+          <a:p>
+            <a:pPr algn="ctr"/>
+            <a:r>
+              <a:rPr lang="en-US" sz="2400" dirty="0">
+                <a:solidFill>
+                  <a:schemeClr val="bg2"/>
+                </a:solidFill>
+              </a:rPr>
+              <a:t>Capital and Install Cost</a:t>
+            </a:r>
+          </a:p>
+        </p:txBody>
+      </p:sp>
+      <p:sp>
+        <p:nvSpPr>
+          <p:cNvPr id="19" name="Energy"/>
+          <p:cNvSpPr txBox="1"/>
+          <p:nvPr/>
+        </p:nvSpPr>
+        <p:spPr>
+          <a:xfrm>
+            <a:off x="2627187" y="933936"/>
+            <a:ext cx="1542666" cy="461665"/>
+          </a:xfrm>
+          <a:prstGeom prst="rect">
+            <a:avLst/>
+          </a:prstGeom>
+          <a:noFill/>
+        </p:spPr>
+        <p:txBody>
+          <a:bodyPr wrap="none" lIns="0" rIns="0" rtlCol="0">
+            <a:spAutoFit/>
+          </a:bodyPr>
+          <a:lstStyle/>
+          <a:p>
+            <a:pPr algn="ctr"/>
+            <a:r>
+              <a:rPr lang="en-US" sz="2400" dirty="0">
+                <a:solidFill>
+                  <a:schemeClr val="bg2"/>
+                </a:solidFill>
+              </a:rPr>
+              <a:t>Energy Price</a:t>
+            </a:r>
+          </a:p>
+        </p:txBody>
+      </p:sp>
+      <p:sp>
+        <p:nvSpPr>
+          <p:cNvPr id="21" name="Reserve"/>
+          <p:cNvSpPr txBox="1"/>
+          <p:nvPr/>
+        </p:nvSpPr>
+        <p:spPr>
+          <a:xfrm>
+            <a:off x="1971273" y="1372387"/>
+            <a:ext cx="2854499" cy="461665"/>
+          </a:xfrm>
+          <a:prstGeom prst="rect">
+            <a:avLst/>
+          </a:prstGeom>
+          <a:noFill/>
+        </p:spPr>
+        <p:txBody>
+          <a:bodyPr wrap="none" lIns="0" rIns="0" rtlCol="0">
+            <a:spAutoFit/>
+          </a:bodyPr>
+          <a:lstStyle/>
+          <a:p>
+            <a:pPr algn="ctr"/>
+            <a:r>
+              <a:rPr lang="en-US" sz="2400" dirty="0">
+                <a:solidFill>
+                  <a:schemeClr val="bg2"/>
+                </a:solidFill>
+              </a:rPr>
+              <a:t>Ancillary Service Prices</a:t>
+            </a:r>
+          </a:p>
+        </p:txBody>
+      </p:sp>
+      <p:sp>
+        <p:nvSpPr>
+          <p:cNvPr id="23" name="Meter"/>
+          <p:cNvSpPr txBox="1"/>
+          <p:nvPr/>
+        </p:nvSpPr>
+        <p:spPr>
+          <a:xfrm>
+            <a:off x="2703843" y="15925"/>
+            <a:ext cx="1389355" cy="461665"/>
+          </a:xfrm>
+          <a:prstGeom prst="rect">
+            <a:avLst/>
+          </a:prstGeom>
+          <a:noFill/>
+        </p:spPr>
+        <p:txBody>
+          <a:bodyPr wrap="none" lIns="0" rIns="0" rtlCol="0">
+            <a:spAutoFit/>
+          </a:bodyPr>
+          <a:lstStyle/>
+          <a:p>
+            <a:pPr algn="ctr"/>
+            <a:r>
+              <a:rPr lang="en-US" sz="2400" dirty="0">
+                <a:solidFill>
+                  <a:schemeClr val="bg2"/>
+                </a:solidFill>
+              </a:rPr>
+              <a:t>Meter Cost</a:t>
+            </a:r>
+          </a:p>
+        </p:txBody>
+      </p:sp>
+      <p:sp>
+        <p:nvSpPr>
+          <p:cNvPr id="25" name="TDC"/>
+          <p:cNvSpPr txBox="1"/>
+          <p:nvPr/>
+        </p:nvSpPr>
+        <p:spPr>
+          <a:xfrm>
+            <a:off x="1569720" y="-443057"/>
+            <a:ext cx="3657600" cy="461665"/>
+          </a:xfrm>
+          <a:prstGeom prst="rect">
+            <a:avLst/>
+          </a:prstGeom>
+          <a:noFill/>
+        </p:spPr>
+        <p:txBody>
+          <a:bodyPr wrap="square" lIns="0" rIns="0" rtlCol="0">
+            <a:spAutoFit/>
+          </a:bodyPr>
+          <a:lstStyle/>
+          <a:p>
+            <a:pPr algn="ctr"/>
+            <a:r>
+              <a:rPr lang="en-US" sz="2400" dirty="0">
+                <a:solidFill>
+                  <a:schemeClr val="bg2"/>
+                </a:solidFill>
+              </a:rPr>
+              <a:t>Timed Demand Charge</a:t>
+            </a:r>
+          </a:p>
+        </p:txBody>
+      </p:sp>
+      <p:sp>
+        <p:nvSpPr>
+          <p:cNvPr id="27" name="FDC"/>
+          <p:cNvSpPr txBox="1"/>
+          <p:nvPr/>
+        </p:nvSpPr>
+        <p:spPr>
+          <a:xfrm>
+            <a:off x="1569720" y="-919143"/>
+            <a:ext cx="3657600" cy="461665"/>
+          </a:xfrm>
+          <a:prstGeom prst="rect">
+            <a:avLst/>
+          </a:prstGeom>
+          <a:noFill/>
+        </p:spPr>
+        <p:txBody>
+          <a:bodyPr wrap="square" lIns="0" rIns="0" rtlCol="0">
+            <a:spAutoFit/>
+          </a:bodyPr>
+          <a:lstStyle/>
+          <a:p>
+            <a:pPr algn="ctr"/>
+            <a:r>
+              <a:rPr lang="en-US" sz="2400" dirty="0">
+                <a:solidFill>
+                  <a:schemeClr val="bg2"/>
+                </a:solidFill>
+              </a:rPr>
+              <a:t>Fixed Demand Charge</a:t>
+            </a:r>
+          </a:p>
+        </p:txBody>
+      </p:sp>
+      <p:sp>
+        <p:nvSpPr>
+          <p:cNvPr id="29" name="Energy"/>
+          <p:cNvSpPr txBox="1"/>
+          <p:nvPr/>
+        </p:nvSpPr>
+        <p:spPr>
+          <a:xfrm>
+            <a:off x="2627187" y="-1333013"/>
+            <a:ext cx="1542666" cy="461665"/>
+          </a:xfrm>
+          <a:prstGeom prst="rect">
+            <a:avLst/>
+          </a:prstGeom>
+          <a:noFill/>
+        </p:spPr>
+        <p:txBody>
+          <a:bodyPr wrap="none" lIns="0" rIns="0" rtlCol="0">
+            <a:spAutoFit/>
+          </a:bodyPr>
+          <a:lstStyle/>
+          <a:p>
+            <a:pPr algn="ctr"/>
+            <a:r>
+              <a:rPr lang="en-US" sz="2400" dirty="0">
+                <a:solidFill>
+                  <a:schemeClr val="bg2"/>
+                </a:solidFill>
+              </a:rPr>
+              <a:t>Energy Price</a:t>
+            </a:r>
+          </a:p>
+        </p:txBody>
+      </p:sp>
+      <p:sp>
+        <p:nvSpPr>
+          <p:cNvPr id="33" name="Renewable Power"/>
+          <p:cNvSpPr txBox="1"/>
+          <p:nvPr/>
+        </p:nvSpPr>
+        <p:spPr>
+          <a:xfrm>
+            <a:off x="2278601" y="2229377"/>
+            <a:ext cx="2239844" cy="461665"/>
+          </a:xfrm>
+          <a:prstGeom prst="rect">
+            <a:avLst/>
+          </a:prstGeom>
+          <a:noFill/>
+        </p:spPr>
+        <p:txBody>
+          <a:bodyPr wrap="none" lIns="0" rIns="0" rtlCol="0">
+            <a:spAutoFit/>
+          </a:bodyPr>
+          <a:lstStyle/>
+          <a:p>
+            <a:pPr algn="ctr"/>
+            <a:r>
+              <a:rPr lang="en-US" sz="2400" dirty="0">
+                <a:solidFill>
+                  <a:schemeClr val="bg2"/>
+                </a:solidFill>
+              </a:rPr>
+              <a:t>Renewable Power</a:t>
+            </a:r>
+          </a:p>
+        </p:txBody>
+      </p:sp>
+      <p:sp>
+        <p:nvSpPr>
+          <p:cNvPr id="49" name="Op Param Arrow"/>
+          <p:cNvSpPr/>
+          <p:nvPr/>
+        </p:nvSpPr>
+        <p:spPr>
+          <a:xfrm>
+            <a:off x="3119751" y="1678109"/>
+            <a:ext cx="366713" cy="3372369"/>
+          </a:xfrm>
+          <a:prstGeom prst="downArrow">
+            <a:avLst>
+              <a:gd name="adj1" fmla="val 100000"/>
+              <a:gd name="adj2" fmla="val 45681"/>
+            </a:avLst>
+          </a:prstGeom>
+          <a:solidFill>
+            <a:srgbClr val="FFC000"/>
+          </a:solidFill>
+          <a:ln>
+            <a:solidFill>
+              <a:schemeClr val="accent3"/>
+            </a:solidFill>
+          </a:ln>
+          <a:scene3d>
+            <a:camera prst="orthographicFront">
+              <a:rot lat="0" lon="10800000" rev="5400000"/>
+            </a:camera>
+            <a:lightRig rig="threePt" dir="t"/>
+          </a:scene3d>
+        </p:spPr>
+        <p:style>
+          <a:lnRef idx="2">
+            <a:schemeClr val="accent1">
+              <a:shade val="50000"/>
+            </a:schemeClr>
+          </a:lnRef>
+          <a:fillRef idx="1">
+            <a:schemeClr val="accent1"/>
+          </a:fillRef>
+          <a:effectRef idx="0">
+            <a:schemeClr val="accent1"/>
+          </a:effectRef>
+          <a:fontRef idx="minor">
+            <a:schemeClr val="lt1"/>
+          </a:fontRef>
+        </p:style>
+        <p:txBody>
+          <a:bodyPr lIns="0" rIns="0" rtlCol="0" anchor="ctr"/>
+          <a:lstStyle/>
+          <a:p>
+            <a:pPr algn="ctr"/>
+            <a:endParaRPr lang="en-US" sz="2400"/>
+          </a:p>
+        </p:txBody>
+      </p:sp>
+      <p:sp>
+        <p:nvSpPr>
+          <p:cNvPr id="60" name="Inverter Arrow">
+            <a:extLst>
+              <a:ext uri="{FF2B5EF4-FFF2-40B4-BE49-F238E27FC236}">
+                <a16:creationId xmlns:a16="http://schemas.microsoft.com/office/drawing/2014/main" id="{1A740B48-6B84-4519-9B5D-9A1BC9757220}"/>
+              </a:ext>
+            </a:extLst>
+          </p:cNvPr>
+          <p:cNvSpPr/>
+          <p:nvPr/>
+        </p:nvSpPr>
+        <p:spPr>
+          <a:xfrm>
+            <a:off x="3139440" y="2578100"/>
+            <a:ext cx="366713" cy="3372369"/>
+          </a:xfrm>
+          <a:prstGeom prst="downArrow">
+            <a:avLst>
+              <a:gd name="adj1" fmla="val 100000"/>
+              <a:gd name="adj2" fmla="val 45681"/>
+            </a:avLst>
+          </a:prstGeom>
+          <a:solidFill>
+            <a:srgbClr val="FFC000"/>
+          </a:solidFill>
+          <a:ln>
+            <a:solidFill>
+              <a:schemeClr val="accent3"/>
+            </a:solidFill>
+          </a:ln>
+          <a:scene3d>
+            <a:camera prst="orthographicFront">
+              <a:rot lat="0" lon="10800000" rev="5400000"/>
+            </a:camera>
+            <a:lightRig rig="threePt" dir="t"/>
+          </a:scene3d>
+        </p:spPr>
+        <p:style>
+          <a:lnRef idx="2">
+            <a:schemeClr val="accent1">
+              <a:shade val="50000"/>
+            </a:schemeClr>
+          </a:lnRef>
+          <a:fillRef idx="1">
+            <a:schemeClr val="accent1"/>
+          </a:fillRef>
+          <a:effectRef idx="0">
+            <a:schemeClr val="accent1"/>
+          </a:effectRef>
+          <a:fontRef idx="minor">
+            <a:schemeClr val="lt1"/>
+          </a:fontRef>
+        </p:style>
+        <p:txBody>
+          <a:bodyPr lIns="0" rIns="0" rtlCol="0" anchor="ctr"/>
+          <a:lstStyle/>
+          <a:p>
+            <a:pPr algn="ctr"/>
+            <a:endParaRPr lang="en-US" sz="2400" dirty="0"/>
+          </a:p>
+        </p:txBody>
+      </p:sp>
+      <p:sp>
+        <p:nvSpPr>
+          <p:cNvPr id="61" name="Inverter">
+            <a:extLst>
+              <a:ext uri="{FF2B5EF4-FFF2-40B4-BE49-F238E27FC236}">
+                <a16:creationId xmlns:a16="http://schemas.microsoft.com/office/drawing/2014/main" id="{28DF6332-03B9-4CDB-859B-4507B6C0D92A}"/>
+              </a:ext>
+            </a:extLst>
+          </p:cNvPr>
+          <p:cNvSpPr txBox="1"/>
+          <p:nvPr/>
+        </p:nvSpPr>
+        <p:spPr>
+          <a:xfrm>
+            <a:off x="1979256" y="4009864"/>
+            <a:ext cx="2838534" cy="461665"/>
+          </a:xfrm>
+          <a:prstGeom prst="rect">
+            <a:avLst/>
+          </a:prstGeom>
+          <a:noFill/>
+        </p:spPr>
+        <p:txBody>
+          <a:bodyPr wrap="none" lIns="0" rIns="0" rtlCol="0">
+            <a:spAutoFit/>
+          </a:bodyPr>
+          <a:lstStyle/>
+          <a:p>
+            <a:pPr algn="ctr"/>
+            <a:r>
+              <a:rPr lang="en-US" sz="2400" dirty="0">
+                <a:solidFill>
+                  <a:schemeClr val="bg2"/>
+                </a:solidFill>
+              </a:rPr>
+              <a:t>Inverter size &amp; settings</a:t>
+            </a:r>
+          </a:p>
+        </p:txBody>
+      </p:sp>
+      <p:sp>
+        <p:nvSpPr>
+          <p:cNvPr id="57" name="H2 Arrow"/>
+          <p:cNvSpPr/>
+          <p:nvPr/>
+        </p:nvSpPr>
+        <p:spPr>
+          <a:xfrm>
+            <a:off x="3124200" y="2129271"/>
+            <a:ext cx="366713" cy="3372369"/>
+          </a:xfrm>
+          <a:prstGeom prst="downArrow">
+            <a:avLst>
+              <a:gd name="adj1" fmla="val 100000"/>
+              <a:gd name="adj2" fmla="val 45681"/>
+            </a:avLst>
+          </a:prstGeom>
+          <a:solidFill>
+            <a:srgbClr val="FFC000"/>
+          </a:solidFill>
+          <a:ln>
+            <a:solidFill>
+              <a:schemeClr val="accent3"/>
+            </a:solidFill>
+          </a:ln>
+          <a:scene3d>
+            <a:camera prst="orthographicFront">
+              <a:rot lat="0" lon="10800000" rev="5400000"/>
+            </a:camera>
+            <a:lightRig rig="threePt" dir="t"/>
+          </a:scene3d>
+        </p:spPr>
+        <p:style>
+          <a:lnRef idx="2">
+            <a:schemeClr val="accent1">
+              <a:shade val="50000"/>
+            </a:schemeClr>
+          </a:lnRef>
+          <a:fillRef idx="1">
+            <a:schemeClr val="accent1"/>
+          </a:fillRef>
+          <a:effectRef idx="0">
+            <a:schemeClr val="accent1"/>
+          </a:effectRef>
+          <a:fontRef idx="minor">
+            <a:schemeClr val="lt1"/>
+          </a:fontRef>
+        </p:style>
+        <p:txBody>
+          <a:bodyPr lIns="0" rIns="0" rtlCol="0" anchor="ctr"/>
+          <a:lstStyle/>
+          <a:p>
+            <a:pPr algn="ctr"/>
+            <a:endParaRPr lang="en-US" sz="2400"/>
+          </a:p>
+        </p:txBody>
+      </p:sp>
+      <p:sp>
+        <p:nvSpPr>
+          <p:cNvPr id="58" name="H2"/>
+          <p:cNvSpPr txBox="1"/>
+          <p:nvPr/>
+        </p:nvSpPr>
+        <p:spPr>
+          <a:xfrm>
+            <a:off x="2213024" y="3596648"/>
+            <a:ext cx="2340514" cy="461665"/>
+          </a:xfrm>
+          <a:prstGeom prst="rect">
+            <a:avLst/>
+          </a:prstGeom>
+          <a:noFill/>
+        </p:spPr>
+        <p:txBody>
+          <a:bodyPr wrap="none" lIns="0" rIns="0" rtlCol="0">
+            <a:spAutoFit/>
+          </a:bodyPr>
+          <a:lstStyle/>
+          <a:p>
+            <a:pPr algn="ctr"/>
+            <a:r>
+              <a:rPr lang="en-US" sz="2400" dirty="0">
+                <a:solidFill>
+                  <a:schemeClr val="bg2"/>
+                </a:solidFill>
+              </a:rPr>
+              <a:t>Hydrogen Demand</a:t>
+            </a:r>
+          </a:p>
+        </p:txBody>
+      </p:sp>
+      <p:sp>
+        <p:nvSpPr>
+          <p:cNvPr id="56" name="Building Load"/>
+          <p:cNvSpPr txBox="1"/>
+          <p:nvPr/>
+        </p:nvSpPr>
+        <p:spPr>
+          <a:xfrm>
+            <a:off x="2539666" y="3155011"/>
+            <a:ext cx="1678345" cy="461665"/>
+          </a:xfrm>
+          <a:prstGeom prst="rect">
+            <a:avLst/>
+          </a:prstGeom>
+          <a:noFill/>
+        </p:spPr>
+        <p:txBody>
+          <a:bodyPr wrap="none" lIns="0" rIns="0" rtlCol="0">
+            <a:spAutoFit/>
+          </a:bodyPr>
+          <a:lstStyle/>
+          <a:p>
+            <a:pPr algn="ctr"/>
+            <a:r>
+              <a:rPr lang="en-US" sz="2400" dirty="0">
+                <a:solidFill>
+                  <a:schemeClr val="bg2"/>
+                </a:solidFill>
+              </a:rPr>
+              <a:t>Building Load</a:t>
+            </a:r>
+          </a:p>
+        </p:txBody>
+      </p:sp>
+      <p:sp>
+        <p:nvSpPr>
+          <p:cNvPr id="35" name="Op Param"/>
+          <p:cNvSpPr txBox="1"/>
+          <p:nvPr/>
+        </p:nvSpPr>
+        <p:spPr>
+          <a:xfrm>
+            <a:off x="2022470" y="2692574"/>
+            <a:ext cx="2752099" cy="461665"/>
+          </a:xfrm>
+          <a:prstGeom prst="rect">
+            <a:avLst/>
+          </a:prstGeom>
+          <a:noFill/>
+        </p:spPr>
+        <p:txBody>
+          <a:bodyPr wrap="none" lIns="0" rIns="0" rtlCol="0">
+            <a:spAutoFit/>
+          </a:bodyPr>
+          <a:lstStyle/>
+          <a:p>
+            <a:pPr algn="ctr"/>
+            <a:r>
+              <a:rPr lang="en-US" sz="2400" dirty="0">
+                <a:solidFill>
+                  <a:schemeClr val="bg2"/>
+                </a:solidFill>
+              </a:rPr>
+              <a:t>Operation Parameters</a:t>
+            </a:r>
+          </a:p>
+        </p:txBody>
+      </p:sp>
+      <p:sp>
+        <p:nvSpPr>
+          <p:cNvPr id="30" name="Utility BOX"/>
+          <p:cNvSpPr/>
+          <p:nvPr/>
+        </p:nvSpPr>
+        <p:spPr>
+          <a:xfrm>
+            <a:off x="134385" y="-1461589"/>
+            <a:ext cx="1737360" cy="2086255"/>
+          </a:xfrm>
+          <a:prstGeom prst="roundRect">
+            <a:avLst>
+              <a:gd name="adj" fmla="val 9258"/>
+            </a:avLst>
+          </a:prstGeom>
+        </p:spPr>
+        <p:style>
+          <a:lnRef idx="2">
+            <a:schemeClr val="accent1">
+              <a:shade val="50000"/>
+            </a:schemeClr>
+          </a:lnRef>
+          <a:fillRef idx="1">
+            <a:schemeClr val="accent1"/>
+          </a:fillRef>
+          <a:effectRef idx="0">
+            <a:schemeClr val="accent1"/>
+          </a:effectRef>
+          <a:fontRef idx="minor">
+            <a:schemeClr val="lt1"/>
+          </a:fontRef>
+        </p:style>
+        <p:txBody>
+          <a:bodyPr rtlCol="0" anchor="ctr"/>
+          <a:lstStyle/>
+          <a:p>
+            <a:pPr algn="ctr"/>
+            <a:r>
+              <a:rPr lang="en-US" sz="2800" dirty="0"/>
+              <a:t>Utility Service</a:t>
+            </a:r>
+          </a:p>
+        </p:txBody>
+      </p:sp>
+      <p:sp>
+        <p:nvSpPr>
+          <p:cNvPr id="31" name="ISO BOX"/>
+          <p:cNvSpPr/>
+          <p:nvPr/>
+        </p:nvSpPr>
+        <p:spPr>
+          <a:xfrm>
+            <a:off x="134385" y="763981"/>
+            <a:ext cx="1737360" cy="1287963"/>
+          </a:xfrm>
+          <a:prstGeom prst="roundRect">
+            <a:avLst>
+              <a:gd name="adj" fmla="val 9258"/>
+            </a:avLst>
+          </a:prstGeom>
+        </p:spPr>
+        <p:style>
+          <a:lnRef idx="2">
+            <a:schemeClr val="accent1">
+              <a:shade val="50000"/>
+            </a:schemeClr>
+          </a:lnRef>
+          <a:fillRef idx="1">
+            <a:schemeClr val="accent1"/>
+          </a:fillRef>
+          <a:effectRef idx="0">
+            <a:schemeClr val="accent1"/>
+          </a:effectRef>
+          <a:fontRef idx="minor">
+            <a:schemeClr val="lt1"/>
+          </a:fontRef>
+        </p:style>
+        <p:txBody>
+          <a:bodyPr rtlCol="0" anchor="ctr"/>
+          <a:lstStyle/>
+          <a:p>
+            <a:pPr algn="ctr"/>
+            <a:r>
+              <a:rPr lang="en-US" sz="2800" dirty="0"/>
+              <a:t>ISO/RTO electricity markets</a:t>
+            </a:r>
+          </a:p>
+        </p:txBody>
+      </p:sp>
+      <p:sp>
+        <p:nvSpPr>
+          <p:cNvPr id="36" name="Other inputs BOX"/>
+          <p:cNvSpPr/>
+          <p:nvPr/>
+        </p:nvSpPr>
+        <p:spPr>
+          <a:xfrm>
+            <a:off x="134385" y="2191730"/>
+            <a:ext cx="1737360" cy="2396311"/>
+          </a:xfrm>
+          <a:prstGeom prst="roundRect">
+            <a:avLst>
+              <a:gd name="adj" fmla="val 9258"/>
+            </a:avLst>
+          </a:prstGeom>
+        </p:spPr>
+        <p:style>
+          <a:lnRef idx="2">
+            <a:schemeClr val="accent1">
+              <a:shade val="50000"/>
+            </a:schemeClr>
+          </a:lnRef>
+          <a:fillRef idx="1">
+            <a:schemeClr val="accent1"/>
+          </a:fillRef>
+          <a:effectRef idx="0">
+            <a:schemeClr val="accent1"/>
+          </a:effectRef>
+          <a:fontRef idx="minor">
+            <a:schemeClr val="lt1"/>
+          </a:fontRef>
+        </p:style>
+        <p:txBody>
+          <a:bodyPr rtlCol="0" anchor="ctr"/>
+          <a:lstStyle/>
+          <a:p>
+            <a:pPr algn="ctr"/>
+            <a:r>
+              <a:rPr lang="en-US" sz="2800" dirty="0"/>
+              <a:t>Other Inputs</a:t>
+            </a:r>
+          </a:p>
+        </p:txBody>
+      </p:sp>
+      <p:sp>
+        <p:nvSpPr>
+          <p:cNvPr id="37" name="Input Categories"/>
+          <p:cNvSpPr txBox="1"/>
+          <p:nvPr/>
+        </p:nvSpPr>
+        <p:spPr>
+          <a:xfrm>
+            <a:off x="531421" y="-1930640"/>
+            <a:ext cx="992579" cy="461665"/>
+          </a:xfrm>
+          <a:prstGeom prst="rect">
+            <a:avLst/>
+          </a:prstGeom>
+          <a:noFill/>
+        </p:spPr>
+        <p:txBody>
+          <a:bodyPr wrap="none" rtlCol="0">
+            <a:spAutoFit/>
+          </a:bodyPr>
+          <a:lstStyle/>
+          <a:p>
+            <a:r>
+              <a:rPr lang="en-US" sz="2400" b="1" dirty="0">
+                <a:solidFill>
+                  <a:schemeClr val="bg2"/>
+                </a:solidFill>
+              </a:rPr>
+              <a:t>Inputs</a:t>
+            </a:r>
+          </a:p>
+        </p:txBody>
+      </p:sp>
+      <p:sp>
+        <p:nvSpPr>
+          <p:cNvPr id="38" name="Input Val"/>
+          <p:cNvSpPr txBox="1"/>
+          <p:nvPr/>
+        </p:nvSpPr>
+        <p:spPr>
+          <a:xfrm>
+            <a:off x="2453640" y="-1930640"/>
+            <a:ext cx="1775486" cy="461665"/>
+          </a:xfrm>
+          <a:prstGeom prst="rect">
+            <a:avLst/>
+          </a:prstGeom>
+          <a:noFill/>
+        </p:spPr>
+        <p:txBody>
+          <a:bodyPr wrap="none" rtlCol="0">
+            <a:spAutoFit/>
+          </a:bodyPr>
+          <a:lstStyle/>
+          <a:p>
+            <a:r>
+              <a:rPr lang="en-US" sz="2400" b="1" dirty="0">
+                <a:solidFill>
+                  <a:schemeClr val="bg2"/>
+                </a:solidFill>
+              </a:rPr>
+              <a:t>Input Values</a:t>
+            </a:r>
+          </a:p>
+        </p:txBody>
+      </p:sp>
+      <p:sp>
+        <p:nvSpPr>
+          <p:cNvPr id="39" name="Model"/>
+          <p:cNvSpPr txBox="1"/>
+          <p:nvPr/>
+        </p:nvSpPr>
+        <p:spPr>
+          <a:xfrm>
+            <a:off x="5596858" y="-1930640"/>
+            <a:ext cx="1015021" cy="461665"/>
+          </a:xfrm>
+          <a:prstGeom prst="rect">
+            <a:avLst/>
+          </a:prstGeom>
+          <a:noFill/>
+        </p:spPr>
+        <p:txBody>
+          <a:bodyPr wrap="none" rtlCol="0">
+            <a:spAutoFit/>
+          </a:bodyPr>
+          <a:lstStyle/>
+          <a:p>
+            <a:pPr algn="ctr"/>
+            <a:r>
+              <a:rPr lang="en-US" sz="2400" b="1" dirty="0">
+                <a:solidFill>
+                  <a:schemeClr val="bg2"/>
+                </a:solidFill>
+              </a:rPr>
+              <a:t>Model</a:t>
+            </a:r>
+          </a:p>
+        </p:txBody>
+      </p:sp>
+      <p:sp>
+        <p:nvSpPr>
+          <p:cNvPr id="40" name="Output Arrow" hidden="1"/>
+          <p:cNvSpPr/>
+          <p:nvPr/>
+        </p:nvSpPr>
+        <p:spPr>
+          <a:xfrm>
+            <a:off x="7147560" y="600714"/>
+            <a:ext cx="2083123" cy="4080567"/>
+          </a:xfrm>
+          <a:prstGeom prst="downArrow">
+            <a:avLst>
+              <a:gd name="adj1" fmla="val 100000"/>
+              <a:gd name="adj2" fmla="val 23110"/>
+            </a:avLst>
+          </a:prstGeom>
+          <a:solidFill>
+            <a:srgbClr val="FFC000"/>
+          </a:solidFill>
+          <a:ln>
+            <a:solidFill>
+              <a:schemeClr val="accent3"/>
+            </a:solidFill>
+          </a:ln>
+          <a:scene3d>
+            <a:camera prst="orthographicFront">
+              <a:rot lat="0" lon="10800000" rev="5400000"/>
+            </a:camera>
+            <a:lightRig rig="threePt" dir="t"/>
+          </a:scene3d>
+        </p:spPr>
+        <p:style>
+          <a:lnRef idx="2">
+            <a:schemeClr val="accent1">
+              <a:shade val="50000"/>
+            </a:schemeClr>
+          </a:lnRef>
+          <a:fillRef idx="1">
+            <a:schemeClr val="accent1"/>
+          </a:fillRef>
+          <a:effectRef idx="0">
+            <a:schemeClr val="accent1"/>
+          </a:effectRef>
+          <a:fontRef idx="minor">
+            <a:schemeClr val="lt1"/>
+          </a:fontRef>
+        </p:style>
+        <p:txBody>
+          <a:bodyPr rtlCol="0" anchor="ctr"/>
+          <a:lstStyle/>
+          <a:p>
+            <a:pPr algn="ctr"/>
+            <a:endParaRPr lang="en-US"/>
+          </a:p>
+        </p:txBody>
+      </p:sp>
+      <p:sp>
+        <p:nvSpPr>
+          <p:cNvPr id="41" name="Output" hidden="1"/>
+          <p:cNvSpPr txBox="1"/>
+          <p:nvPr/>
+        </p:nvSpPr>
+        <p:spPr>
+          <a:xfrm>
+            <a:off x="7262730" y="1645467"/>
+            <a:ext cx="2598853" cy="2062103"/>
+          </a:xfrm>
+          <a:prstGeom prst="rect">
+            <a:avLst/>
+          </a:prstGeom>
+          <a:noFill/>
+        </p:spPr>
+        <p:txBody>
+          <a:bodyPr wrap="none" rtlCol="0">
+            <a:spAutoFit/>
+          </a:bodyPr>
+          <a:lstStyle/>
+          <a:p>
+            <a:r>
+              <a:rPr lang="en-US" sz="2400" dirty="0">
+                <a:solidFill>
+                  <a:schemeClr val="bg2"/>
+                </a:solidFill>
+              </a:rPr>
+              <a:t>Maximum Revenue</a:t>
+            </a:r>
+          </a:p>
+          <a:p>
+            <a:r>
+              <a:rPr lang="en-US" sz="2400" dirty="0">
+                <a:solidFill>
+                  <a:schemeClr val="bg2"/>
+                </a:solidFill>
+              </a:rPr>
+              <a:t>     (by component)</a:t>
+            </a:r>
+          </a:p>
+          <a:p>
+            <a:endParaRPr lang="en-US" sz="400" dirty="0">
+              <a:solidFill>
+                <a:schemeClr val="bg2"/>
+              </a:solidFill>
+            </a:endParaRPr>
+          </a:p>
+          <a:p>
+            <a:r>
+              <a:rPr lang="en-US" sz="2400" dirty="0">
+                <a:solidFill>
+                  <a:schemeClr val="bg2"/>
+                </a:solidFill>
+              </a:rPr>
+              <a:t>Annualized Cost</a:t>
+            </a:r>
+          </a:p>
+          <a:p>
+            <a:r>
+              <a:rPr lang="en-US" sz="2400" dirty="0">
+                <a:solidFill>
+                  <a:schemeClr val="bg2"/>
+                </a:solidFill>
+              </a:rPr>
+              <a:t>  (by component)</a:t>
+            </a:r>
+          </a:p>
+          <a:p>
+            <a:endParaRPr lang="en-US" sz="400" dirty="0">
+              <a:solidFill>
+                <a:schemeClr val="bg2"/>
+              </a:solidFill>
+            </a:endParaRPr>
+          </a:p>
+          <a:p>
+            <a:r>
+              <a:rPr lang="en-US" sz="2400" dirty="0">
+                <a:solidFill>
+                  <a:schemeClr val="bg2"/>
+                </a:solidFill>
+              </a:rPr>
+              <a:t>Operating Profiles</a:t>
+            </a:r>
+          </a:p>
+        </p:txBody>
+      </p:sp>
+      <p:sp>
+        <p:nvSpPr>
+          <p:cNvPr id="42" name="Output"/>
+          <p:cNvSpPr txBox="1"/>
+          <p:nvPr/>
+        </p:nvSpPr>
+        <p:spPr>
+          <a:xfrm>
+            <a:off x="7572077" y="-1933302"/>
+            <a:ext cx="1226618" cy="461665"/>
+          </a:xfrm>
+          <a:prstGeom prst="rect">
+            <a:avLst/>
+          </a:prstGeom>
+          <a:noFill/>
+        </p:spPr>
+        <p:txBody>
+          <a:bodyPr wrap="none" rtlCol="0">
+            <a:spAutoFit/>
+          </a:bodyPr>
+          <a:lstStyle/>
+          <a:p>
+            <a:pPr algn="ctr"/>
+            <a:r>
+              <a:rPr lang="en-US" sz="2400" b="1" dirty="0">
+                <a:solidFill>
+                  <a:schemeClr val="bg2"/>
+                </a:solidFill>
+              </a:rPr>
+              <a:t>Outputs</a:t>
+            </a:r>
+          </a:p>
+        </p:txBody>
+      </p:sp>
+      <p:sp>
+        <p:nvSpPr>
+          <p:cNvPr id="51" name="Output Arrow"/>
+          <p:cNvSpPr/>
+          <p:nvPr/>
+        </p:nvSpPr>
+        <p:spPr>
+          <a:xfrm>
+            <a:off x="7383755" y="1756353"/>
+            <a:ext cx="971792" cy="4080567"/>
+          </a:xfrm>
+          <a:prstGeom prst="downArrow">
+            <a:avLst>
+              <a:gd name="adj1" fmla="val 100000"/>
+              <a:gd name="adj2" fmla="val 37001"/>
+            </a:avLst>
+          </a:prstGeom>
+          <a:solidFill>
+            <a:srgbClr val="FFC000"/>
+          </a:solidFill>
+          <a:ln>
+            <a:solidFill>
+              <a:schemeClr val="accent3"/>
+            </a:solidFill>
+          </a:ln>
+          <a:scene3d>
+            <a:camera prst="orthographicFront">
+              <a:rot lat="0" lon="10800000" rev="5400000"/>
+            </a:camera>
+            <a:lightRig rig="threePt" dir="t"/>
+          </a:scene3d>
+        </p:spPr>
+        <p:style>
+          <a:lnRef idx="2">
+            <a:schemeClr val="accent1">
+              <a:shade val="50000"/>
+            </a:schemeClr>
+          </a:lnRef>
+          <a:fillRef idx="1">
+            <a:schemeClr val="accent1"/>
+          </a:fillRef>
+          <a:effectRef idx="0">
+            <a:schemeClr val="accent1"/>
+          </a:effectRef>
+          <a:fontRef idx="minor">
+            <a:schemeClr val="lt1"/>
+          </a:fontRef>
+        </p:style>
+        <p:txBody>
+          <a:bodyPr rtlCol="0" anchor="ctr"/>
+          <a:lstStyle/>
+          <a:p>
+            <a:pPr algn="ctr"/>
+            <a:endParaRPr lang="en-US"/>
+          </a:p>
+        </p:txBody>
+      </p:sp>
+      <p:sp>
+        <p:nvSpPr>
+          <p:cNvPr id="53" name="Output Arrow"/>
+          <p:cNvSpPr/>
+          <p:nvPr/>
+        </p:nvSpPr>
+        <p:spPr>
+          <a:xfrm>
+            <a:off x="7383755" y="568770"/>
+            <a:ext cx="971792" cy="4080567"/>
+          </a:xfrm>
+          <a:prstGeom prst="downArrow">
+            <a:avLst>
+              <a:gd name="adj1" fmla="val 100000"/>
+              <a:gd name="adj2" fmla="val 37001"/>
+            </a:avLst>
+          </a:prstGeom>
+          <a:solidFill>
+            <a:srgbClr val="FFC000"/>
+          </a:solidFill>
+          <a:ln>
+            <a:solidFill>
+              <a:schemeClr val="accent3"/>
+            </a:solidFill>
+          </a:ln>
+          <a:scene3d>
+            <a:camera prst="orthographicFront">
+              <a:rot lat="0" lon="10800000" rev="5400000"/>
+            </a:camera>
+            <a:lightRig rig="threePt" dir="t"/>
+          </a:scene3d>
+        </p:spPr>
+        <p:style>
+          <a:lnRef idx="2">
+            <a:schemeClr val="accent1">
+              <a:shade val="50000"/>
+            </a:schemeClr>
+          </a:lnRef>
+          <a:fillRef idx="1">
+            <a:schemeClr val="accent1"/>
+          </a:fillRef>
+          <a:effectRef idx="0">
+            <a:schemeClr val="accent1"/>
+          </a:effectRef>
+          <a:fontRef idx="minor">
+            <a:schemeClr val="lt1"/>
+          </a:fontRef>
+        </p:style>
+        <p:txBody>
+          <a:bodyPr rtlCol="0" anchor="ctr"/>
+          <a:lstStyle/>
+          <a:p>
+            <a:pPr algn="ctr"/>
+            <a:endParaRPr lang="en-US"/>
+          </a:p>
+        </p:txBody>
+      </p:sp>
+      <p:sp>
+        <p:nvSpPr>
+          <p:cNvPr id="54" name="Output Arrow"/>
+          <p:cNvSpPr/>
+          <p:nvPr/>
+        </p:nvSpPr>
+        <p:spPr>
+          <a:xfrm>
+            <a:off x="7383755" y="-608463"/>
+            <a:ext cx="971792" cy="4080567"/>
+          </a:xfrm>
+          <a:prstGeom prst="downArrow">
+            <a:avLst>
+              <a:gd name="adj1" fmla="val 100000"/>
+              <a:gd name="adj2" fmla="val 37001"/>
+            </a:avLst>
+          </a:prstGeom>
+          <a:solidFill>
+            <a:srgbClr val="FFC000"/>
+          </a:solidFill>
+          <a:ln>
+            <a:solidFill>
+              <a:schemeClr val="accent3"/>
+            </a:solidFill>
+          </a:ln>
+          <a:scene3d>
+            <a:camera prst="orthographicFront">
+              <a:rot lat="0" lon="10800000" rev="5400000"/>
+            </a:camera>
+            <a:lightRig rig="threePt" dir="t"/>
+          </a:scene3d>
+        </p:spPr>
+        <p:style>
+          <a:lnRef idx="2">
+            <a:schemeClr val="accent1">
+              <a:shade val="50000"/>
+            </a:schemeClr>
+          </a:lnRef>
+          <a:fillRef idx="1">
+            <a:schemeClr val="accent1"/>
+          </a:fillRef>
+          <a:effectRef idx="0">
+            <a:schemeClr val="accent1"/>
+          </a:effectRef>
+          <a:fontRef idx="minor">
+            <a:schemeClr val="lt1"/>
+          </a:fontRef>
+        </p:style>
+        <p:txBody>
+          <a:bodyPr rtlCol="0" anchor="ctr"/>
+          <a:lstStyle/>
+          <a:p>
+            <a:pPr algn="ctr"/>
+            <a:endParaRPr lang="en-US"/>
+          </a:p>
+        </p:txBody>
+      </p:sp>
+      <p:sp>
+        <p:nvSpPr>
+          <p:cNvPr id="43" name="Opt Model BOX"/>
+          <p:cNvSpPr/>
+          <p:nvPr/>
+        </p:nvSpPr>
+        <p:spPr>
+          <a:xfrm>
+            <a:off x="5029200" y="-1461589"/>
+            <a:ext cx="2169531" cy="8270425"/>
+          </a:xfrm>
+          <a:prstGeom prst="roundRect">
+            <a:avLst>
+              <a:gd name="adj" fmla="val 9258"/>
+            </a:avLst>
+          </a:prstGeom>
+        </p:spPr>
+        <p:style>
+          <a:lnRef idx="2">
+            <a:schemeClr val="accent1">
+              <a:shade val="50000"/>
+            </a:schemeClr>
+          </a:lnRef>
+          <a:fillRef idx="1">
+            <a:schemeClr val="accent1"/>
+          </a:fillRef>
+          <a:effectRef idx="0">
+            <a:schemeClr val="accent1"/>
+          </a:effectRef>
+          <a:fontRef idx="minor">
+            <a:schemeClr val="lt1"/>
+          </a:fontRef>
+        </p:style>
+        <p:txBody>
+          <a:bodyPr rtlCol="0" anchor="ctr"/>
+          <a:lstStyle/>
+          <a:p>
+            <a:pPr algn="ctr"/>
+            <a:r>
+              <a:rPr lang="en-US" sz="2800" dirty="0"/>
+              <a:t>Revenue Operation and Device Optimization Model</a:t>
+            </a:r>
+          </a:p>
+          <a:p>
+            <a:pPr algn="ctr"/>
+            <a:r>
+              <a:rPr lang="en-US" sz="2800" dirty="0"/>
+              <a:t>(</a:t>
+            </a:r>
+            <a:r>
+              <a:rPr lang="en-US" sz="2800" dirty="0" err="1"/>
+              <a:t>RODeO</a:t>
+            </a:r>
+            <a:r>
+              <a:rPr lang="en-US" sz="2800" dirty="0"/>
+              <a:t>)</a:t>
+            </a:r>
+          </a:p>
+        </p:txBody>
+      </p:sp>
+      <p:sp>
+        <p:nvSpPr>
+          <p:cNvPr id="50" name="Output"/>
+          <p:cNvSpPr txBox="1"/>
+          <p:nvPr/>
+        </p:nvSpPr>
+        <p:spPr>
+          <a:xfrm>
+            <a:off x="7178259" y="2188022"/>
+            <a:ext cx="2598853" cy="830997"/>
+          </a:xfrm>
+          <a:prstGeom prst="rect">
+            <a:avLst/>
+          </a:prstGeom>
+          <a:noFill/>
+        </p:spPr>
+        <p:txBody>
+          <a:bodyPr wrap="none" rtlCol="0">
+            <a:spAutoFit/>
+          </a:bodyPr>
+          <a:lstStyle/>
+          <a:p>
+            <a:r>
+              <a:rPr lang="en-US" sz="2400" dirty="0">
+                <a:solidFill>
+                  <a:schemeClr val="bg2"/>
+                </a:solidFill>
+              </a:rPr>
+              <a:t>Maximum Revenue</a:t>
+            </a:r>
+          </a:p>
+          <a:p>
+            <a:r>
+              <a:rPr lang="en-US" sz="2400" dirty="0">
+                <a:solidFill>
+                  <a:schemeClr val="bg2"/>
+                </a:solidFill>
+              </a:rPr>
+              <a:t>     (by component)</a:t>
+            </a:r>
+          </a:p>
+        </p:txBody>
+      </p:sp>
+      <p:sp>
+        <p:nvSpPr>
+          <p:cNvPr id="55" name="Output"/>
+          <p:cNvSpPr txBox="1"/>
+          <p:nvPr/>
+        </p:nvSpPr>
+        <p:spPr>
+          <a:xfrm>
+            <a:off x="7321215" y="3294410"/>
+            <a:ext cx="2312941" cy="892552"/>
+          </a:xfrm>
+          <a:prstGeom prst="rect">
+            <a:avLst/>
+          </a:prstGeom>
+          <a:noFill/>
+        </p:spPr>
+        <p:txBody>
+          <a:bodyPr wrap="none" rtlCol="0">
+            <a:spAutoFit/>
+          </a:bodyPr>
+          <a:lstStyle/>
+          <a:p>
+            <a:endParaRPr lang="en-US" sz="400" dirty="0">
+              <a:solidFill>
+                <a:schemeClr val="bg2"/>
+              </a:solidFill>
+            </a:endParaRPr>
+          </a:p>
+          <a:p>
+            <a:r>
+              <a:rPr lang="en-US" sz="2400" dirty="0">
+                <a:solidFill>
+                  <a:schemeClr val="bg2"/>
+                </a:solidFill>
+              </a:rPr>
+              <a:t>Annualized Cost</a:t>
+            </a:r>
+          </a:p>
+          <a:p>
+            <a:r>
+              <a:rPr lang="en-US" sz="2400" dirty="0">
+                <a:solidFill>
+                  <a:schemeClr val="bg2"/>
+                </a:solidFill>
+              </a:rPr>
+              <a:t>  (by component)</a:t>
+            </a:r>
+          </a:p>
+        </p:txBody>
+      </p:sp>
+      <p:sp>
+        <p:nvSpPr>
+          <p:cNvPr id="52" name="Output"/>
+          <p:cNvSpPr txBox="1"/>
+          <p:nvPr/>
+        </p:nvSpPr>
+        <p:spPr>
+          <a:xfrm>
+            <a:off x="7262288" y="1149142"/>
+            <a:ext cx="2430794" cy="523220"/>
+          </a:xfrm>
+          <a:prstGeom prst="rect">
+            <a:avLst/>
+          </a:prstGeom>
+          <a:noFill/>
+        </p:spPr>
+        <p:txBody>
+          <a:bodyPr wrap="none" rtlCol="0">
+            <a:spAutoFit/>
+          </a:bodyPr>
+          <a:lstStyle/>
+          <a:p>
+            <a:endParaRPr lang="en-US" sz="400" dirty="0">
+              <a:solidFill>
+                <a:schemeClr val="bg2"/>
+              </a:solidFill>
+            </a:endParaRPr>
+          </a:p>
+          <a:p>
+            <a:r>
+              <a:rPr lang="en-US" sz="2400" dirty="0">
+                <a:solidFill>
+                  <a:schemeClr val="bg2"/>
+                </a:solidFill>
+              </a:rPr>
+              <a:t>Operating Profiles</a:t>
+            </a:r>
+          </a:p>
+        </p:txBody>
+      </p:sp>
+      <p:sp>
+        <p:nvSpPr>
+          <p:cNvPr id="11" name="Cost BOX"/>
+          <p:cNvSpPr/>
+          <p:nvPr/>
+        </p:nvSpPr>
+        <p:spPr>
+          <a:xfrm>
+            <a:off x="126220" y="4722581"/>
+            <a:ext cx="1737360" cy="2086255"/>
+          </a:xfrm>
+          <a:prstGeom prst="roundRect">
+            <a:avLst>
+              <a:gd name="adj" fmla="val 9258"/>
+            </a:avLst>
+          </a:prstGeom>
+        </p:spPr>
+        <p:style>
+          <a:lnRef idx="2">
+            <a:schemeClr val="accent1">
+              <a:shade val="50000"/>
+            </a:schemeClr>
+          </a:lnRef>
+          <a:fillRef idx="1">
+            <a:schemeClr val="accent1"/>
+          </a:fillRef>
+          <a:effectRef idx="0">
+            <a:schemeClr val="accent1"/>
+          </a:effectRef>
+          <a:fontRef idx="minor">
+            <a:schemeClr val="lt1"/>
+          </a:fontRef>
+        </p:style>
+        <p:txBody>
+          <a:bodyPr rtlCol="0" anchor="ctr"/>
+          <a:lstStyle/>
+          <a:p>
+            <a:pPr algn="ctr"/>
+            <a:r>
+              <a:rPr lang="en-US" sz="2800" dirty="0"/>
+              <a:t>Cost Inputs</a:t>
+            </a:r>
+          </a:p>
+        </p:txBody>
+      </p:sp>
+    </p:spTree>
+    <p:extLst>
+      <p:ext uri="{BB962C8B-B14F-4D97-AF65-F5344CB8AC3E}">
+        <p14:creationId xmlns:p14="http://schemas.microsoft.com/office/powerpoint/2010/main" val="1807337004"/>
+      </p:ext>
+    </p:extLst>
+  </p:cSld>
+  <p:clrMapOvr>
+    <a:masterClrMapping/>
+  </p:clrMapOvr>
+</p:sld>
+</file>
+
+<file path=ppt/slides/slide7.xml><?xml version="1.0" encoding="utf-8"?>
+<p:sld xmlns:a="http://schemas.openxmlformats.org/drawingml/2006/main" xmlns:r="http://schemas.openxmlformats.org/officeDocument/2006/relationships" xmlns:p="http://schemas.openxmlformats.org/presentationml/2006/main">
+  <p:cSld>
+    <p:spTree>
+      <p:nvGrpSpPr>
+        <p:cNvPr id="1" name=""/>
+        <p:cNvGrpSpPr/>
+        <p:nvPr/>
+      </p:nvGrpSpPr>
+      <p:grpSpPr>
+        <a:xfrm>
+          <a:off x="0" y="0"/>
+          <a:ext cx="0" cy="0"/>
+          <a:chOff x="0" y="0"/>
+          <a:chExt cx="0" cy="0"/>
+        </a:xfrm>
+      </p:grpSpPr>
+      <p:sp>
+        <p:nvSpPr>
           <p:cNvPr id="2" name="Title 1"/>
           <p:cNvSpPr>
             <a:spLocks noGrp="1"/>

</xml_diff>

<commit_message>
Sync changes before merging with master
</commit_message>
<xml_diff>
--- a/Optimization model diagram.pptx
+++ b/Optimization model diagram.pptx
@@ -5,7 +5,7 @@
     <p:sldMasterId id="2147483648" r:id="rId1"/>
   </p:sldMasterIdLst>
   <p:notesMasterIdLst>
-    <p:notesMasterId r:id="rId11"/>
+    <p:notesMasterId r:id="rId12"/>
   </p:notesMasterIdLst>
   <p:sldIdLst>
     <p:sldId id="580" r:id="rId2"/>
@@ -14,9 +14,10 @@
     <p:sldId id="584" r:id="rId5"/>
     <p:sldId id="585" r:id="rId6"/>
     <p:sldId id="586" r:id="rId7"/>
-    <p:sldId id="587" r:id="rId8"/>
-    <p:sldId id="588" r:id="rId9"/>
-    <p:sldId id="581" r:id="rId10"/>
+    <p:sldId id="589" r:id="rId8"/>
+    <p:sldId id="587" r:id="rId9"/>
+    <p:sldId id="588" r:id="rId10"/>
+    <p:sldId id="581" r:id="rId11"/>
   </p:sldIdLst>
   <p:sldSz cx="9144000" cy="6858000" type="screen4x3"/>
   <p:notesSz cx="6858000" cy="9144000"/>
@@ -238,7 +239,7 @@
             <a:fld id="{62430CC7-8C13-4D51-BC46-B95A4AC4A04B}" type="datetimeFigureOut">
               <a:rPr lang="en-US" smtClean="0"/>
               <a:pPr/>
-              <a:t>7/7/2018</a:t>
+              <a:t>5/2/2019</a:t>
             </a:fld>
             <a:endParaRPr lang="en-US"/>
           </a:p>
@@ -1193,7 +1194,7 @@
             <a:fld id="{7CD645B7-0B3A-4239-8069-075A43B72B67}" type="slidenum">
               <a:rPr lang="en-US" smtClean="0"/>
               <a:pPr/>
-              <a:t>9</a:t>
+              <a:t>10</a:t>
             </a:fld>
             <a:endParaRPr lang="en-US"/>
           </a:p>
@@ -4639,6 +4640,519 @@
     <p:extLst>
       <p:ext uri="{BB962C8B-B14F-4D97-AF65-F5344CB8AC3E}">
         <p14:creationId xmlns:p14="http://schemas.microsoft.com/office/powerpoint/2010/main" val="4041141427"/>
+      </p:ext>
+    </p:extLst>
+  </p:cSld>
+  <p:clrMapOvr>
+    <a:masterClrMapping/>
+  </p:clrMapOvr>
+</p:sld>
+</file>
+
+<file path=ppt/slides/slide10.xml><?xml version="1.0" encoding="utf-8"?>
+<p:sld xmlns:a="http://schemas.openxmlformats.org/drawingml/2006/main" xmlns:r="http://schemas.openxmlformats.org/officeDocument/2006/relationships" xmlns:p="http://schemas.openxmlformats.org/presentationml/2006/main">
+  <p:cSld>
+    <p:spTree>
+      <p:nvGrpSpPr>
+        <p:cNvPr id="1" name=""/>
+        <p:cNvGrpSpPr/>
+        <p:nvPr/>
+      </p:nvGrpSpPr>
+      <p:grpSpPr>
+        <a:xfrm>
+          <a:off x="0" y="0"/>
+          <a:ext cx="0" cy="0"/>
+          <a:chOff x="0" y="0"/>
+          <a:chExt cx="0" cy="0"/>
+        </a:xfrm>
+      </p:grpSpPr>
+      <p:sp>
+        <p:nvSpPr>
+          <p:cNvPr id="2" name="Title 1"/>
+          <p:cNvSpPr>
+            <a:spLocks noGrp="1"/>
+          </p:cNvSpPr>
+          <p:nvPr>
+            <p:ph type="title"/>
+          </p:nvPr>
+        </p:nvSpPr>
+        <p:spPr/>
+        <p:txBody>
+          <a:bodyPr>
+            <a:normAutofit fontScale="90000"/>
+          </a:bodyPr>
+          <a:lstStyle/>
+          <a:p>
+            <a:r>
+              <a:rPr lang="en-US" dirty="0"/>
+              <a:t>Quantify the value of energy storage</a:t>
+            </a:r>
+          </a:p>
+        </p:txBody>
+      </p:sp>
+      <p:sp>
+        <p:nvSpPr>
+          <p:cNvPr id="6" name="TextBox 5"/>
+          <p:cNvSpPr txBox="1"/>
+          <p:nvPr/>
+        </p:nvSpPr>
+        <p:spPr>
+          <a:xfrm>
+            <a:off x="556504" y="4972050"/>
+            <a:ext cx="1780039" cy="1361911"/>
+          </a:xfrm>
+          <a:prstGeom prst="rect">
+            <a:avLst/>
+          </a:prstGeom>
+          <a:noFill/>
+        </p:spPr>
+        <p:txBody>
+          <a:bodyPr wrap="none" rtlCol="0">
+            <a:spAutoFit/>
+          </a:bodyPr>
+          <a:lstStyle/>
+          <a:p>
+            <a:pPr marL="285750" indent="-285750">
+              <a:buFont typeface="Arial" pitchFamily="34" charset="0"/>
+              <a:buChar char="•"/>
+            </a:pPr>
+            <a:r>
+              <a:rPr lang="en-US" sz="1650" dirty="0">
+                <a:solidFill>
+                  <a:schemeClr val="bg2"/>
+                </a:solidFill>
+              </a:rPr>
+              <a:t>Energy Prices</a:t>
+            </a:r>
+          </a:p>
+          <a:p>
+            <a:pPr marL="285750" indent="-285750">
+              <a:buFont typeface="Arial" pitchFamily="34" charset="0"/>
+              <a:buChar char="•"/>
+            </a:pPr>
+            <a:r>
+              <a:rPr lang="en-US" sz="1650" dirty="0">
+                <a:solidFill>
+                  <a:schemeClr val="bg2"/>
+                </a:solidFill>
+              </a:rPr>
+              <a:t>Reserve Prices</a:t>
+            </a:r>
+          </a:p>
+          <a:p>
+            <a:pPr marL="285750" indent="-285750">
+              <a:buFont typeface="Arial" pitchFamily="34" charset="0"/>
+              <a:buChar char="•"/>
+            </a:pPr>
+            <a:r>
+              <a:rPr lang="en-US" sz="1650" dirty="0">
+                <a:solidFill>
+                  <a:schemeClr val="bg2"/>
+                </a:solidFill>
+              </a:rPr>
+              <a:t>Hydrogen Price</a:t>
+            </a:r>
+          </a:p>
+          <a:p>
+            <a:pPr marL="285750" indent="-285750">
+              <a:buFont typeface="Arial" pitchFamily="34" charset="0"/>
+              <a:buChar char="•"/>
+            </a:pPr>
+            <a:r>
+              <a:rPr lang="en-US" sz="1650" dirty="0">
+                <a:solidFill>
+                  <a:schemeClr val="bg2"/>
+                </a:solidFill>
+              </a:rPr>
+              <a:t>Operational </a:t>
+            </a:r>
+            <a:br>
+              <a:rPr lang="en-US" sz="1650" dirty="0">
+                <a:solidFill>
+                  <a:schemeClr val="bg2"/>
+                </a:solidFill>
+              </a:rPr>
+            </a:br>
+            <a:r>
+              <a:rPr lang="en-US" sz="1650" dirty="0">
+                <a:solidFill>
+                  <a:schemeClr val="bg2"/>
+                </a:solidFill>
+              </a:rPr>
+              <a:t>parameters</a:t>
+            </a:r>
+          </a:p>
+        </p:txBody>
+      </p:sp>
+      <p:sp>
+        <p:nvSpPr>
+          <p:cNvPr id="14" name="TextBox 13"/>
+          <p:cNvSpPr txBox="1"/>
+          <p:nvPr/>
+        </p:nvSpPr>
+        <p:spPr>
+          <a:xfrm>
+            <a:off x="242179" y="4648200"/>
+            <a:ext cx="2548646" cy="400110"/>
+          </a:xfrm>
+          <a:prstGeom prst="rect">
+            <a:avLst/>
+          </a:prstGeom>
+          <a:noFill/>
+        </p:spPr>
+        <p:txBody>
+          <a:bodyPr wrap="none" rtlCol="0">
+            <a:spAutoFit/>
+          </a:bodyPr>
+          <a:lstStyle/>
+          <a:p>
+            <a:r>
+              <a:rPr lang="en-US" sz="2000" b="1" u="sng" dirty="0">
+                <a:solidFill>
+                  <a:schemeClr val="bg2"/>
+                </a:solidFill>
+              </a:rPr>
+              <a:t>Historical or Modelled</a:t>
+            </a:r>
+          </a:p>
+        </p:txBody>
+      </p:sp>
+      <p:sp>
+        <p:nvSpPr>
+          <p:cNvPr id="16" name="Down Arrow 15"/>
+          <p:cNvSpPr/>
+          <p:nvPr/>
+        </p:nvSpPr>
+        <p:spPr>
+          <a:xfrm>
+            <a:off x="5486400" y="5065030"/>
+            <a:ext cx="333375" cy="915418"/>
+          </a:xfrm>
+          <a:prstGeom prst="downArrow">
+            <a:avLst>
+              <a:gd name="adj1" fmla="val 100000"/>
+              <a:gd name="adj2" fmla="val 50000"/>
+            </a:avLst>
+          </a:prstGeom>
+          <a:solidFill>
+            <a:srgbClr val="FFC000"/>
+          </a:solidFill>
+          <a:ln>
+            <a:solidFill>
+              <a:schemeClr val="accent3"/>
+            </a:solidFill>
+          </a:ln>
+          <a:scene3d>
+            <a:camera prst="orthographicFront">
+              <a:rot lat="0" lon="10800000" rev="5400000"/>
+            </a:camera>
+            <a:lightRig rig="threePt" dir="t"/>
+          </a:scene3d>
+        </p:spPr>
+        <p:style>
+          <a:lnRef idx="2">
+            <a:schemeClr val="accent1">
+              <a:shade val="50000"/>
+            </a:schemeClr>
+          </a:lnRef>
+          <a:fillRef idx="1">
+            <a:schemeClr val="accent1"/>
+          </a:fillRef>
+          <a:effectRef idx="0">
+            <a:schemeClr val="accent1"/>
+          </a:effectRef>
+          <a:fontRef idx="minor">
+            <a:schemeClr val="lt1"/>
+          </a:fontRef>
+        </p:style>
+        <p:txBody>
+          <a:bodyPr rtlCol="0" anchor="ctr"/>
+          <a:lstStyle/>
+          <a:p>
+            <a:pPr algn="ctr"/>
+            <a:endParaRPr lang="en-US"/>
+          </a:p>
+        </p:txBody>
+      </p:sp>
+      <p:sp>
+        <p:nvSpPr>
+          <p:cNvPr id="8" name="Rounded Rectangle 7"/>
+          <p:cNvSpPr/>
+          <p:nvPr/>
+        </p:nvSpPr>
+        <p:spPr>
+          <a:xfrm>
+            <a:off x="3248163" y="4886325"/>
+            <a:ext cx="2333487" cy="1295400"/>
+          </a:xfrm>
+          <a:prstGeom prst="roundRect">
+            <a:avLst/>
+          </a:prstGeom>
+        </p:spPr>
+        <p:style>
+          <a:lnRef idx="2">
+            <a:schemeClr val="accent1">
+              <a:shade val="50000"/>
+            </a:schemeClr>
+          </a:lnRef>
+          <a:fillRef idx="1">
+            <a:schemeClr val="accent1"/>
+          </a:fillRef>
+          <a:effectRef idx="0">
+            <a:schemeClr val="accent1"/>
+          </a:effectRef>
+          <a:fontRef idx="minor">
+            <a:schemeClr val="lt1"/>
+          </a:fontRef>
+        </p:style>
+        <p:txBody>
+          <a:bodyPr rtlCol="0" anchor="ctr"/>
+          <a:lstStyle/>
+          <a:p>
+            <a:pPr algn="ctr"/>
+            <a:r>
+              <a:rPr lang="en-US" sz="3000" dirty="0"/>
+              <a:t>Optimization model</a:t>
+            </a:r>
+          </a:p>
+        </p:txBody>
+      </p:sp>
+      <p:sp>
+        <p:nvSpPr>
+          <p:cNvPr id="17" name="TextBox 16"/>
+          <p:cNvSpPr txBox="1"/>
+          <p:nvPr/>
+        </p:nvSpPr>
+        <p:spPr>
+          <a:xfrm>
+            <a:off x="6203144" y="5192494"/>
+            <a:ext cx="2788456" cy="646331"/>
+          </a:xfrm>
+          <a:prstGeom prst="rect">
+            <a:avLst/>
+          </a:prstGeom>
+          <a:noFill/>
+        </p:spPr>
+        <p:txBody>
+          <a:bodyPr wrap="none" rtlCol="0">
+            <a:spAutoFit/>
+          </a:bodyPr>
+          <a:lstStyle/>
+          <a:p>
+            <a:r>
+              <a:rPr lang="en-US" dirty="0">
+                <a:solidFill>
+                  <a:schemeClr val="bg2"/>
+                </a:solidFill>
+              </a:rPr>
+              <a:t>Profit based on operation </a:t>
+            </a:r>
+            <a:br>
+              <a:rPr lang="en-US" dirty="0">
+                <a:solidFill>
+                  <a:schemeClr val="bg2"/>
+                </a:solidFill>
+              </a:rPr>
+            </a:br>
+            <a:r>
+              <a:rPr lang="en-US" dirty="0">
+                <a:solidFill>
+                  <a:schemeClr val="bg2"/>
+                </a:solidFill>
+              </a:rPr>
+              <a:t> (arbitrage, AS, H</a:t>
+            </a:r>
+            <a:r>
+              <a:rPr lang="en-US" baseline="-25000" dirty="0">
+                <a:solidFill>
+                  <a:schemeClr val="bg2"/>
+                </a:solidFill>
+              </a:rPr>
+              <a:t>2</a:t>
+            </a:r>
+            <a:r>
+              <a:rPr lang="en-US" dirty="0">
+                <a:solidFill>
+                  <a:schemeClr val="bg2"/>
+                </a:solidFill>
+              </a:rPr>
+              <a:t> sale, etc.)</a:t>
+            </a:r>
+          </a:p>
+        </p:txBody>
+      </p:sp>
+      <p:sp>
+        <p:nvSpPr>
+          <p:cNvPr id="10" name="Rectangle 9"/>
+          <p:cNvSpPr/>
+          <p:nvPr/>
+        </p:nvSpPr>
+        <p:spPr>
+          <a:xfrm>
+            <a:off x="0" y="785816"/>
+            <a:ext cx="9144000" cy="804859"/>
+          </a:xfrm>
+          <a:prstGeom prst="rect">
+            <a:avLst/>
+          </a:prstGeom>
+          <a:solidFill>
+            <a:schemeClr val="tx1"/>
+          </a:solidFill>
+          <a:ln w="38100">
+            <a:solidFill>
+              <a:srgbClr val="0070C0"/>
+            </a:solidFill>
+          </a:ln>
+        </p:spPr>
+        <p:style>
+          <a:lnRef idx="2">
+            <a:schemeClr val="accent1">
+              <a:shade val="50000"/>
+            </a:schemeClr>
+          </a:lnRef>
+          <a:fillRef idx="1">
+            <a:schemeClr val="accent1"/>
+          </a:fillRef>
+          <a:effectRef idx="0">
+            <a:schemeClr val="accent1"/>
+          </a:effectRef>
+          <a:fontRef idx="minor">
+            <a:schemeClr val="lt1"/>
+          </a:fontRef>
+        </p:style>
+        <p:txBody>
+          <a:bodyPr lIns="45720" rIns="45720" rtlCol="0" anchor="ctr"/>
+          <a:lstStyle/>
+          <a:p>
+            <a:pPr algn="ctr"/>
+            <a:r>
+              <a:rPr lang="en-US" sz="2400" b="1" dirty="0">
+                <a:solidFill>
+                  <a:schemeClr val="bg2"/>
+                </a:solidFill>
+              </a:rPr>
+              <a:t>An operations optimization model is used to quantify value from electricity markets and the sale of hydrogen</a:t>
+            </a:r>
+          </a:p>
+        </p:txBody>
+      </p:sp>
+      <p:sp>
+        <p:nvSpPr>
+          <p:cNvPr id="12" name="Content Placeholder 2"/>
+          <p:cNvSpPr>
+            <a:spLocks noGrp="1"/>
+          </p:cNvSpPr>
+          <p:nvPr>
+            <p:ph idx="1"/>
+          </p:nvPr>
+        </p:nvSpPr>
+        <p:spPr>
+          <a:xfrm>
+            <a:off x="304800" y="1676400"/>
+            <a:ext cx="8229600" cy="2971800"/>
+          </a:xfrm>
+        </p:spPr>
+        <p:txBody>
+          <a:bodyPr>
+            <a:normAutofit/>
+          </a:bodyPr>
+          <a:lstStyle/>
+          <a:p>
+            <a:r>
+              <a:rPr lang="en-US" sz="2400" dirty="0"/>
+              <a:t>Optimization model can perform time-resolved co-optimization of energy, ancillary service and hydrogen products quickly</a:t>
+            </a:r>
+          </a:p>
+          <a:p>
+            <a:r>
+              <a:rPr lang="en-US" sz="2400" dirty="0"/>
+              <a:t>Assumptions</a:t>
+            </a:r>
+          </a:p>
+          <a:p>
+            <a:pPr lvl="1"/>
+            <a:r>
+              <a:rPr lang="en-US" sz="2000" dirty="0"/>
+              <a:t>Sufficient capacity is available in all markets</a:t>
+            </a:r>
+          </a:p>
+          <a:p>
+            <a:pPr lvl="1"/>
+            <a:r>
+              <a:rPr lang="en-US" sz="2000" dirty="0"/>
+              <a:t>Objects don’t impact market outcome </a:t>
+            </a:r>
+            <a:br>
+              <a:rPr lang="en-US" sz="2000" dirty="0"/>
+            </a:br>
+            <a:r>
+              <a:rPr lang="en-US" sz="2000" dirty="0"/>
+              <a:t>(i.e., small compared to market size)</a:t>
+            </a:r>
+          </a:p>
+        </p:txBody>
+      </p:sp>
+      <p:sp>
+        <p:nvSpPr>
+          <p:cNvPr id="13" name="Down Arrow 12"/>
+          <p:cNvSpPr/>
+          <p:nvPr/>
+        </p:nvSpPr>
+        <p:spPr>
+          <a:xfrm>
+            <a:off x="2671950" y="5065030"/>
+            <a:ext cx="171074" cy="915418"/>
+          </a:xfrm>
+          <a:prstGeom prst="downArrow">
+            <a:avLst>
+              <a:gd name="adj1" fmla="val 100000"/>
+              <a:gd name="adj2" fmla="val 50000"/>
+            </a:avLst>
+          </a:prstGeom>
+          <a:solidFill>
+            <a:srgbClr val="FFC000"/>
+          </a:solidFill>
+          <a:ln>
+            <a:solidFill>
+              <a:schemeClr val="accent3"/>
+            </a:solidFill>
+          </a:ln>
+          <a:scene3d>
+            <a:camera prst="orthographicFront">
+              <a:rot lat="0" lon="10800000" rev="5400000"/>
+            </a:camera>
+            <a:lightRig rig="threePt" dir="t"/>
+          </a:scene3d>
+        </p:spPr>
+        <p:style>
+          <a:lnRef idx="2">
+            <a:schemeClr val="accent1">
+              <a:shade val="50000"/>
+            </a:schemeClr>
+          </a:lnRef>
+          <a:fillRef idx="1">
+            <a:schemeClr val="accent1"/>
+          </a:fillRef>
+          <a:effectRef idx="0">
+            <a:schemeClr val="accent1"/>
+          </a:effectRef>
+          <a:fontRef idx="minor">
+            <a:schemeClr val="lt1"/>
+          </a:fontRef>
+        </p:style>
+        <p:txBody>
+          <a:bodyPr rtlCol="0" anchor="ctr"/>
+          <a:lstStyle/>
+          <a:p>
+            <a:pPr algn="ctr"/>
+            <a:endParaRPr lang="en-US"/>
+          </a:p>
+        </p:txBody>
+      </p:sp>
+    </p:spTree>
+    <p:extLst>
+      <p:ext uri="{BB962C8B-B14F-4D97-AF65-F5344CB8AC3E}">
+        <p14:creationId xmlns:p14="http://schemas.microsoft.com/office/powerpoint/2010/main" val="3757671085"/>
       </p:ext>
     </p:extLst>
   </p:cSld>
@@ -13297,6 +13811,1957 @@
       </p:grpSpPr>
       <p:sp>
         <p:nvSpPr>
+          <p:cNvPr id="37" name="Input Categories"/>
+          <p:cNvSpPr txBox="1"/>
+          <p:nvPr/>
+        </p:nvSpPr>
+        <p:spPr>
+          <a:xfrm>
+            <a:off x="531421" y="-1930640"/>
+            <a:ext cx="992579" cy="461665"/>
+          </a:xfrm>
+          <a:prstGeom prst="rect">
+            <a:avLst/>
+          </a:prstGeom>
+          <a:noFill/>
+        </p:spPr>
+        <p:txBody>
+          <a:bodyPr wrap="none" rtlCol="0">
+            <a:spAutoFit/>
+          </a:bodyPr>
+          <a:lstStyle/>
+          <a:p>
+            <a:r>
+              <a:rPr lang="en-US" sz="2400" b="1" dirty="0">
+                <a:solidFill>
+                  <a:schemeClr val="bg2"/>
+                </a:solidFill>
+              </a:rPr>
+              <a:t>Inputs</a:t>
+            </a:r>
+          </a:p>
+        </p:txBody>
+      </p:sp>
+      <p:sp>
+        <p:nvSpPr>
+          <p:cNvPr id="38" name="Input Val"/>
+          <p:cNvSpPr txBox="1"/>
+          <p:nvPr/>
+        </p:nvSpPr>
+        <p:spPr>
+          <a:xfrm>
+            <a:off x="2453640" y="-1930640"/>
+            <a:ext cx="1775486" cy="461665"/>
+          </a:xfrm>
+          <a:prstGeom prst="rect">
+            <a:avLst/>
+          </a:prstGeom>
+          <a:noFill/>
+        </p:spPr>
+        <p:txBody>
+          <a:bodyPr wrap="none" rtlCol="0">
+            <a:spAutoFit/>
+          </a:bodyPr>
+          <a:lstStyle/>
+          <a:p>
+            <a:r>
+              <a:rPr lang="en-US" sz="2400" b="1" dirty="0">
+                <a:solidFill>
+                  <a:schemeClr val="bg2"/>
+                </a:solidFill>
+              </a:rPr>
+              <a:t>Input Values</a:t>
+            </a:r>
+          </a:p>
+        </p:txBody>
+      </p:sp>
+      <p:sp>
+        <p:nvSpPr>
+          <p:cNvPr id="39" name="Model"/>
+          <p:cNvSpPr txBox="1"/>
+          <p:nvPr/>
+        </p:nvSpPr>
+        <p:spPr>
+          <a:xfrm>
+            <a:off x="5596858" y="-1930640"/>
+            <a:ext cx="1015021" cy="461665"/>
+          </a:xfrm>
+          <a:prstGeom prst="rect">
+            <a:avLst/>
+          </a:prstGeom>
+          <a:noFill/>
+        </p:spPr>
+        <p:txBody>
+          <a:bodyPr wrap="none" rtlCol="0">
+            <a:spAutoFit/>
+          </a:bodyPr>
+          <a:lstStyle/>
+          <a:p>
+            <a:pPr algn="ctr"/>
+            <a:r>
+              <a:rPr lang="en-US" sz="2400" b="1" dirty="0">
+                <a:solidFill>
+                  <a:schemeClr val="bg2"/>
+                </a:solidFill>
+              </a:rPr>
+              <a:t>Model</a:t>
+            </a:r>
+          </a:p>
+        </p:txBody>
+      </p:sp>
+      <p:sp>
+        <p:nvSpPr>
+          <p:cNvPr id="40" name="Output Arrow" hidden="1"/>
+          <p:cNvSpPr/>
+          <p:nvPr/>
+        </p:nvSpPr>
+        <p:spPr>
+          <a:xfrm>
+            <a:off x="7147560" y="600714"/>
+            <a:ext cx="2083123" cy="4080567"/>
+          </a:xfrm>
+          <a:prstGeom prst="downArrow">
+            <a:avLst>
+              <a:gd name="adj1" fmla="val 100000"/>
+              <a:gd name="adj2" fmla="val 23110"/>
+            </a:avLst>
+          </a:prstGeom>
+          <a:solidFill>
+            <a:srgbClr val="FFC000"/>
+          </a:solidFill>
+          <a:ln>
+            <a:solidFill>
+              <a:schemeClr val="accent3"/>
+            </a:solidFill>
+          </a:ln>
+          <a:scene3d>
+            <a:camera prst="orthographicFront">
+              <a:rot lat="0" lon="10800000" rev="5400000"/>
+            </a:camera>
+            <a:lightRig rig="threePt" dir="t"/>
+          </a:scene3d>
+        </p:spPr>
+        <p:style>
+          <a:lnRef idx="2">
+            <a:schemeClr val="accent1">
+              <a:shade val="50000"/>
+            </a:schemeClr>
+          </a:lnRef>
+          <a:fillRef idx="1">
+            <a:schemeClr val="accent1"/>
+          </a:fillRef>
+          <a:effectRef idx="0">
+            <a:schemeClr val="accent1"/>
+          </a:effectRef>
+          <a:fontRef idx="minor">
+            <a:schemeClr val="lt1"/>
+          </a:fontRef>
+        </p:style>
+        <p:txBody>
+          <a:bodyPr rtlCol="0" anchor="ctr"/>
+          <a:lstStyle/>
+          <a:p>
+            <a:pPr algn="ctr"/>
+            <a:endParaRPr lang="en-US"/>
+          </a:p>
+        </p:txBody>
+      </p:sp>
+      <p:sp>
+        <p:nvSpPr>
+          <p:cNvPr id="41" name="Output" hidden="1"/>
+          <p:cNvSpPr txBox="1"/>
+          <p:nvPr/>
+        </p:nvSpPr>
+        <p:spPr>
+          <a:xfrm>
+            <a:off x="7262730" y="1645467"/>
+            <a:ext cx="2598853" cy="2062103"/>
+          </a:xfrm>
+          <a:prstGeom prst="rect">
+            <a:avLst/>
+          </a:prstGeom>
+          <a:noFill/>
+        </p:spPr>
+        <p:txBody>
+          <a:bodyPr wrap="none" rtlCol="0">
+            <a:spAutoFit/>
+          </a:bodyPr>
+          <a:lstStyle/>
+          <a:p>
+            <a:r>
+              <a:rPr lang="en-US" sz="2400" dirty="0">
+                <a:solidFill>
+                  <a:schemeClr val="bg2"/>
+                </a:solidFill>
+              </a:rPr>
+              <a:t>Maximum Revenue</a:t>
+            </a:r>
+          </a:p>
+          <a:p>
+            <a:r>
+              <a:rPr lang="en-US" sz="2400" dirty="0">
+                <a:solidFill>
+                  <a:schemeClr val="bg2"/>
+                </a:solidFill>
+              </a:rPr>
+              <a:t>     (by component)</a:t>
+            </a:r>
+          </a:p>
+          <a:p>
+            <a:endParaRPr lang="en-US" sz="400" dirty="0">
+              <a:solidFill>
+                <a:schemeClr val="bg2"/>
+              </a:solidFill>
+            </a:endParaRPr>
+          </a:p>
+          <a:p>
+            <a:r>
+              <a:rPr lang="en-US" sz="2400" dirty="0">
+                <a:solidFill>
+                  <a:schemeClr val="bg2"/>
+                </a:solidFill>
+              </a:rPr>
+              <a:t>Annualized Cost</a:t>
+            </a:r>
+          </a:p>
+          <a:p>
+            <a:r>
+              <a:rPr lang="en-US" sz="2400" dirty="0">
+                <a:solidFill>
+                  <a:schemeClr val="bg2"/>
+                </a:solidFill>
+              </a:rPr>
+              <a:t>  (by component)</a:t>
+            </a:r>
+          </a:p>
+          <a:p>
+            <a:endParaRPr lang="en-US" sz="400" dirty="0">
+              <a:solidFill>
+                <a:schemeClr val="bg2"/>
+              </a:solidFill>
+            </a:endParaRPr>
+          </a:p>
+          <a:p>
+            <a:r>
+              <a:rPr lang="en-US" sz="2400" dirty="0">
+                <a:solidFill>
+                  <a:schemeClr val="bg2"/>
+                </a:solidFill>
+              </a:rPr>
+              <a:t>Operating Profiles</a:t>
+            </a:r>
+          </a:p>
+        </p:txBody>
+      </p:sp>
+      <p:sp>
+        <p:nvSpPr>
+          <p:cNvPr id="42" name="Output"/>
+          <p:cNvSpPr txBox="1"/>
+          <p:nvPr/>
+        </p:nvSpPr>
+        <p:spPr>
+          <a:xfrm>
+            <a:off x="7572077" y="-1933302"/>
+            <a:ext cx="1226618" cy="461665"/>
+          </a:xfrm>
+          <a:prstGeom prst="rect">
+            <a:avLst/>
+          </a:prstGeom>
+          <a:noFill/>
+        </p:spPr>
+        <p:txBody>
+          <a:bodyPr wrap="none" rtlCol="0">
+            <a:spAutoFit/>
+          </a:bodyPr>
+          <a:lstStyle/>
+          <a:p>
+            <a:pPr algn="ctr"/>
+            <a:r>
+              <a:rPr lang="en-US" sz="2400" b="1" dirty="0">
+                <a:solidFill>
+                  <a:schemeClr val="bg2"/>
+                </a:solidFill>
+              </a:rPr>
+              <a:t>Outputs</a:t>
+            </a:r>
+          </a:p>
+        </p:txBody>
+      </p:sp>
+      <p:sp>
+        <p:nvSpPr>
+          <p:cNvPr id="2" name="Arrow: Right 1">
+            <a:extLst>
+              <a:ext uri="{FF2B5EF4-FFF2-40B4-BE49-F238E27FC236}">
+                <a16:creationId xmlns:a16="http://schemas.microsoft.com/office/drawing/2014/main" id="{A1424E25-725F-4B2D-9B01-FFF0AB7DD3A2}"/>
+              </a:ext>
+            </a:extLst>
+          </p:cNvPr>
+          <p:cNvSpPr/>
+          <p:nvPr/>
+        </p:nvSpPr>
+        <p:spPr>
+          <a:xfrm>
+            <a:off x="1647546" y="-1272876"/>
+            <a:ext cx="3379273" cy="365760"/>
+          </a:xfrm>
+          <a:prstGeom prst="rightArrow">
+            <a:avLst>
+              <a:gd name="adj1" fmla="val 100000"/>
+              <a:gd name="adj2" fmla="val 50000"/>
+            </a:avLst>
+          </a:prstGeom>
+          <a:solidFill>
+            <a:srgbClr val="CB9F23"/>
+          </a:solidFill>
+          <a:ln>
+            <a:solidFill>
+              <a:srgbClr val="B57307"/>
+            </a:solidFill>
+          </a:ln>
+        </p:spPr>
+        <p:style>
+          <a:lnRef idx="2">
+            <a:schemeClr val="accent3">
+              <a:shade val="50000"/>
+            </a:schemeClr>
+          </a:lnRef>
+          <a:fillRef idx="1">
+            <a:schemeClr val="accent3"/>
+          </a:fillRef>
+          <a:effectRef idx="0">
+            <a:schemeClr val="accent3"/>
+          </a:effectRef>
+          <a:fontRef idx="minor">
+            <a:schemeClr val="lt1"/>
+          </a:fontRef>
+        </p:style>
+        <p:txBody>
+          <a:bodyPr lIns="0" tIns="0" rIns="0" bIns="0" rtlCol="0" anchor="ctr"/>
+          <a:lstStyle/>
+          <a:p>
+            <a:pPr algn="ctr"/>
+            <a:r>
+              <a:rPr lang="en-US" sz="2400" dirty="0">
+                <a:solidFill>
+                  <a:schemeClr val="bg2"/>
+                </a:solidFill>
+              </a:rPr>
+              <a:t>Energy Charge</a:t>
+            </a:r>
+          </a:p>
+        </p:txBody>
+      </p:sp>
+      <p:sp>
+        <p:nvSpPr>
+          <p:cNvPr id="59" name="Arrow: Right 58">
+            <a:extLst>
+              <a:ext uri="{FF2B5EF4-FFF2-40B4-BE49-F238E27FC236}">
+                <a16:creationId xmlns:a16="http://schemas.microsoft.com/office/drawing/2014/main" id="{CB73A2F7-9FD3-401B-82B0-5825A4BC86A8}"/>
+              </a:ext>
+            </a:extLst>
+          </p:cNvPr>
+          <p:cNvSpPr/>
+          <p:nvPr/>
+        </p:nvSpPr>
+        <p:spPr>
+          <a:xfrm>
+            <a:off x="1647546" y="-806022"/>
+            <a:ext cx="3379273" cy="365760"/>
+          </a:xfrm>
+          <a:prstGeom prst="rightArrow">
+            <a:avLst>
+              <a:gd name="adj1" fmla="val 100000"/>
+              <a:gd name="adj2" fmla="val 50000"/>
+            </a:avLst>
+          </a:prstGeom>
+          <a:solidFill>
+            <a:srgbClr val="CB9F23"/>
+          </a:solidFill>
+          <a:ln>
+            <a:solidFill>
+              <a:srgbClr val="B57307"/>
+            </a:solidFill>
+          </a:ln>
+        </p:spPr>
+        <p:style>
+          <a:lnRef idx="2">
+            <a:schemeClr val="accent3">
+              <a:shade val="50000"/>
+            </a:schemeClr>
+          </a:lnRef>
+          <a:fillRef idx="1">
+            <a:schemeClr val="accent3"/>
+          </a:fillRef>
+          <a:effectRef idx="0">
+            <a:schemeClr val="accent3"/>
+          </a:effectRef>
+          <a:fontRef idx="minor">
+            <a:schemeClr val="lt1"/>
+          </a:fontRef>
+        </p:style>
+        <p:txBody>
+          <a:bodyPr lIns="0" tIns="0" rIns="0" bIns="0" rtlCol="0" anchor="ctr"/>
+          <a:lstStyle/>
+          <a:p>
+            <a:pPr algn="ctr"/>
+            <a:r>
+              <a:rPr lang="en-US" sz="2400" dirty="0">
+                <a:solidFill>
+                  <a:schemeClr val="bg2"/>
+                </a:solidFill>
+              </a:rPr>
+              <a:t>Fixed Demand Charge</a:t>
+            </a:r>
+          </a:p>
+        </p:txBody>
+      </p:sp>
+      <p:sp>
+        <p:nvSpPr>
+          <p:cNvPr id="62" name="Arrow: Right 61">
+            <a:extLst>
+              <a:ext uri="{FF2B5EF4-FFF2-40B4-BE49-F238E27FC236}">
+                <a16:creationId xmlns:a16="http://schemas.microsoft.com/office/drawing/2014/main" id="{C3F608EC-390F-4869-BA45-4EBBB9FF8F5B}"/>
+              </a:ext>
+            </a:extLst>
+          </p:cNvPr>
+          <p:cNvSpPr/>
+          <p:nvPr/>
+        </p:nvSpPr>
+        <p:spPr>
+          <a:xfrm>
+            <a:off x="1647546" y="1237486"/>
+            <a:ext cx="3379273" cy="365760"/>
+          </a:xfrm>
+          <a:prstGeom prst="rightArrow">
+            <a:avLst>
+              <a:gd name="adj1" fmla="val 100000"/>
+              <a:gd name="adj2" fmla="val 50000"/>
+            </a:avLst>
+          </a:prstGeom>
+          <a:solidFill>
+            <a:srgbClr val="CB9F23"/>
+          </a:solidFill>
+          <a:ln>
+            <a:solidFill>
+              <a:srgbClr val="B57307"/>
+            </a:solidFill>
+          </a:ln>
+        </p:spPr>
+        <p:style>
+          <a:lnRef idx="2">
+            <a:schemeClr val="accent3">
+              <a:shade val="50000"/>
+            </a:schemeClr>
+          </a:lnRef>
+          <a:fillRef idx="1">
+            <a:schemeClr val="accent3"/>
+          </a:fillRef>
+          <a:effectRef idx="0">
+            <a:schemeClr val="accent3"/>
+          </a:effectRef>
+          <a:fontRef idx="minor">
+            <a:schemeClr val="lt1"/>
+          </a:fontRef>
+        </p:style>
+        <p:txBody>
+          <a:bodyPr lIns="0" tIns="0" rIns="0" bIns="0" rtlCol="0" anchor="ctr"/>
+          <a:lstStyle/>
+          <a:p>
+            <a:pPr algn="ctr"/>
+            <a:r>
+              <a:rPr lang="en-US" sz="2400" dirty="0">
+                <a:solidFill>
+                  <a:schemeClr val="bg2"/>
+                </a:solidFill>
+              </a:rPr>
+              <a:t>Ancillary Service Prices</a:t>
+            </a:r>
+          </a:p>
+        </p:txBody>
+      </p:sp>
+      <p:sp>
+        <p:nvSpPr>
+          <p:cNvPr id="65" name="Arrow: Right 64">
+            <a:extLst>
+              <a:ext uri="{FF2B5EF4-FFF2-40B4-BE49-F238E27FC236}">
+                <a16:creationId xmlns:a16="http://schemas.microsoft.com/office/drawing/2014/main" id="{433DA77A-0C0F-40BC-8246-5BCF150431EF}"/>
+              </a:ext>
+            </a:extLst>
+          </p:cNvPr>
+          <p:cNvSpPr/>
+          <p:nvPr/>
+        </p:nvSpPr>
+        <p:spPr>
+          <a:xfrm>
+            <a:off x="1647546" y="2300724"/>
+            <a:ext cx="3379273" cy="365760"/>
+          </a:xfrm>
+          <a:prstGeom prst="rightArrow">
+            <a:avLst>
+              <a:gd name="adj1" fmla="val 100000"/>
+              <a:gd name="adj2" fmla="val 50000"/>
+            </a:avLst>
+          </a:prstGeom>
+          <a:solidFill>
+            <a:srgbClr val="CB9F23"/>
+          </a:solidFill>
+          <a:ln>
+            <a:solidFill>
+              <a:srgbClr val="B57307"/>
+            </a:solidFill>
+          </a:ln>
+        </p:spPr>
+        <p:style>
+          <a:lnRef idx="2">
+            <a:schemeClr val="accent3">
+              <a:shade val="50000"/>
+            </a:schemeClr>
+          </a:lnRef>
+          <a:fillRef idx="1">
+            <a:schemeClr val="accent3"/>
+          </a:fillRef>
+          <a:effectRef idx="0">
+            <a:schemeClr val="accent3"/>
+          </a:effectRef>
+          <a:fontRef idx="minor">
+            <a:schemeClr val="lt1"/>
+          </a:fontRef>
+        </p:style>
+        <p:txBody>
+          <a:bodyPr lIns="0" tIns="0" rIns="0" bIns="0" rtlCol="0" anchor="ctr"/>
+          <a:lstStyle/>
+          <a:p>
+            <a:pPr algn="ctr"/>
+            <a:r>
+              <a:rPr lang="en-US" sz="2400" dirty="0">
+                <a:solidFill>
+                  <a:schemeClr val="bg2"/>
+                </a:solidFill>
+              </a:rPr>
+              <a:t>Operational Parameters</a:t>
+            </a:r>
+          </a:p>
+        </p:txBody>
+      </p:sp>
+      <p:sp>
+        <p:nvSpPr>
+          <p:cNvPr id="67" name="Arrow: Right 66">
+            <a:extLst>
+              <a:ext uri="{FF2B5EF4-FFF2-40B4-BE49-F238E27FC236}">
+                <a16:creationId xmlns:a16="http://schemas.microsoft.com/office/drawing/2014/main" id="{0908116C-5185-43F1-AC0F-1E663CCAC212}"/>
+              </a:ext>
+            </a:extLst>
+          </p:cNvPr>
+          <p:cNvSpPr/>
+          <p:nvPr/>
+        </p:nvSpPr>
+        <p:spPr>
+          <a:xfrm>
+            <a:off x="1647546" y="3701286"/>
+            <a:ext cx="3379273" cy="365760"/>
+          </a:xfrm>
+          <a:prstGeom prst="rightArrow">
+            <a:avLst>
+              <a:gd name="adj1" fmla="val 100000"/>
+              <a:gd name="adj2" fmla="val 50000"/>
+            </a:avLst>
+          </a:prstGeom>
+          <a:solidFill>
+            <a:srgbClr val="CB9F23"/>
+          </a:solidFill>
+          <a:ln>
+            <a:solidFill>
+              <a:srgbClr val="B57307"/>
+            </a:solidFill>
+          </a:ln>
+        </p:spPr>
+        <p:style>
+          <a:lnRef idx="2">
+            <a:schemeClr val="accent3">
+              <a:shade val="50000"/>
+            </a:schemeClr>
+          </a:lnRef>
+          <a:fillRef idx="1">
+            <a:schemeClr val="accent3"/>
+          </a:fillRef>
+          <a:effectRef idx="0">
+            <a:schemeClr val="accent3"/>
+          </a:effectRef>
+          <a:fontRef idx="minor">
+            <a:schemeClr val="lt1"/>
+          </a:fontRef>
+        </p:style>
+        <p:txBody>
+          <a:bodyPr lIns="0" tIns="0" rIns="0" bIns="0" rtlCol="0" anchor="ctr"/>
+          <a:lstStyle/>
+          <a:p>
+            <a:pPr algn="ctr"/>
+            <a:r>
+              <a:rPr lang="en-US" sz="2400" dirty="0">
+                <a:solidFill>
+                  <a:schemeClr val="bg2"/>
+                </a:solidFill>
+              </a:rPr>
+              <a:t>Output Product Demand</a:t>
+            </a:r>
+          </a:p>
+        </p:txBody>
+      </p:sp>
+      <p:sp>
+        <p:nvSpPr>
+          <p:cNvPr id="68" name="Arrow: Right 67">
+            <a:extLst>
+              <a:ext uri="{FF2B5EF4-FFF2-40B4-BE49-F238E27FC236}">
+                <a16:creationId xmlns:a16="http://schemas.microsoft.com/office/drawing/2014/main" id="{B906C0F3-688F-4668-AD68-1DDCE5064B74}"/>
+              </a:ext>
+            </a:extLst>
+          </p:cNvPr>
+          <p:cNvSpPr/>
+          <p:nvPr/>
+        </p:nvSpPr>
+        <p:spPr>
+          <a:xfrm>
+            <a:off x="1647546" y="4168140"/>
+            <a:ext cx="3379273" cy="365760"/>
+          </a:xfrm>
+          <a:prstGeom prst="rightArrow">
+            <a:avLst>
+              <a:gd name="adj1" fmla="val 100000"/>
+              <a:gd name="adj2" fmla="val 50000"/>
+            </a:avLst>
+          </a:prstGeom>
+          <a:solidFill>
+            <a:srgbClr val="CB9F23"/>
+          </a:solidFill>
+          <a:ln>
+            <a:solidFill>
+              <a:srgbClr val="B57307"/>
+            </a:solidFill>
+          </a:ln>
+        </p:spPr>
+        <p:style>
+          <a:lnRef idx="2">
+            <a:schemeClr val="accent3">
+              <a:shade val="50000"/>
+            </a:schemeClr>
+          </a:lnRef>
+          <a:fillRef idx="1">
+            <a:schemeClr val="accent3"/>
+          </a:fillRef>
+          <a:effectRef idx="0">
+            <a:schemeClr val="accent3"/>
+          </a:effectRef>
+          <a:fontRef idx="minor">
+            <a:schemeClr val="lt1"/>
+          </a:fontRef>
+        </p:style>
+        <p:txBody>
+          <a:bodyPr lIns="0" tIns="0" rIns="0" bIns="0" rtlCol="0" anchor="ctr"/>
+          <a:lstStyle/>
+          <a:p>
+            <a:pPr algn="ctr"/>
+            <a:r>
+              <a:rPr lang="en-US" sz="2400" dirty="0">
+                <a:solidFill>
+                  <a:schemeClr val="bg2"/>
+                </a:solidFill>
+              </a:rPr>
+              <a:t>Inverter size and settings</a:t>
+            </a:r>
+          </a:p>
+        </p:txBody>
+      </p:sp>
+      <p:sp>
+        <p:nvSpPr>
+          <p:cNvPr id="69" name="Arrow: Right 68">
+            <a:extLst>
+              <a:ext uri="{FF2B5EF4-FFF2-40B4-BE49-F238E27FC236}">
+                <a16:creationId xmlns:a16="http://schemas.microsoft.com/office/drawing/2014/main" id="{31682615-4539-4343-A714-4EE63C5679DF}"/>
+              </a:ext>
+            </a:extLst>
+          </p:cNvPr>
+          <p:cNvSpPr/>
+          <p:nvPr/>
+        </p:nvSpPr>
+        <p:spPr>
+          <a:xfrm>
+            <a:off x="1647546" y="4786872"/>
+            <a:ext cx="3379273" cy="365760"/>
+          </a:xfrm>
+          <a:prstGeom prst="rightArrow">
+            <a:avLst>
+              <a:gd name="adj1" fmla="val 100000"/>
+              <a:gd name="adj2" fmla="val 50000"/>
+            </a:avLst>
+          </a:prstGeom>
+          <a:solidFill>
+            <a:srgbClr val="CB9F23"/>
+          </a:solidFill>
+          <a:ln>
+            <a:solidFill>
+              <a:srgbClr val="B57307"/>
+            </a:solidFill>
+          </a:ln>
+        </p:spPr>
+        <p:style>
+          <a:lnRef idx="2">
+            <a:schemeClr val="accent3">
+              <a:shade val="50000"/>
+            </a:schemeClr>
+          </a:lnRef>
+          <a:fillRef idx="1">
+            <a:schemeClr val="accent3"/>
+          </a:fillRef>
+          <a:effectRef idx="0">
+            <a:schemeClr val="accent3"/>
+          </a:effectRef>
+          <a:fontRef idx="minor">
+            <a:schemeClr val="lt1"/>
+          </a:fontRef>
+        </p:style>
+        <p:txBody>
+          <a:bodyPr lIns="0" tIns="0" rIns="0" bIns="0" rtlCol="0" anchor="ctr"/>
+          <a:lstStyle/>
+          <a:p>
+            <a:pPr algn="ctr"/>
+            <a:r>
+              <a:rPr lang="en-US" sz="2400" dirty="0">
+                <a:solidFill>
+                  <a:schemeClr val="bg2"/>
+                </a:solidFill>
+              </a:rPr>
+              <a:t>Financing Structure</a:t>
+            </a:r>
+          </a:p>
+        </p:txBody>
+      </p:sp>
+      <p:sp>
+        <p:nvSpPr>
+          <p:cNvPr id="70" name="Arrow: Right 69">
+            <a:extLst>
+              <a:ext uri="{FF2B5EF4-FFF2-40B4-BE49-F238E27FC236}">
+                <a16:creationId xmlns:a16="http://schemas.microsoft.com/office/drawing/2014/main" id="{4BB217A6-5AC9-42D4-BFA1-40C8606BB8B4}"/>
+              </a:ext>
+            </a:extLst>
+          </p:cNvPr>
+          <p:cNvSpPr/>
+          <p:nvPr/>
+        </p:nvSpPr>
+        <p:spPr>
+          <a:xfrm>
+            <a:off x="1647546" y="5720580"/>
+            <a:ext cx="3379273" cy="365760"/>
+          </a:xfrm>
+          <a:prstGeom prst="rightArrow">
+            <a:avLst>
+              <a:gd name="adj1" fmla="val 100000"/>
+              <a:gd name="adj2" fmla="val 50000"/>
+            </a:avLst>
+          </a:prstGeom>
+          <a:solidFill>
+            <a:srgbClr val="CB9F23"/>
+          </a:solidFill>
+          <a:ln>
+            <a:solidFill>
+              <a:srgbClr val="B57307"/>
+            </a:solidFill>
+          </a:ln>
+        </p:spPr>
+        <p:style>
+          <a:lnRef idx="2">
+            <a:schemeClr val="accent3">
+              <a:shade val="50000"/>
+            </a:schemeClr>
+          </a:lnRef>
+          <a:fillRef idx="1">
+            <a:schemeClr val="accent3"/>
+          </a:fillRef>
+          <a:effectRef idx="0">
+            <a:schemeClr val="accent3"/>
+          </a:effectRef>
+          <a:fontRef idx="minor">
+            <a:schemeClr val="lt1"/>
+          </a:fontRef>
+        </p:style>
+        <p:txBody>
+          <a:bodyPr lIns="0" tIns="0" rIns="0" bIns="0" rtlCol="0" anchor="ctr"/>
+          <a:lstStyle/>
+          <a:p>
+            <a:pPr algn="ctr"/>
+            <a:r>
+              <a:rPr lang="en-US" sz="2400" dirty="0">
+                <a:solidFill>
+                  <a:schemeClr val="bg2"/>
+                </a:solidFill>
+              </a:rPr>
+              <a:t>Equipment Cost</a:t>
+            </a:r>
+          </a:p>
+        </p:txBody>
+      </p:sp>
+      <p:sp>
+        <p:nvSpPr>
+          <p:cNvPr id="71" name="Arrow: Right 70">
+            <a:extLst>
+              <a:ext uri="{FF2B5EF4-FFF2-40B4-BE49-F238E27FC236}">
+                <a16:creationId xmlns:a16="http://schemas.microsoft.com/office/drawing/2014/main" id="{3886655A-A9B1-44D3-9DAF-4DC83C1581C0}"/>
+              </a:ext>
+            </a:extLst>
+          </p:cNvPr>
+          <p:cNvSpPr/>
+          <p:nvPr/>
+        </p:nvSpPr>
+        <p:spPr>
+          <a:xfrm>
+            <a:off x="1647546" y="6187440"/>
+            <a:ext cx="3379273" cy="365760"/>
+          </a:xfrm>
+          <a:prstGeom prst="rightArrow">
+            <a:avLst>
+              <a:gd name="adj1" fmla="val 100000"/>
+              <a:gd name="adj2" fmla="val 50000"/>
+            </a:avLst>
+          </a:prstGeom>
+          <a:solidFill>
+            <a:srgbClr val="CB9F23"/>
+          </a:solidFill>
+          <a:ln>
+            <a:solidFill>
+              <a:srgbClr val="B57307"/>
+            </a:solidFill>
+          </a:ln>
+        </p:spPr>
+        <p:style>
+          <a:lnRef idx="2">
+            <a:schemeClr val="accent3">
+              <a:shade val="50000"/>
+            </a:schemeClr>
+          </a:lnRef>
+          <a:fillRef idx="1">
+            <a:schemeClr val="accent3"/>
+          </a:fillRef>
+          <a:effectRef idx="0">
+            <a:schemeClr val="accent3"/>
+          </a:effectRef>
+          <a:fontRef idx="minor">
+            <a:schemeClr val="lt1"/>
+          </a:fontRef>
+        </p:style>
+        <p:txBody>
+          <a:bodyPr lIns="0" tIns="0" rIns="0" bIns="0" rtlCol="0" anchor="ctr"/>
+          <a:lstStyle/>
+          <a:p>
+            <a:pPr algn="ctr"/>
+            <a:r>
+              <a:rPr lang="en-US" sz="2400" dirty="0">
+                <a:solidFill>
+                  <a:schemeClr val="bg2"/>
+                </a:solidFill>
+              </a:rPr>
+              <a:t>Credits and Incentives</a:t>
+            </a:r>
+          </a:p>
+        </p:txBody>
+      </p:sp>
+      <p:sp>
+        <p:nvSpPr>
+          <p:cNvPr id="73" name="Arrow: Right 72">
+            <a:extLst>
+              <a:ext uri="{FF2B5EF4-FFF2-40B4-BE49-F238E27FC236}">
+                <a16:creationId xmlns:a16="http://schemas.microsoft.com/office/drawing/2014/main" id="{E5F2C1C4-69C9-4219-A7B9-D3EAE6E53052}"/>
+              </a:ext>
+            </a:extLst>
+          </p:cNvPr>
+          <p:cNvSpPr/>
+          <p:nvPr/>
+        </p:nvSpPr>
+        <p:spPr>
+          <a:xfrm>
+            <a:off x="1647546" y="1704340"/>
+            <a:ext cx="3379273" cy="365760"/>
+          </a:xfrm>
+          <a:prstGeom prst="rightArrow">
+            <a:avLst>
+              <a:gd name="adj1" fmla="val 100000"/>
+              <a:gd name="adj2" fmla="val 50000"/>
+            </a:avLst>
+          </a:prstGeom>
+          <a:solidFill>
+            <a:srgbClr val="CB9F23"/>
+          </a:solidFill>
+          <a:ln>
+            <a:solidFill>
+              <a:srgbClr val="B57307"/>
+            </a:solidFill>
+          </a:ln>
+        </p:spPr>
+        <p:style>
+          <a:lnRef idx="2">
+            <a:schemeClr val="accent3">
+              <a:shade val="50000"/>
+            </a:schemeClr>
+          </a:lnRef>
+          <a:fillRef idx="1">
+            <a:schemeClr val="accent3"/>
+          </a:fillRef>
+          <a:effectRef idx="0">
+            <a:schemeClr val="accent3"/>
+          </a:effectRef>
+          <a:fontRef idx="minor">
+            <a:schemeClr val="lt1"/>
+          </a:fontRef>
+        </p:style>
+        <p:txBody>
+          <a:bodyPr lIns="0" tIns="0" rIns="0" bIns="0" rtlCol="0" anchor="ctr"/>
+          <a:lstStyle/>
+          <a:p>
+            <a:pPr algn="ctr"/>
+            <a:r>
+              <a:rPr lang="en-US" sz="2400" dirty="0">
+                <a:solidFill>
+                  <a:schemeClr val="bg2"/>
+                </a:solidFill>
+              </a:rPr>
+              <a:t>Capacity Value</a:t>
+            </a:r>
+          </a:p>
+        </p:txBody>
+      </p:sp>
+      <p:sp>
+        <p:nvSpPr>
+          <p:cNvPr id="74" name="Arrow: Right 73">
+            <a:extLst>
+              <a:ext uri="{FF2B5EF4-FFF2-40B4-BE49-F238E27FC236}">
+                <a16:creationId xmlns:a16="http://schemas.microsoft.com/office/drawing/2014/main" id="{FA5D9483-CD41-45B9-A544-73187636911D}"/>
+              </a:ext>
+            </a:extLst>
+          </p:cNvPr>
+          <p:cNvSpPr/>
+          <p:nvPr/>
+        </p:nvSpPr>
+        <p:spPr>
+          <a:xfrm>
+            <a:off x="1647546" y="770632"/>
+            <a:ext cx="3379273" cy="365760"/>
+          </a:xfrm>
+          <a:prstGeom prst="rightArrow">
+            <a:avLst>
+              <a:gd name="adj1" fmla="val 100000"/>
+              <a:gd name="adj2" fmla="val 50000"/>
+            </a:avLst>
+          </a:prstGeom>
+          <a:solidFill>
+            <a:srgbClr val="CB9F23"/>
+          </a:solidFill>
+          <a:ln>
+            <a:solidFill>
+              <a:srgbClr val="B57307"/>
+            </a:solidFill>
+          </a:ln>
+        </p:spPr>
+        <p:style>
+          <a:lnRef idx="2">
+            <a:schemeClr val="accent3">
+              <a:shade val="50000"/>
+            </a:schemeClr>
+          </a:lnRef>
+          <a:fillRef idx="1">
+            <a:schemeClr val="accent3"/>
+          </a:fillRef>
+          <a:effectRef idx="0">
+            <a:schemeClr val="accent3"/>
+          </a:effectRef>
+          <a:fontRef idx="minor">
+            <a:schemeClr val="lt1"/>
+          </a:fontRef>
+        </p:style>
+        <p:txBody>
+          <a:bodyPr lIns="0" tIns="0" rIns="0" bIns="0" rtlCol="0" anchor="ctr"/>
+          <a:lstStyle/>
+          <a:p>
+            <a:pPr algn="ctr"/>
+            <a:r>
+              <a:rPr lang="en-US" sz="2400" dirty="0">
+                <a:solidFill>
+                  <a:schemeClr val="bg2"/>
+                </a:solidFill>
+              </a:rPr>
+              <a:t>Energy Price</a:t>
+            </a:r>
+          </a:p>
+        </p:txBody>
+      </p:sp>
+      <p:sp>
+        <p:nvSpPr>
+          <p:cNvPr id="75" name="Arrow: Right 74">
+            <a:extLst>
+              <a:ext uri="{FF2B5EF4-FFF2-40B4-BE49-F238E27FC236}">
+                <a16:creationId xmlns:a16="http://schemas.microsoft.com/office/drawing/2014/main" id="{B80A465F-342E-4CE0-B47C-6AA45A0B7659}"/>
+              </a:ext>
+            </a:extLst>
+          </p:cNvPr>
+          <p:cNvSpPr/>
+          <p:nvPr/>
+        </p:nvSpPr>
+        <p:spPr>
+          <a:xfrm>
+            <a:off x="1647546" y="-339168"/>
+            <a:ext cx="3379273" cy="365760"/>
+          </a:xfrm>
+          <a:prstGeom prst="rightArrow">
+            <a:avLst>
+              <a:gd name="adj1" fmla="val 100000"/>
+              <a:gd name="adj2" fmla="val 50000"/>
+            </a:avLst>
+          </a:prstGeom>
+          <a:solidFill>
+            <a:srgbClr val="CB9F23"/>
+          </a:solidFill>
+          <a:ln>
+            <a:solidFill>
+              <a:srgbClr val="B57307"/>
+            </a:solidFill>
+          </a:ln>
+        </p:spPr>
+        <p:style>
+          <a:lnRef idx="2">
+            <a:schemeClr val="accent3">
+              <a:shade val="50000"/>
+            </a:schemeClr>
+          </a:lnRef>
+          <a:fillRef idx="1">
+            <a:schemeClr val="accent3"/>
+          </a:fillRef>
+          <a:effectRef idx="0">
+            <a:schemeClr val="accent3"/>
+          </a:effectRef>
+          <a:fontRef idx="minor">
+            <a:schemeClr val="lt1"/>
+          </a:fontRef>
+        </p:style>
+        <p:txBody>
+          <a:bodyPr lIns="0" tIns="0" rIns="0" bIns="0" rtlCol="0" anchor="ctr"/>
+          <a:lstStyle/>
+          <a:p>
+            <a:pPr algn="ctr"/>
+            <a:r>
+              <a:rPr lang="en-US" sz="2400" dirty="0">
+                <a:solidFill>
+                  <a:schemeClr val="bg2"/>
+                </a:solidFill>
+              </a:rPr>
+              <a:t>Timed Demand Charge</a:t>
+            </a:r>
+          </a:p>
+        </p:txBody>
+      </p:sp>
+      <p:sp>
+        <p:nvSpPr>
+          <p:cNvPr id="76" name="Arrow: Right 75">
+            <a:extLst>
+              <a:ext uri="{FF2B5EF4-FFF2-40B4-BE49-F238E27FC236}">
+                <a16:creationId xmlns:a16="http://schemas.microsoft.com/office/drawing/2014/main" id="{7AE78F0F-EA93-4B38-B21F-D5EB0BC0B51E}"/>
+              </a:ext>
+            </a:extLst>
+          </p:cNvPr>
+          <p:cNvSpPr/>
+          <p:nvPr/>
+        </p:nvSpPr>
+        <p:spPr>
+          <a:xfrm>
+            <a:off x="1647546" y="127686"/>
+            <a:ext cx="3379273" cy="365760"/>
+          </a:xfrm>
+          <a:prstGeom prst="rightArrow">
+            <a:avLst>
+              <a:gd name="adj1" fmla="val 100000"/>
+              <a:gd name="adj2" fmla="val 50000"/>
+            </a:avLst>
+          </a:prstGeom>
+          <a:solidFill>
+            <a:srgbClr val="CB9F23"/>
+          </a:solidFill>
+          <a:ln>
+            <a:solidFill>
+              <a:srgbClr val="B57307"/>
+            </a:solidFill>
+          </a:ln>
+        </p:spPr>
+        <p:style>
+          <a:lnRef idx="2">
+            <a:schemeClr val="accent3">
+              <a:shade val="50000"/>
+            </a:schemeClr>
+          </a:lnRef>
+          <a:fillRef idx="1">
+            <a:schemeClr val="accent3"/>
+          </a:fillRef>
+          <a:effectRef idx="0">
+            <a:schemeClr val="accent3"/>
+          </a:effectRef>
+          <a:fontRef idx="minor">
+            <a:schemeClr val="lt1"/>
+          </a:fontRef>
+        </p:style>
+        <p:txBody>
+          <a:bodyPr lIns="0" tIns="0" rIns="0" bIns="0" rtlCol="0" anchor="ctr"/>
+          <a:lstStyle/>
+          <a:p>
+            <a:pPr algn="ctr"/>
+            <a:r>
+              <a:rPr lang="en-US" sz="2400" dirty="0">
+                <a:solidFill>
+                  <a:schemeClr val="bg2"/>
+                </a:solidFill>
+              </a:rPr>
+              <a:t>Meter Cost</a:t>
+            </a:r>
+          </a:p>
+        </p:txBody>
+      </p:sp>
+      <p:sp>
+        <p:nvSpPr>
+          <p:cNvPr id="77" name="Arrow: Right 76">
+            <a:extLst>
+              <a:ext uri="{FF2B5EF4-FFF2-40B4-BE49-F238E27FC236}">
+                <a16:creationId xmlns:a16="http://schemas.microsoft.com/office/drawing/2014/main" id="{FA3F6FB4-BEC6-46AE-9D96-D00E7697116D}"/>
+              </a:ext>
+            </a:extLst>
+          </p:cNvPr>
+          <p:cNvSpPr/>
+          <p:nvPr/>
+        </p:nvSpPr>
+        <p:spPr>
+          <a:xfrm>
+            <a:off x="7199655" y="1842633"/>
+            <a:ext cx="3791917" cy="731520"/>
+          </a:xfrm>
+          <a:prstGeom prst="rightArrow">
+            <a:avLst>
+              <a:gd name="adj1" fmla="val 100000"/>
+              <a:gd name="adj2" fmla="val 50000"/>
+            </a:avLst>
+          </a:prstGeom>
+          <a:solidFill>
+            <a:srgbClr val="CB9F23"/>
+          </a:solidFill>
+          <a:ln>
+            <a:solidFill>
+              <a:srgbClr val="B57307"/>
+            </a:solidFill>
+          </a:ln>
+        </p:spPr>
+        <p:style>
+          <a:lnRef idx="2">
+            <a:schemeClr val="accent3">
+              <a:shade val="50000"/>
+            </a:schemeClr>
+          </a:lnRef>
+          <a:fillRef idx="1">
+            <a:schemeClr val="accent3"/>
+          </a:fillRef>
+          <a:effectRef idx="0">
+            <a:schemeClr val="accent3"/>
+          </a:effectRef>
+          <a:fontRef idx="minor">
+            <a:schemeClr val="lt1"/>
+          </a:fontRef>
+        </p:style>
+        <p:txBody>
+          <a:bodyPr lIns="0" tIns="0" rIns="0" bIns="0" rtlCol="0" anchor="ctr"/>
+          <a:lstStyle/>
+          <a:p>
+            <a:pPr algn="ctr"/>
+            <a:r>
+              <a:rPr lang="en-US" sz="2400" dirty="0">
+                <a:solidFill>
+                  <a:schemeClr val="bg2"/>
+                </a:solidFill>
+              </a:rPr>
+              <a:t>Operating Profiles</a:t>
+            </a:r>
+          </a:p>
+        </p:txBody>
+      </p:sp>
+      <p:sp>
+        <p:nvSpPr>
+          <p:cNvPr id="78" name="Arrow: Right 77">
+            <a:extLst>
+              <a:ext uri="{FF2B5EF4-FFF2-40B4-BE49-F238E27FC236}">
+                <a16:creationId xmlns:a16="http://schemas.microsoft.com/office/drawing/2014/main" id="{2D273DFF-73CE-4938-9512-844160EB7B62}"/>
+              </a:ext>
+            </a:extLst>
+          </p:cNvPr>
+          <p:cNvSpPr/>
+          <p:nvPr/>
+        </p:nvSpPr>
+        <p:spPr>
+          <a:xfrm>
+            <a:off x="7199655" y="2722880"/>
+            <a:ext cx="3791917" cy="731520"/>
+          </a:xfrm>
+          <a:prstGeom prst="rightArrow">
+            <a:avLst>
+              <a:gd name="adj1" fmla="val 100000"/>
+              <a:gd name="adj2" fmla="val 50000"/>
+            </a:avLst>
+          </a:prstGeom>
+          <a:solidFill>
+            <a:srgbClr val="CB9F23"/>
+          </a:solidFill>
+          <a:ln>
+            <a:solidFill>
+              <a:srgbClr val="B57307"/>
+            </a:solidFill>
+          </a:ln>
+        </p:spPr>
+        <p:style>
+          <a:lnRef idx="2">
+            <a:schemeClr val="accent3">
+              <a:shade val="50000"/>
+            </a:schemeClr>
+          </a:lnRef>
+          <a:fillRef idx="1">
+            <a:schemeClr val="accent3"/>
+          </a:fillRef>
+          <a:effectRef idx="0">
+            <a:schemeClr val="accent3"/>
+          </a:effectRef>
+          <a:fontRef idx="minor">
+            <a:schemeClr val="lt1"/>
+          </a:fontRef>
+        </p:style>
+        <p:txBody>
+          <a:bodyPr lIns="0" tIns="0" rIns="0" bIns="0" rtlCol="0" anchor="ctr"/>
+          <a:lstStyle/>
+          <a:p>
+            <a:pPr algn="ctr"/>
+            <a:r>
+              <a:rPr lang="en-US" sz="2400" dirty="0">
+                <a:solidFill>
+                  <a:schemeClr val="bg2"/>
+                </a:solidFill>
+              </a:rPr>
+              <a:t>Project Economics</a:t>
+            </a:r>
+          </a:p>
+          <a:p>
+            <a:pPr algn="ctr"/>
+            <a:r>
+              <a:rPr lang="en-US" sz="2400" dirty="0">
+                <a:solidFill>
+                  <a:schemeClr val="bg2"/>
+                </a:solidFill>
+              </a:rPr>
+              <a:t>(breakeven, NPV, etc.)</a:t>
+            </a:r>
+          </a:p>
+        </p:txBody>
+      </p:sp>
+      <p:sp>
+        <p:nvSpPr>
+          <p:cNvPr id="43" name="Opt Model BOX"/>
+          <p:cNvSpPr/>
+          <p:nvPr/>
+        </p:nvSpPr>
+        <p:spPr>
+          <a:xfrm>
+            <a:off x="5029200" y="-1341358"/>
+            <a:ext cx="2169531" cy="7950548"/>
+          </a:xfrm>
+          <a:prstGeom prst="roundRect">
+            <a:avLst>
+              <a:gd name="adj" fmla="val 9258"/>
+            </a:avLst>
+          </a:prstGeom>
+        </p:spPr>
+        <p:style>
+          <a:lnRef idx="2">
+            <a:schemeClr val="accent1">
+              <a:shade val="50000"/>
+            </a:schemeClr>
+          </a:lnRef>
+          <a:fillRef idx="1">
+            <a:schemeClr val="accent1"/>
+          </a:fillRef>
+          <a:effectRef idx="0">
+            <a:schemeClr val="accent1"/>
+          </a:effectRef>
+          <a:fontRef idx="minor">
+            <a:schemeClr val="lt1"/>
+          </a:fontRef>
+        </p:style>
+        <p:txBody>
+          <a:bodyPr rtlCol="0" anchor="ctr"/>
+          <a:lstStyle/>
+          <a:p>
+            <a:pPr algn="ctr"/>
+            <a:r>
+              <a:rPr lang="en-US" sz="2800" dirty="0"/>
+              <a:t>Revenue Operation and Device Optimization Model</a:t>
+            </a:r>
+          </a:p>
+          <a:p>
+            <a:pPr algn="ctr"/>
+            <a:r>
+              <a:rPr lang="en-US" sz="2800" dirty="0"/>
+              <a:t>(</a:t>
+            </a:r>
+            <a:r>
+              <a:rPr lang="en-US" sz="2800" dirty="0" err="1"/>
+              <a:t>RODeO</a:t>
+            </a:r>
+            <a:r>
+              <a:rPr lang="en-US" sz="2800" dirty="0"/>
+              <a:t>)</a:t>
+            </a:r>
+          </a:p>
+        </p:txBody>
+      </p:sp>
+      <p:sp>
+        <p:nvSpPr>
+          <p:cNvPr id="3" name="TextBox 2">
+            <a:extLst>
+              <a:ext uri="{FF2B5EF4-FFF2-40B4-BE49-F238E27FC236}">
+                <a16:creationId xmlns:a16="http://schemas.microsoft.com/office/drawing/2014/main" id="{D5AD1986-9840-44B7-9EFA-005B772423A7}"/>
+              </a:ext>
+            </a:extLst>
+          </p:cNvPr>
+          <p:cNvSpPr txBox="1"/>
+          <p:nvPr/>
+        </p:nvSpPr>
+        <p:spPr>
+          <a:xfrm>
+            <a:off x="-3124200" y="624666"/>
+            <a:ext cx="2513188" cy="6186309"/>
+          </a:xfrm>
+          <a:prstGeom prst="rect">
+            <a:avLst/>
+          </a:prstGeom>
+          <a:noFill/>
+        </p:spPr>
+        <p:txBody>
+          <a:bodyPr wrap="none" rtlCol="0">
+            <a:spAutoFit/>
+          </a:bodyPr>
+          <a:lstStyle/>
+          <a:p>
+            <a:r>
+              <a:rPr lang="en-US" dirty="0">
+                <a:solidFill>
+                  <a:schemeClr val="bg2"/>
+                </a:solidFill>
+              </a:rPr>
+              <a:t>Energy Price</a:t>
+            </a:r>
+          </a:p>
+          <a:p>
+            <a:r>
+              <a:rPr lang="en-US" dirty="0">
+                <a:solidFill>
+                  <a:schemeClr val="bg2"/>
+                </a:solidFill>
+              </a:rPr>
+              <a:t>Fixed demand charge</a:t>
+            </a:r>
+          </a:p>
+          <a:p>
+            <a:r>
+              <a:rPr lang="en-US" dirty="0">
+                <a:solidFill>
+                  <a:schemeClr val="bg2"/>
+                </a:solidFill>
+              </a:rPr>
+              <a:t>Timed demand charge</a:t>
+            </a:r>
+          </a:p>
+          <a:p>
+            <a:r>
+              <a:rPr lang="en-US" dirty="0">
+                <a:solidFill>
+                  <a:schemeClr val="bg2"/>
+                </a:solidFill>
+              </a:rPr>
+              <a:t>Meter Cost</a:t>
+            </a:r>
+          </a:p>
+          <a:p>
+            <a:r>
+              <a:rPr lang="en-US" dirty="0">
+                <a:solidFill>
+                  <a:schemeClr val="bg2"/>
+                </a:solidFill>
+              </a:rPr>
+              <a:t>Net energy metering</a:t>
+            </a:r>
+          </a:p>
+          <a:p>
+            <a:endParaRPr lang="en-US" dirty="0">
+              <a:solidFill>
+                <a:schemeClr val="bg2"/>
+              </a:solidFill>
+            </a:endParaRPr>
+          </a:p>
+          <a:p>
+            <a:r>
+              <a:rPr lang="en-US" dirty="0">
+                <a:solidFill>
+                  <a:schemeClr val="bg2"/>
+                </a:solidFill>
+              </a:rPr>
+              <a:t>Energy Price</a:t>
+            </a:r>
+          </a:p>
+          <a:p>
+            <a:r>
+              <a:rPr lang="en-US" dirty="0">
+                <a:solidFill>
+                  <a:schemeClr val="bg2"/>
+                </a:solidFill>
+              </a:rPr>
+              <a:t>Ancillary Service Prices</a:t>
+            </a:r>
+          </a:p>
+          <a:p>
+            <a:r>
+              <a:rPr lang="en-US" dirty="0">
+                <a:solidFill>
+                  <a:schemeClr val="bg2"/>
+                </a:solidFill>
+              </a:rPr>
+              <a:t>Capacity Value</a:t>
+            </a:r>
+          </a:p>
+          <a:p>
+            <a:endParaRPr lang="en-US" dirty="0">
+              <a:solidFill>
+                <a:schemeClr val="bg2"/>
+              </a:solidFill>
+            </a:endParaRPr>
+          </a:p>
+          <a:p>
+            <a:r>
+              <a:rPr lang="en-US" dirty="0">
+                <a:solidFill>
+                  <a:schemeClr val="bg2"/>
+                </a:solidFill>
+              </a:rPr>
+              <a:t>Operational Parameters</a:t>
+            </a:r>
+          </a:p>
+          <a:p>
+            <a:r>
+              <a:rPr lang="en-US" dirty="0">
+                <a:solidFill>
+                  <a:schemeClr val="bg2"/>
+                </a:solidFill>
+              </a:rPr>
+              <a:t>Renewable Generation</a:t>
+            </a:r>
+          </a:p>
+          <a:p>
+            <a:r>
+              <a:rPr lang="en-US" dirty="0">
+                <a:solidFill>
+                  <a:schemeClr val="bg2"/>
+                </a:solidFill>
+              </a:rPr>
+              <a:t>Additional Load</a:t>
+            </a:r>
+          </a:p>
+          <a:p>
+            <a:r>
+              <a:rPr lang="en-US" dirty="0">
+                <a:solidFill>
+                  <a:schemeClr val="bg2"/>
+                </a:solidFill>
+              </a:rPr>
+              <a:t>Hydrogen Demand</a:t>
+            </a:r>
+          </a:p>
+          <a:p>
+            <a:r>
+              <a:rPr lang="en-US" dirty="0">
+                <a:solidFill>
+                  <a:schemeClr val="bg2"/>
+                </a:solidFill>
+              </a:rPr>
+              <a:t>Inverter size and settings</a:t>
+            </a:r>
+          </a:p>
+          <a:p>
+            <a:endParaRPr lang="en-US" dirty="0">
+              <a:solidFill>
+                <a:schemeClr val="bg2"/>
+              </a:solidFill>
+            </a:endParaRPr>
+          </a:p>
+          <a:p>
+            <a:r>
+              <a:rPr lang="en-US" dirty="0">
+                <a:solidFill>
+                  <a:schemeClr val="bg2"/>
+                </a:solidFill>
+              </a:rPr>
+              <a:t>Financing Structure</a:t>
+            </a:r>
+          </a:p>
+          <a:p>
+            <a:r>
+              <a:rPr lang="en-US" dirty="0">
+                <a:solidFill>
+                  <a:schemeClr val="bg2"/>
+                </a:solidFill>
+              </a:rPr>
+              <a:t>Financing Parameters</a:t>
+            </a:r>
+          </a:p>
+          <a:p>
+            <a:r>
+              <a:rPr lang="en-US" dirty="0">
+                <a:solidFill>
+                  <a:schemeClr val="bg2"/>
+                </a:solidFill>
+              </a:rPr>
+              <a:t>Equipment Cost</a:t>
+            </a:r>
+          </a:p>
+          <a:p>
+            <a:r>
+              <a:rPr lang="en-US" dirty="0">
+                <a:solidFill>
+                  <a:schemeClr val="bg2"/>
+                </a:solidFill>
+              </a:rPr>
+              <a:t>Credits and Incentives</a:t>
+            </a:r>
+          </a:p>
+          <a:p>
+            <a:r>
+              <a:rPr lang="en-US" dirty="0">
+                <a:solidFill>
+                  <a:schemeClr val="bg2"/>
+                </a:solidFill>
+              </a:rPr>
+              <a:t>	</a:t>
+            </a:r>
+          </a:p>
+          <a:p>
+            <a:r>
+              <a:rPr lang="en-US" dirty="0">
+                <a:solidFill>
+                  <a:schemeClr val="bg2"/>
+                </a:solidFill>
+              </a:rPr>
+              <a:t> </a:t>
+            </a:r>
+          </a:p>
+        </p:txBody>
+      </p:sp>
+      <p:sp>
+        <p:nvSpPr>
+          <p:cNvPr id="80" name="Arrow: Right 79">
+            <a:extLst>
+              <a:ext uri="{FF2B5EF4-FFF2-40B4-BE49-F238E27FC236}">
+                <a16:creationId xmlns:a16="http://schemas.microsoft.com/office/drawing/2014/main" id="{0BA8B2D9-D796-4DA7-A485-EFFA4FC93D27}"/>
+              </a:ext>
+            </a:extLst>
+          </p:cNvPr>
+          <p:cNvSpPr/>
+          <p:nvPr/>
+        </p:nvSpPr>
+        <p:spPr>
+          <a:xfrm>
+            <a:off x="1647546" y="3234432"/>
+            <a:ext cx="3379273" cy="365760"/>
+          </a:xfrm>
+          <a:prstGeom prst="rightArrow">
+            <a:avLst>
+              <a:gd name="adj1" fmla="val 100000"/>
+              <a:gd name="adj2" fmla="val 50000"/>
+            </a:avLst>
+          </a:prstGeom>
+          <a:solidFill>
+            <a:srgbClr val="CB9F23"/>
+          </a:solidFill>
+          <a:ln>
+            <a:solidFill>
+              <a:srgbClr val="B57307"/>
+            </a:solidFill>
+          </a:ln>
+        </p:spPr>
+        <p:style>
+          <a:lnRef idx="2">
+            <a:schemeClr val="accent3">
+              <a:shade val="50000"/>
+            </a:schemeClr>
+          </a:lnRef>
+          <a:fillRef idx="1">
+            <a:schemeClr val="accent3"/>
+          </a:fillRef>
+          <a:effectRef idx="0">
+            <a:schemeClr val="accent3"/>
+          </a:effectRef>
+          <a:fontRef idx="minor">
+            <a:schemeClr val="lt1"/>
+          </a:fontRef>
+        </p:style>
+        <p:txBody>
+          <a:bodyPr lIns="0" tIns="0" rIns="0" bIns="0" rtlCol="0" anchor="ctr"/>
+          <a:lstStyle/>
+          <a:p>
+            <a:pPr algn="ctr"/>
+            <a:r>
+              <a:rPr lang="en-US" sz="2400" dirty="0">
+                <a:solidFill>
+                  <a:schemeClr val="bg2"/>
+                </a:solidFill>
+              </a:rPr>
+              <a:t>Additional Load</a:t>
+            </a:r>
+          </a:p>
+        </p:txBody>
+      </p:sp>
+      <p:sp>
+        <p:nvSpPr>
+          <p:cNvPr id="81" name="Arrow: Right 80">
+            <a:extLst>
+              <a:ext uri="{FF2B5EF4-FFF2-40B4-BE49-F238E27FC236}">
+                <a16:creationId xmlns:a16="http://schemas.microsoft.com/office/drawing/2014/main" id="{B07E4C45-3582-4F79-AB54-ED3822E9E6E6}"/>
+              </a:ext>
+            </a:extLst>
+          </p:cNvPr>
+          <p:cNvSpPr/>
+          <p:nvPr/>
+        </p:nvSpPr>
+        <p:spPr>
+          <a:xfrm>
+            <a:off x="1647546" y="2767578"/>
+            <a:ext cx="3379273" cy="365760"/>
+          </a:xfrm>
+          <a:prstGeom prst="rightArrow">
+            <a:avLst>
+              <a:gd name="adj1" fmla="val 100000"/>
+              <a:gd name="adj2" fmla="val 50000"/>
+            </a:avLst>
+          </a:prstGeom>
+          <a:solidFill>
+            <a:srgbClr val="CB9F23"/>
+          </a:solidFill>
+          <a:ln>
+            <a:solidFill>
+              <a:srgbClr val="B57307"/>
+            </a:solidFill>
+          </a:ln>
+        </p:spPr>
+        <p:style>
+          <a:lnRef idx="2">
+            <a:schemeClr val="accent3">
+              <a:shade val="50000"/>
+            </a:schemeClr>
+          </a:lnRef>
+          <a:fillRef idx="1">
+            <a:schemeClr val="accent3"/>
+          </a:fillRef>
+          <a:effectRef idx="0">
+            <a:schemeClr val="accent3"/>
+          </a:effectRef>
+          <a:fontRef idx="minor">
+            <a:schemeClr val="lt1"/>
+          </a:fontRef>
+        </p:style>
+        <p:txBody>
+          <a:bodyPr lIns="0" tIns="0" rIns="0" bIns="0" rtlCol="0" anchor="ctr"/>
+          <a:lstStyle/>
+          <a:p>
+            <a:pPr algn="ctr"/>
+            <a:r>
+              <a:rPr lang="en-US" sz="2400" dirty="0">
+                <a:solidFill>
+                  <a:schemeClr val="bg2"/>
+                </a:solidFill>
+              </a:rPr>
+              <a:t>Renewable Generation</a:t>
+            </a:r>
+          </a:p>
+        </p:txBody>
+      </p:sp>
+      <p:sp>
+        <p:nvSpPr>
+          <p:cNvPr id="82" name="Arrow: Right 81">
+            <a:extLst>
+              <a:ext uri="{FF2B5EF4-FFF2-40B4-BE49-F238E27FC236}">
+                <a16:creationId xmlns:a16="http://schemas.microsoft.com/office/drawing/2014/main" id="{2ED1550E-8BB8-4F6A-9AE5-6EE2A54FAA4B}"/>
+              </a:ext>
+            </a:extLst>
+          </p:cNvPr>
+          <p:cNvSpPr/>
+          <p:nvPr/>
+        </p:nvSpPr>
+        <p:spPr>
+          <a:xfrm>
+            <a:off x="1647546" y="5253726"/>
+            <a:ext cx="3379273" cy="365760"/>
+          </a:xfrm>
+          <a:prstGeom prst="rightArrow">
+            <a:avLst>
+              <a:gd name="adj1" fmla="val 100000"/>
+              <a:gd name="adj2" fmla="val 50000"/>
+            </a:avLst>
+          </a:prstGeom>
+          <a:solidFill>
+            <a:srgbClr val="CB9F23"/>
+          </a:solidFill>
+          <a:ln>
+            <a:solidFill>
+              <a:srgbClr val="B57307"/>
+            </a:solidFill>
+          </a:ln>
+        </p:spPr>
+        <p:style>
+          <a:lnRef idx="2">
+            <a:schemeClr val="accent3">
+              <a:shade val="50000"/>
+            </a:schemeClr>
+          </a:lnRef>
+          <a:fillRef idx="1">
+            <a:schemeClr val="accent3"/>
+          </a:fillRef>
+          <a:effectRef idx="0">
+            <a:schemeClr val="accent3"/>
+          </a:effectRef>
+          <a:fontRef idx="minor">
+            <a:schemeClr val="lt1"/>
+          </a:fontRef>
+        </p:style>
+        <p:txBody>
+          <a:bodyPr lIns="0" tIns="0" rIns="0" bIns="0" rtlCol="0" anchor="ctr"/>
+          <a:lstStyle/>
+          <a:p>
+            <a:pPr algn="ctr"/>
+            <a:r>
+              <a:rPr lang="en-US" sz="2400" dirty="0">
+                <a:solidFill>
+                  <a:schemeClr val="bg2"/>
+                </a:solidFill>
+              </a:rPr>
+              <a:t>Financing Parameters</a:t>
+            </a:r>
+          </a:p>
+        </p:txBody>
+      </p:sp>
+      <p:sp>
+        <p:nvSpPr>
+          <p:cNvPr id="30" name="Utility BOX"/>
+          <p:cNvSpPr/>
+          <p:nvPr/>
+        </p:nvSpPr>
+        <p:spPr>
+          <a:xfrm>
+            <a:off x="-56115" y="-1341359"/>
+            <a:ext cx="1737360" cy="1896595"/>
+          </a:xfrm>
+          <a:prstGeom prst="roundRect">
+            <a:avLst>
+              <a:gd name="adj" fmla="val 9258"/>
+            </a:avLst>
+          </a:prstGeom>
+        </p:spPr>
+        <p:style>
+          <a:lnRef idx="2">
+            <a:schemeClr val="accent1">
+              <a:shade val="50000"/>
+            </a:schemeClr>
+          </a:lnRef>
+          <a:fillRef idx="1">
+            <a:schemeClr val="accent1"/>
+          </a:fillRef>
+          <a:effectRef idx="0">
+            <a:schemeClr val="accent1"/>
+          </a:effectRef>
+          <a:fontRef idx="minor">
+            <a:schemeClr val="lt1"/>
+          </a:fontRef>
+        </p:style>
+        <p:txBody>
+          <a:bodyPr rtlCol="0" anchor="ctr"/>
+          <a:lstStyle/>
+          <a:p>
+            <a:pPr algn="ctr"/>
+            <a:r>
+              <a:rPr lang="en-US" sz="2800" dirty="0"/>
+              <a:t>Utility Service</a:t>
+            </a:r>
+          </a:p>
+        </p:txBody>
+      </p:sp>
+      <p:sp>
+        <p:nvSpPr>
+          <p:cNvPr id="31" name="ISO BOX"/>
+          <p:cNvSpPr/>
+          <p:nvPr/>
+        </p:nvSpPr>
+        <p:spPr>
+          <a:xfrm>
+            <a:off x="-56115" y="709531"/>
+            <a:ext cx="1737360" cy="1396863"/>
+          </a:xfrm>
+          <a:prstGeom prst="roundRect">
+            <a:avLst>
+              <a:gd name="adj" fmla="val 9258"/>
+            </a:avLst>
+          </a:prstGeom>
+        </p:spPr>
+        <p:style>
+          <a:lnRef idx="2">
+            <a:schemeClr val="accent1">
+              <a:shade val="50000"/>
+            </a:schemeClr>
+          </a:lnRef>
+          <a:fillRef idx="1">
+            <a:schemeClr val="accent1"/>
+          </a:fillRef>
+          <a:effectRef idx="0">
+            <a:schemeClr val="accent1"/>
+          </a:effectRef>
+          <a:fontRef idx="minor">
+            <a:schemeClr val="lt1"/>
+          </a:fontRef>
+        </p:style>
+        <p:txBody>
+          <a:bodyPr rtlCol="0" anchor="ctr"/>
+          <a:lstStyle/>
+          <a:p>
+            <a:pPr algn="ctr"/>
+            <a:r>
+              <a:rPr lang="en-US" sz="2800" dirty="0"/>
+              <a:t>ISO/RTO electricity markets</a:t>
+            </a:r>
+          </a:p>
+        </p:txBody>
+      </p:sp>
+      <p:sp>
+        <p:nvSpPr>
+          <p:cNvPr id="36" name="Other inputs BOX"/>
+          <p:cNvSpPr/>
+          <p:nvPr/>
+        </p:nvSpPr>
+        <p:spPr>
+          <a:xfrm>
+            <a:off x="-56115" y="2252367"/>
+            <a:ext cx="1737360" cy="2325836"/>
+          </a:xfrm>
+          <a:prstGeom prst="roundRect">
+            <a:avLst>
+              <a:gd name="adj" fmla="val 9258"/>
+            </a:avLst>
+          </a:prstGeom>
+        </p:spPr>
+        <p:style>
+          <a:lnRef idx="2">
+            <a:schemeClr val="accent1">
+              <a:shade val="50000"/>
+            </a:schemeClr>
+          </a:lnRef>
+          <a:fillRef idx="1">
+            <a:schemeClr val="accent1"/>
+          </a:fillRef>
+          <a:effectRef idx="0">
+            <a:schemeClr val="accent1"/>
+          </a:effectRef>
+          <a:fontRef idx="minor">
+            <a:schemeClr val="lt1"/>
+          </a:fontRef>
+        </p:style>
+        <p:txBody>
+          <a:bodyPr rtlCol="0" anchor="ctr"/>
+          <a:lstStyle/>
+          <a:p>
+            <a:pPr algn="ctr"/>
+            <a:r>
+              <a:rPr lang="en-US" sz="2800" dirty="0"/>
+              <a:t>Other Inputs</a:t>
+            </a:r>
+          </a:p>
+        </p:txBody>
+      </p:sp>
+      <p:sp>
+        <p:nvSpPr>
+          <p:cNvPr id="11" name="Cost BOX"/>
+          <p:cNvSpPr/>
+          <p:nvPr/>
+        </p:nvSpPr>
+        <p:spPr>
+          <a:xfrm>
+            <a:off x="-64280" y="4693628"/>
+            <a:ext cx="1737360" cy="1915561"/>
+          </a:xfrm>
+          <a:prstGeom prst="roundRect">
+            <a:avLst>
+              <a:gd name="adj" fmla="val 9258"/>
+            </a:avLst>
+          </a:prstGeom>
+        </p:spPr>
+        <p:style>
+          <a:lnRef idx="2">
+            <a:schemeClr val="accent1">
+              <a:shade val="50000"/>
+            </a:schemeClr>
+          </a:lnRef>
+          <a:fillRef idx="1">
+            <a:schemeClr val="accent1"/>
+          </a:fillRef>
+          <a:effectRef idx="0">
+            <a:schemeClr val="accent1"/>
+          </a:effectRef>
+          <a:fontRef idx="minor">
+            <a:schemeClr val="lt1"/>
+          </a:fontRef>
+        </p:style>
+        <p:txBody>
+          <a:bodyPr rtlCol="0" anchor="ctr"/>
+          <a:lstStyle/>
+          <a:p>
+            <a:pPr algn="ctr"/>
+            <a:r>
+              <a:rPr lang="en-US" sz="2800" dirty="0"/>
+              <a:t>Financial Inputs</a:t>
+            </a:r>
+          </a:p>
+        </p:txBody>
+      </p:sp>
+    </p:spTree>
+    <p:extLst>
+      <p:ext uri="{BB962C8B-B14F-4D97-AF65-F5344CB8AC3E}">
+        <p14:creationId xmlns:p14="http://schemas.microsoft.com/office/powerpoint/2010/main" val="1993344791"/>
+      </p:ext>
+    </p:extLst>
+  </p:cSld>
+  <p:clrMapOvr>
+    <a:masterClrMapping/>
+  </p:clrMapOvr>
+</p:sld>
+</file>
+
+<file path=ppt/slides/slide8.xml><?xml version="1.0" encoding="utf-8"?>
+<p:sld xmlns:a="http://schemas.openxmlformats.org/drawingml/2006/main" xmlns:r="http://schemas.openxmlformats.org/officeDocument/2006/relationships" xmlns:p="http://schemas.openxmlformats.org/presentationml/2006/main">
+  <p:cSld>
+    <p:spTree>
+      <p:nvGrpSpPr>
+        <p:cNvPr id="1" name=""/>
+        <p:cNvGrpSpPr/>
+        <p:nvPr/>
+      </p:nvGrpSpPr>
+      <p:grpSpPr>
+        <a:xfrm>
+          <a:off x="0" y="0"/>
+          <a:ext cx="0" cy="0"/>
+          <a:chOff x="0" y="0"/>
+          <a:chExt cx="0" cy="0"/>
+        </a:xfrm>
+      </p:grpSpPr>
+      <p:sp>
+        <p:nvSpPr>
           <p:cNvPr id="2" name="Title 1">
             <a:extLst>
               <a:ext uri="{FF2B5EF4-FFF2-40B4-BE49-F238E27FC236}">
@@ -14743,7 +17208,7 @@
 </p:sld>
 </file>
 
-<file path=ppt/slides/slide8.xml><?xml version="1.0" encoding="utf-8"?>
+<file path=ppt/slides/slide9.xml><?xml version="1.0" encoding="utf-8"?>
 <p:sld xmlns:a="http://schemas.openxmlformats.org/drawingml/2006/main" xmlns:r="http://schemas.openxmlformats.org/officeDocument/2006/relationships" xmlns:p="http://schemas.openxmlformats.org/presentationml/2006/main">
   <p:cSld>
     <p:spTree>
@@ -16669,519 +19134,6 @@
     <p:extLst>
       <p:ext uri="{BB962C8B-B14F-4D97-AF65-F5344CB8AC3E}">
         <p14:creationId xmlns:p14="http://schemas.microsoft.com/office/powerpoint/2010/main" val="3474764164"/>
-      </p:ext>
-    </p:extLst>
-  </p:cSld>
-  <p:clrMapOvr>
-    <a:masterClrMapping/>
-  </p:clrMapOvr>
-</p:sld>
-</file>
-
-<file path=ppt/slides/slide9.xml><?xml version="1.0" encoding="utf-8"?>
-<p:sld xmlns:a="http://schemas.openxmlformats.org/drawingml/2006/main" xmlns:r="http://schemas.openxmlformats.org/officeDocument/2006/relationships" xmlns:p="http://schemas.openxmlformats.org/presentationml/2006/main">
-  <p:cSld>
-    <p:spTree>
-      <p:nvGrpSpPr>
-        <p:cNvPr id="1" name=""/>
-        <p:cNvGrpSpPr/>
-        <p:nvPr/>
-      </p:nvGrpSpPr>
-      <p:grpSpPr>
-        <a:xfrm>
-          <a:off x="0" y="0"/>
-          <a:ext cx="0" cy="0"/>
-          <a:chOff x="0" y="0"/>
-          <a:chExt cx="0" cy="0"/>
-        </a:xfrm>
-      </p:grpSpPr>
-      <p:sp>
-        <p:nvSpPr>
-          <p:cNvPr id="2" name="Title 1"/>
-          <p:cNvSpPr>
-            <a:spLocks noGrp="1"/>
-          </p:cNvSpPr>
-          <p:nvPr>
-            <p:ph type="title"/>
-          </p:nvPr>
-        </p:nvSpPr>
-        <p:spPr/>
-        <p:txBody>
-          <a:bodyPr>
-            <a:normAutofit fontScale="90000"/>
-          </a:bodyPr>
-          <a:lstStyle/>
-          <a:p>
-            <a:r>
-              <a:rPr lang="en-US" dirty="0"/>
-              <a:t>Quantify the value of energy storage</a:t>
-            </a:r>
-          </a:p>
-        </p:txBody>
-      </p:sp>
-      <p:sp>
-        <p:nvSpPr>
-          <p:cNvPr id="6" name="TextBox 5"/>
-          <p:cNvSpPr txBox="1"/>
-          <p:nvPr/>
-        </p:nvSpPr>
-        <p:spPr>
-          <a:xfrm>
-            <a:off x="556504" y="4972050"/>
-            <a:ext cx="1780039" cy="1361911"/>
-          </a:xfrm>
-          <a:prstGeom prst="rect">
-            <a:avLst/>
-          </a:prstGeom>
-          <a:noFill/>
-        </p:spPr>
-        <p:txBody>
-          <a:bodyPr wrap="none" rtlCol="0">
-            <a:spAutoFit/>
-          </a:bodyPr>
-          <a:lstStyle/>
-          <a:p>
-            <a:pPr marL="285750" indent="-285750">
-              <a:buFont typeface="Arial" pitchFamily="34" charset="0"/>
-              <a:buChar char="•"/>
-            </a:pPr>
-            <a:r>
-              <a:rPr lang="en-US" sz="1650" dirty="0">
-                <a:solidFill>
-                  <a:schemeClr val="bg2"/>
-                </a:solidFill>
-              </a:rPr>
-              <a:t>Energy Prices</a:t>
-            </a:r>
-          </a:p>
-          <a:p>
-            <a:pPr marL="285750" indent="-285750">
-              <a:buFont typeface="Arial" pitchFamily="34" charset="0"/>
-              <a:buChar char="•"/>
-            </a:pPr>
-            <a:r>
-              <a:rPr lang="en-US" sz="1650" dirty="0">
-                <a:solidFill>
-                  <a:schemeClr val="bg2"/>
-                </a:solidFill>
-              </a:rPr>
-              <a:t>Reserve Prices</a:t>
-            </a:r>
-          </a:p>
-          <a:p>
-            <a:pPr marL="285750" indent="-285750">
-              <a:buFont typeface="Arial" pitchFamily="34" charset="0"/>
-              <a:buChar char="•"/>
-            </a:pPr>
-            <a:r>
-              <a:rPr lang="en-US" sz="1650" dirty="0">
-                <a:solidFill>
-                  <a:schemeClr val="bg2"/>
-                </a:solidFill>
-              </a:rPr>
-              <a:t>Hydrogen Price</a:t>
-            </a:r>
-          </a:p>
-          <a:p>
-            <a:pPr marL="285750" indent="-285750">
-              <a:buFont typeface="Arial" pitchFamily="34" charset="0"/>
-              <a:buChar char="•"/>
-            </a:pPr>
-            <a:r>
-              <a:rPr lang="en-US" sz="1650" dirty="0">
-                <a:solidFill>
-                  <a:schemeClr val="bg2"/>
-                </a:solidFill>
-              </a:rPr>
-              <a:t>Operational </a:t>
-            </a:r>
-            <a:br>
-              <a:rPr lang="en-US" sz="1650" dirty="0">
-                <a:solidFill>
-                  <a:schemeClr val="bg2"/>
-                </a:solidFill>
-              </a:rPr>
-            </a:br>
-            <a:r>
-              <a:rPr lang="en-US" sz="1650" dirty="0">
-                <a:solidFill>
-                  <a:schemeClr val="bg2"/>
-                </a:solidFill>
-              </a:rPr>
-              <a:t>parameters</a:t>
-            </a:r>
-          </a:p>
-        </p:txBody>
-      </p:sp>
-      <p:sp>
-        <p:nvSpPr>
-          <p:cNvPr id="14" name="TextBox 13"/>
-          <p:cNvSpPr txBox="1"/>
-          <p:nvPr/>
-        </p:nvSpPr>
-        <p:spPr>
-          <a:xfrm>
-            <a:off x="242179" y="4648200"/>
-            <a:ext cx="2548646" cy="400110"/>
-          </a:xfrm>
-          <a:prstGeom prst="rect">
-            <a:avLst/>
-          </a:prstGeom>
-          <a:noFill/>
-        </p:spPr>
-        <p:txBody>
-          <a:bodyPr wrap="none" rtlCol="0">
-            <a:spAutoFit/>
-          </a:bodyPr>
-          <a:lstStyle/>
-          <a:p>
-            <a:r>
-              <a:rPr lang="en-US" sz="2000" b="1" u="sng" dirty="0">
-                <a:solidFill>
-                  <a:schemeClr val="bg2"/>
-                </a:solidFill>
-              </a:rPr>
-              <a:t>Historical or Modelled</a:t>
-            </a:r>
-          </a:p>
-        </p:txBody>
-      </p:sp>
-      <p:sp>
-        <p:nvSpPr>
-          <p:cNvPr id="16" name="Down Arrow 15"/>
-          <p:cNvSpPr/>
-          <p:nvPr/>
-        </p:nvSpPr>
-        <p:spPr>
-          <a:xfrm>
-            <a:off x="5486400" y="5065030"/>
-            <a:ext cx="333375" cy="915418"/>
-          </a:xfrm>
-          <a:prstGeom prst="downArrow">
-            <a:avLst>
-              <a:gd name="adj1" fmla="val 100000"/>
-              <a:gd name="adj2" fmla="val 50000"/>
-            </a:avLst>
-          </a:prstGeom>
-          <a:solidFill>
-            <a:srgbClr val="FFC000"/>
-          </a:solidFill>
-          <a:ln>
-            <a:solidFill>
-              <a:schemeClr val="accent3"/>
-            </a:solidFill>
-          </a:ln>
-          <a:scene3d>
-            <a:camera prst="orthographicFront">
-              <a:rot lat="0" lon="10800000" rev="5400000"/>
-            </a:camera>
-            <a:lightRig rig="threePt" dir="t"/>
-          </a:scene3d>
-        </p:spPr>
-        <p:style>
-          <a:lnRef idx="2">
-            <a:schemeClr val="accent1">
-              <a:shade val="50000"/>
-            </a:schemeClr>
-          </a:lnRef>
-          <a:fillRef idx="1">
-            <a:schemeClr val="accent1"/>
-          </a:fillRef>
-          <a:effectRef idx="0">
-            <a:schemeClr val="accent1"/>
-          </a:effectRef>
-          <a:fontRef idx="minor">
-            <a:schemeClr val="lt1"/>
-          </a:fontRef>
-        </p:style>
-        <p:txBody>
-          <a:bodyPr rtlCol="0" anchor="ctr"/>
-          <a:lstStyle/>
-          <a:p>
-            <a:pPr algn="ctr"/>
-            <a:endParaRPr lang="en-US"/>
-          </a:p>
-        </p:txBody>
-      </p:sp>
-      <p:sp>
-        <p:nvSpPr>
-          <p:cNvPr id="8" name="Rounded Rectangle 7"/>
-          <p:cNvSpPr/>
-          <p:nvPr/>
-        </p:nvSpPr>
-        <p:spPr>
-          <a:xfrm>
-            <a:off x="3248163" y="4886325"/>
-            <a:ext cx="2333487" cy="1295400"/>
-          </a:xfrm>
-          <a:prstGeom prst="roundRect">
-            <a:avLst/>
-          </a:prstGeom>
-        </p:spPr>
-        <p:style>
-          <a:lnRef idx="2">
-            <a:schemeClr val="accent1">
-              <a:shade val="50000"/>
-            </a:schemeClr>
-          </a:lnRef>
-          <a:fillRef idx="1">
-            <a:schemeClr val="accent1"/>
-          </a:fillRef>
-          <a:effectRef idx="0">
-            <a:schemeClr val="accent1"/>
-          </a:effectRef>
-          <a:fontRef idx="minor">
-            <a:schemeClr val="lt1"/>
-          </a:fontRef>
-        </p:style>
-        <p:txBody>
-          <a:bodyPr rtlCol="0" anchor="ctr"/>
-          <a:lstStyle/>
-          <a:p>
-            <a:pPr algn="ctr"/>
-            <a:r>
-              <a:rPr lang="en-US" sz="3000" dirty="0"/>
-              <a:t>Optimization model</a:t>
-            </a:r>
-          </a:p>
-        </p:txBody>
-      </p:sp>
-      <p:sp>
-        <p:nvSpPr>
-          <p:cNvPr id="17" name="TextBox 16"/>
-          <p:cNvSpPr txBox="1"/>
-          <p:nvPr/>
-        </p:nvSpPr>
-        <p:spPr>
-          <a:xfrm>
-            <a:off x="6203144" y="5192494"/>
-            <a:ext cx="2788456" cy="646331"/>
-          </a:xfrm>
-          <a:prstGeom prst="rect">
-            <a:avLst/>
-          </a:prstGeom>
-          <a:noFill/>
-        </p:spPr>
-        <p:txBody>
-          <a:bodyPr wrap="none" rtlCol="0">
-            <a:spAutoFit/>
-          </a:bodyPr>
-          <a:lstStyle/>
-          <a:p>
-            <a:r>
-              <a:rPr lang="en-US" dirty="0">
-                <a:solidFill>
-                  <a:schemeClr val="bg2"/>
-                </a:solidFill>
-              </a:rPr>
-              <a:t>Profit based on operation </a:t>
-            </a:r>
-            <a:br>
-              <a:rPr lang="en-US" dirty="0">
-                <a:solidFill>
-                  <a:schemeClr val="bg2"/>
-                </a:solidFill>
-              </a:rPr>
-            </a:br>
-            <a:r>
-              <a:rPr lang="en-US" dirty="0">
-                <a:solidFill>
-                  <a:schemeClr val="bg2"/>
-                </a:solidFill>
-              </a:rPr>
-              <a:t> (arbitrage, AS, H</a:t>
-            </a:r>
-            <a:r>
-              <a:rPr lang="en-US" baseline="-25000" dirty="0">
-                <a:solidFill>
-                  <a:schemeClr val="bg2"/>
-                </a:solidFill>
-              </a:rPr>
-              <a:t>2</a:t>
-            </a:r>
-            <a:r>
-              <a:rPr lang="en-US" dirty="0">
-                <a:solidFill>
-                  <a:schemeClr val="bg2"/>
-                </a:solidFill>
-              </a:rPr>
-              <a:t> sale, etc.)</a:t>
-            </a:r>
-          </a:p>
-        </p:txBody>
-      </p:sp>
-      <p:sp>
-        <p:nvSpPr>
-          <p:cNvPr id="10" name="Rectangle 9"/>
-          <p:cNvSpPr/>
-          <p:nvPr/>
-        </p:nvSpPr>
-        <p:spPr>
-          <a:xfrm>
-            <a:off x="0" y="785816"/>
-            <a:ext cx="9144000" cy="804859"/>
-          </a:xfrm>
-          <a:prstGeom prst="rect">
-            <a:avLst/>
-          </a:prstGeom>
-          <a:solidFill>
-            <a:schemeClr val="tx1"/>
-          </a:solidFill>
-          <a:ln w="38100">
-            <a:solidFill>
-              <a:srgbClr val="0070C0"/>
-            </a:solidFill>
-          </a:ln>
-        </p:spPr>
-        <p:style>
-          <a:lnRef idx="2">
-            <a:schemeClr val="accent1">
-              <a:shade val="50000"/>
-            </a:schemeClr>
-          </a:lnRef>
-          <a:fillRef idx="1">
-            <a:schemeClr val="accent1"/>
-          </a:fillRef>
-          <a:effectRef idx="0">
-            <a:schemeClr val="accent1"/>
-          </a:effectRef>
-          <a:fontRef idx="minor">
-            <a:schemeClr val="lt1"/>
-          </a:fontRef>
-        </p:style>
-        <p:txBody>
-          <a:bodyPr lIns="45720" rIns="45720" rtlCol="0" anchor="ctr"/>
-          <a:lstStyle/>
-          <a:p>
-            <a:pPr algn="ctr"/>
-            <a:r>
-              <a:rPr lang="en-US" sz="2400" b="1" dirty="0">
-                <a:solidFill>
-                  <a:schemeClr val="bg2"/>
-                </a:solidFill>
-              </a:rPr>
-              <a:t>An operations optimization model is used to quantify value from electricity markets and the sale of hydrogen</a:t>
-            </a:r>
-          </a:p>
-        </p:txBody>
-      </p:sp>
-      <p:sp>
-        <p:nvSpPr>
-          <p:cNvPr id="12" name="Content Placeholder 2"/>
-          <p:cNvSpPr>
-            <a:spLocks noGrp="1"/>
-          </p:cNvSpPr>
-          <p:nvPr>
-            <p:ph idx="1"/>
-          </p:nvPr>
-        </p:nvSpPr>
-        <p:spPr>
-          <a:xfrm>
-            <a:off x="304800" y="1676400"/>
-            <a:ext cx="8229600" cy="2971800"/>
-          </a:xfrm>
-        </p:spPr>
-        <p:txBody>
-          <a:bodyPr>
-            <a:normAutofit/>
-          </a:bodyPr>
-          <a:lstStyle/>
-          <a:p>
-            <a:r>
-              <a:rPr lang="en-US" sz="2400" dirty="0"/>
-              <a:t>Optimization model can perform time-resolved co-optimization of energy, ancillary service and hydrogen products quickly</a:t>
-            </a:r>
-          </a:p>
-          <a:p>
-            <a:r>
-              <a:rPr lang="en-US" sz="2400" dirty="0"/>
-              <a:t>Assumptions</a:t>
-            </a:r>
-          </a:p>
-          <a:p>
-            <a:pPr lvl="1"/>
-            <a:r>
-              <a:rPr lang="en-US" sz="2000" dirty="0"/>
-              <a:t>Sufficient capacity is available in all markets</a:t>
-            </a:r>
-          </a:p>
-          <a:p>
-            <a:pPr lvl="1"/>
-            <a:r>
-              <a:rPr lang="en-US" sz="2000" dirty="0"/>
-              <a:t>Objects don’t impact market outcome </a:t>
-            </a:r>
-            <a:br>
-              <a:rPr lang="en-US" sz="2000" dirty="0"/>
-            </a:br>
-            <a:r>
-              <a:rPr lang="en-US" sz="2000" dirty="0"/>
-              <a:t>(i.e., small compared to market size)</a:t>
-            </a:r>
-          </a:p>
-        </p:txBody>
-      </p:sp>
-      <p:sp>
-        <p:nvSpPr>
-          <p:cNvPr id="13" name="Down Arrow 12"/>
-          <p:cNvSpPr/>
-          <p:nvPr/>
-        </p:nvSpPr>
-        <p:spPr>
-          <a:xfrm>
-            <a:off x="2671950" y="5065030"/>
-            <a:ext cx="171074" cy="915418"/>
-          </a:xfrm>
-          <a:prstGeom prst="downArrow">
-            <a:avLst>
-              <a:gd name="adj1" fmla="val 100000"/>
-              <a:gd name="adj2" fmla="val 50000"/>
-            </a:avLst>
-          </a:prstGeom>
-          <a:solidFill>
-            <a:srgbClr val="FFC000"/>
-          </a:solidFill>
-          <a:ln>
-            <a:solidFill>
-              <a:schemeClr val="accent3"/>
-            </a:solidFill>
-          </a:ln>
-          <a:scene3d>
-            <a:camera prst="orthographicFront">
-              <a:rot lat="0" lon="10800000" rev="5400000"/>
-            </a:camera>
-            <a:lightRig rig="threePt" dir="t"/>
-          </a:scene3d>
-        </p:spPr>
-        <p:style>
-          <a:lnRef idx="2">
-            <a:schemeClr val="accent1">
-              <a:shade val="50000"/>
-            </a:schemeClr>
-          </a:lnRef>
-          <a:fillRef idx="1">
-            <a:schemeClr val="accent1"/>
-          </a:fillRef>
-          <a:effectRef idx="0">
-            <a:schemeClr val="accent1"/>
-          </a:effectRef>
-          <a:fontRef idx="minor">
-            <a:schemeClr val="lt1"/>
-          </a:fontRef>
-        </p:style>
-        <p:txBody>
-          <a:bodyPr rtlCol="0" anchor="ctr"/>
-          <a:lstStyle/>
-          <a:p>
-            <a:pPr algn="ctr"/>
-            <a:endParaRPr lang="en-US"/>
-          </a:p>
-        </p:txBody>
-      </p:sp>
-    </p:spTree>
-    <p:extLst>
-      <p:ext uri="{BB962C8B-B14F-4D97-AF65-F5344CB8AC3E}">
-        <p14:creationId xmlns:p14="http://schemas.microsoft.com/office/powerpoint/2010/main" val="3757671085"/>
       </p:ext>
     </p:extLst>
   </p:cSld>

</xml_diff>